<commit_message>
Updated the main methods figure in chapter 8
</commit_message>
<xml_diff>
--- a/chapter_07/figures/training_approaches.pptx
+++ b/chapter_07/figures/training_approaches.pptx
@@ -2,12 +2,12 @@
 <file path=ppt/presentation.xml><?xml version="1.0" encoding="utf-8"?>
 <p:presentation xmlns:a="http://schemas.openxmlformats.org/drawingml/2006/main" xmlns:r="http://schemas.openxmlformats.org/officeDocument/2006/relationships" xmlns:p="http://schemas.openxmlformats.org/presentationml/2006/main" saveSubsetFonts="1">
   <p:sldMasterIdLst>
-    <p:sldMasterId id="2147483672" r:id="rId1"/>
+    <p:sldMasterId id="2147483684" r:id="rId1"/>
   </p:sldMasterIdLst>
   <p:sldIdLst>
     <p:sldId id="256" r:id="rId2"/>
   </p:sldIdLst>
-  <p:sldSz cx="4140200" cy="3725863"/>
+  <p:sldSz cx="4140200" cy="2916238"/>
   <p:notesSz cx="6858000" cy="9144000"/>
   <p:defaultTextStyle>
     <a:defPPr>
@@ -104,13 +104,18 @@
       </a:defRPr>
     </a:lvl9pPr>
   </p:defaultTextStyle>
+  <p:extLst>
+    <p:ext uri="{EFAFB233-063F-42B5-8137-9DF3F51BA10A}">
+      <p15:sldGuideLst xmlns:p15="http://schemas.microsoft.com/office/powerpoint/2012/main"/>
+    </p:ext>
+  </p:extLst>
 </p:presentation>
 </file>
 
 <file path=ppt/revisionInfo.xml><?xml version="1.0" encoding="utf-8"?>
 <p1510:revInfo xmlns:a="http://schemas.openxmlformats.org/drawingml/2006/main" xmlns:r="http://schemas.openxmlformats.org/officeDocument/2006/relationships" xmlns:p1510="http://schemas.microsoft.com/office/powerpoint/2015/10/main">
   <p1510:revLst>
-    <p1510:client id="{C1D7A64D-15B7-4FCE-91E9-6F95F059BEA6}" v="23" dt="2025-06-29T23:03:19.694"/>
+    <p1510:client id="{C1D7A64D-15B7-4FCE-91E9-6F95F059BEA6}" v="25" dt="2025-07-09T12:48:49.330"/>
   </p1510:revLst>
 </p1510:revInfo>
 </file>
@@ -120,16 +125,24 @@
   <pc:docChgLst>
     <pc:chgData name="Fatima Pillosu" userId="a6295d4dc9e22643" providerId="LiveId" clId="{C1D7A64D-15B7-4FCE-91E9-6F95F059BEA6}"/>
     <pc:docChg chg="undo custSel modSld">
-      <pc:chgData name="Fatima Pillosu" userId="a6295d4dc9e22643" providerId="LiveId" clId="{C1D7A64D-15B7-4FCE-91E9-6F95F059BEA6}" dt="2025-06-29T23:03:29.051" v="1888" actId="1035"/>
+      <pc:chgData name="Fatima Pillosu" userId="a6295d4dc9e22643" providerId="LiveId" clId="{C1D7A64D-15B7-4FCE-91E9-6F95F059BEA6}" dt="2025-07-09T12:48:59.019" v="2099" actId="554"/>
       <pc:docMkLst>
         <pc:docMk/>
       </pc:docMkLst>
       <pc:sldChg chg="addSp delSp modSp mod">
-        <pc:chgData name="Fatima Pillosu" userId="a6295d4dc9e22643" providerId="LiveId" clId="{C1D7A64D-15B7-4FCE-91E9-6F95F059BEA6}" dt="2025-06-29T23:03:29.051" v="1888" actId="1035"/>
+        <pc:chgData name="Fatima Pillosu" userId="a6295d4dc9e22643" providerId="LiveId" clId="{C1D7A64D-15B7-4FCE-91E9-6F95F059BEA6}" dt="2025-07-09T12:48:59.019" v="2099" actId="554"/>
         <pc:sldMkLst>
           <pc:docMk/>
           <pc:sldMk cId="3625231182" sldId="256"/>
         </pc:sldMkLst>
+        <pc:spChg chg="add del">
+          <ac:chgData name="Fatima Pillosu" userId="a6295d4dc9e22643" providerId="LiveId" clId="{C1D7A64D-15B7-4FCE-91E9-6F95F059BEA6}" dt="2025-07-09T12:48:33.465" v="2096" actId="478"/>
+          <ac:spMkLst>
+            <pc:docMk/>
+            <pc:sldMk cId="3625231182" sldId="256"/>
+            <ac:spMk id="2" creationId="{4D0BF665-16F7-BBB3-D3F3-27106A650BC6}"/>
+          </ac:spMkLst>
+        </pc:spChg>
         <pc:spChg chg="del mod">
           <ac:chgData name="Fatima Pillosu" userId="a6295d4dc9e22643" providerId="LiveId" clId="{C1D7A64D-15B7-4FCE-91E9-6F95F059BEA6}" dt="2025-06-29T22:10:20.305" v="427" actId="478"/>
           <ac:spMkLst>
@@ -138,6 +151,38 @@
             <ac:spMk id="4" creationId="{E04EE31A-4B91-9169-F400-BEDD4EA217A5}"/>
           </ac:spMkLst>
         </pc:spChg>
+        <pc:spChg chg="add mod">
+          <ac:chgData name="Fatima Pillosu" userId="a6295d4dc9e22643" providerId="LiveId" clId="{C1D7A64D-15B7-4FCE-91E9-6F95F059BEA6}" dt="2025-07-09T12:48:49.330" v="2098"/>
+          <ac:spMkLst>
+            <pc:docMk/>
+            <pc:sldMk cId="3625231182" sldId="256"/>
+            <ac:spMk id="8" creationId="{D263CB68-6070-0BB4-645F-52A1DF1CCB45}"/>
+          </ac:spMkLst>
+        </pc:spChg>
+        <pc:spChg chg="add mod">
+          <ac:chgData name="Fatima Pillosu" userId="a6295d4dc9e22643" providerId="LiveId" clId="{C1D7A64D-15B7-4FCE-91E9-6F95F059BEA6}" dt="2025-07-09T12:48:49.330" v="2098"/>
+          <ac:spMkLst>
+            <pc:docMk/>
+            <pc:sldMk cId="3625231182" sldId="256"/>
+            <ac:spMk id="9" creationId="{49E7EF79-54F5-6957-912D-F5211AE7C345}"/>
+          </ac:spMkLst>
+        </pc:spChg>
+        <pc:spChg chg="add mod">
+          <ac:chgData name="Fatima Pillosu" userId="a6295d4dc9e22643" providerId="LiveId" clId="{C1D7A64D-15B7-4FCE-91E9-6F95F059BEA6}" dt="2025-07-09T12:48:49.330" v="2098"/>
+          <ac:spMkLst>
+            <pc:docMk/>
+            <pc:sldMk cId="3625231182" sldId="256"/>
+            <ac:spMk id="10" creationId="{F2DC4528-4346-4046-4366-D22CF29233CB}"/>
+          </ac:spMkLst>
+        </pc:spChg>
+        <pc:spChg chg="add mod">
+          <ac:chgData name="Fatima Pillosu" userId="a6295d4dc9e22643" providerId="LiveId" clId="{C1D7A64D-15B7-4FCE-91E9-6F95F059BEA6}" dt="2025-07-09T12:48:49.330" v="2098"/>
+          <ac:spMkLst>
+            <pc:docMk/>
+            <pc:sldMk cId="3625231182" sldId="256"/>
+            <ac:spMk id="11" creationId="{65821429-491A-9695-79A1-DDBAF1D91760}"/>
+          </ac:spMkLst>
+        </pc:spChg>
         <pc:spChg chg="del mod">
           <ac:chgData name="Fatima Pillosu" userId="a6295d4dc9e22643" providerId="LiveId" clId="{C1D7A64D-15B7-4FCE-91E9-6F95F059BEA6}" dt="2025-06-29T22:09:08.254" v="364" actId="478"/>
           <ac:spMkLst>
@@ -154,6 +199,14 @@
             <ac:spMk id="15" creationId="{D263CB68-6070-0BB4-645F-52A1DF1CCB45}"/>
           </ac:spMkLst>
         </pc:spChg>
+        <pc:spChg chg="add mod">
+          <ac:chgData name="Fatima Pillosu" userId="a6295d4dc9e22643" providerId="LiveId" clId="{C1D7A64D-15B7-4FCE-91E9-6F95F059BEA6}" dt="2025-07-09T12:48:49.330" v="2098"/>
+          <ac:spMkLst>
+            <pc:docMk/>
+            <pc:sldMk cId="3625231182" sldId="256"/>
+            <ac:spMk id="15" creationId="{FCCCE2D9-7F44-7612-D249-E404F415A435}"/>
+          </ac:spMkLst>
+        </pc:spChg>
         <pc:spChg chg="del mod">
           <ac:chgData name="Fatima Pillosu" userId="a6295d4dc9e22643" providerId="LiveId" clId="{C1D7A64D-15B7-4FCE-91E9-6F95F059BEA6}" dt="2025-06-29T23:03:08.104" v="1885" actId="21"/>
           <ac:spMkLst>
@@ -162,6 +215,22 @@
             <ac:spMk id="16" creationId="{49E7EF79-54F5-6957-912D-F5211AE7C345}"/>
           </ac:spMkLst>
         </pc:spChg>
+        <pc:spChg chg="add mod">
+          <ac:chgData name="Fatima Pillosu" userId="a6295d4dc9e22643" providerId="LiveId" clId="{C1D7A64D-15B7-4FCE-91E9-6F95F059BEA6}" dt="2025-07-09T12:48:49.330" v="2098"/>
+          <ac:spMkLst>
+            <pc:docMk/>
+            <pc:sldMk cId="3625231182" sldId="256"/>
+            <ac:spMk id="16" creationId="{A4D6D809-F63A-0BB5-A944-F32D1EB0F1C2}"/>
+          </ac:spMkLst>
+        </pc:spChg>
+        <pc:spChg chg="add mod">
+          <ac:chgData name="Fatima Pillosu" userId="a6295d4dc9e22643" providerId="LiveId" clId="{C1D7A64D-15B7-4FCE-91E9-6F95F059BEA6}" dt="2025-07-09T12:48:49.330" v="2098"/>
+          <ac:spMkLst>
+            <pc:docMk/>
+            <pc:sldMk cId="3625231182" sldId="256"/>
+            <ac:spMk id="17" creationId="{336F1B2A-522C-7B79-D3EB-34DC5339E4E0}"/>
+          </ac:spMkLst>
+        </pc:spChg>
         <pc:spChg chg="del mod">
           <ac:chgData name="Fatima Pillosu" userId="a6295d4dc9e22643" providerId="LiveId" clId="{C1D7A64D-15B7-4FCE-91E9-6F95F059BEA6}" dt="2025-06-29T23:03:08.104" v="1885" actId="21"/>
           <ac:spMkLst>
@@ -178,6 +247,38 @@
             <ac:spMk id="18" creationId="{65821429-491A-9695-79A1-DDBAF1D91760}"/>
           </ac:spMkLst>
         </pc:spChg>
+        <pc:spChg chg="add mod">
+          <ac:chgData name="Fatima Pillosu" userId="a6295d4dc9e22643" providerId="LiveId" clId="{C1D7A64D-15B7-4FCE-91E9-6F95F059BEA6}" dt="2025-07-09T12:48:49.330" v="2098"/>
+          <ac:spMkLst>
+            <pc:docMk/>
+            <pc:sldMk cId="3625231182" sldId="256"/>
+            <ac:spMk id="18" creationId="{A3E2E621-7AB8-A040-2A57-53B40E818136}"/>
+          </ac:spMkLst>
+        </pc:spChg>
+        <pc:spChg chg="add mod">
+          <ac:chgData name="Fatima Pillosu" userId="a6295d4dc9e22643" providerId="LiveId" clId="{C1D7A64D-15B7-4FCE-91E9-6F95F059BEA6}" dt="2025-07-09T12:48:49.330" v="2098"/>
+          <ac:spMkLst>
+            <pc:docMk/>
+            <pc:sldMk cId="3625231182" sldId="256"/>
+            <ac:spMk id="19" creationId="{CD4285D8-26EE-30B9-3358-672E37B89C30}"/>
+          </ac:spMkLst>
+        </pc:spChg>
+        <pc:spChg chg="add mod">
+          <ac:chgData name="Fatima Pillosu" userId="a6295d4dc9e22643" providerId="LiveId" clId="{C1D7A64D-15B7-4FCE-91E9-6F95F059BEA6}" dt="2025-07-09T12:48:49.330" v="2098"/>
+          <ac:spMkLst>
+            <pc:docMk/>
+            <pc:sldMk cId="3625231182" sldId="256"/>
+            <ac:spMk id="20" creationId="{C6E591DB-9A84-55EC-D1CB-CA85BE21C00A}"/>
+          </ac:spMkLst>
+        </pc:spChg>
+        <pc:spChg chg="add mod">
+          <ac:chgData name="Fatima Pillosu" userId="a6295d4dc9e22643" providerId="LiveId" clId="{C1D7A64D-15B7-4FCE-91E9-6F95F059BEA6}" dt="2025-07-09T12:48:49.330" v="2098"/>
+          <ac:spMkLst>
+            <pc:docMk/>
+            <pc:sldMk cId="3625231182" sldId="256"/>
+            <ac:spMk id="21" creationId="{8D1946FF-AFE3-1103-CD5E-82A774BB18CF}"/>
+          </ac:spMkLst>
+        </pc:spChg>
         <pc:spChg chg="del">
           <ac:chgData name="Fatima Pillosu" userId="a6295d4dc9e22643" providerId="LiveId" clId="{C1D7A64D-15B7-4FCE-91E9-6F95F059BEA6}" dt="2025-06-29T22:08:25.640" v="275" actId="478"/>
           <ac:spMkLst>
@@ -210,6 +311,14 @@
             <ac:spMk id="25" creationId="{336F1B2A-522C-7B79-D3EB-34DC5339E4E0}"/>
           </ac:spMkLst>
         </pc:spChg>
+        <pc:spChg chg="add mod">
+          <ac:chgData name="Fatima Pillosu" userId="a6295d4dc9e22643" providerId="LiveId" clId="{C1D7A64D-15B7-4FCE-91E9-6F95F059BEA6}" dt="2025-07-09T12:48:59.019" v="2099" actId="554"/>
+          <ac:spMkLst>
+            <pc:docMk/>
+            <pc:sldMk cId="3625231182" sldId="256"/>
+            <ac:spMk id="26" creationId="{151BDCEA-207C-CE0D-3A4F-4A049384B2D2}"/>
+          </ac:spMkLst>
+        </pc:spChg>
         <pc:spChg chg="del mod">
           <ac:chgData name="Fatima Pillosu" userId="a6295d4dc9e22643" providerId="LiveId" clId="{C1D7A64D-15B7-4FCE-91E9-6F95F059BEA6}" dt="2025-06-29T22:10:55.894" v="429" actId="478"/>
           <ac:spMkLst>
@@ -226,6 +335,22 @@
             <ac:spMk id="27" creationId="{54E20E32-D41C-783A-92BA-2993DE9F2D9B}"/>
           </ac:spMkLst>
         </pc:spChg>
+        <pc:spChg chg="add mod">
+          <ac:chgData name="Fatima Pillosu" userId="a6295d4dc9e22643" providerId="LiveId" clId="{C1D7A64D-15B7-4FCE-91E9-6F95F059BEA6}" dt="2025-07-09T12:48:59.019" v="2099" actId="554"/>
+          <ac:spMkLst>
+            <pc:docMk/>
+            <pc:sldMk cId="3625231182" sldId="256"/>
+            <ac:spMk id="27" creationId="{DC152927-0AC6-09A7-D861-071860AB0F82}"/>
+          </ac:spMkLst>
+        </pc:spChg>
+        <pc:spChg chg="add mod">
+          <ac:chgData name="Fatima Pillosu" userId="a6295d4dc9e22643" providerId="LiveId" clId="{C1D7A64D-15B7-4FCE-91E9-6F95F059BEA6}" dt="2025-07-09T12:48:59.019" v="2099" actId="554"/>
+          <ac:spMkLst>
+            <pc:docMk/>
+            <pc:sldMk cId="3625231182" sldId="256"/>
+            <ac:spMk id="28" creationId="{0D399520-912A-FB7B-7316-433D9E562933}"/>
+          </ac:spMkLst>
+        </pc:spChg>
         <pc:spChg chg="del mod">
           <ac:chgData name="Fatima Pillosu" userId="a6295d4dc9e22643" providerId="LiveId" clId="{C1D7A64D-15B7-4FCE-91E9-6F95F059BEA6}" dt="2025-06-29T22:24:10.060" v="757" actId="478"/>
           <ac:spMkLst>
@@ -234,6 +359,14 @@
             <ac:spMk id="28" creationId="{8DA2561F-0467-FF76-CD45-646BA340117A}"/>
           </ac:spMkLst>
         </pc:spChg>
+        <pc:spChg chg="add mod">
+          <ac:chgData name="Fatima Pillosu" userId="a6295d4dc9e22643" providerId="LiveId" clId="{C1D7A64D-15B7-4FCE-91E9-6F95F059BEA6}" dt="2025-07-09T12:48:59.019" v="2099" actId="554"/>
+          <ac:spMkLst>
+            <pc:docMk/>
+            <pc:sldMk cId="3625231182" sldId="256"/>
+            <ac:spMk id="29" creationId="{33073E03-F303-77A5-81F7-498EB8604D87}"/>
+          </ac:spMkLst>
+        </pc:spChg>
         <pc:spChg chg="del mod">
           <ac:chgData name="Fatima Pillosu" userId="a6295d4dc9e22643" providerId="LiveId" clId="{C1D7A64D-15B7-4FCE-91E9-6F95F059BEA6}" dt="2025-06-29T23:03:08.104" v="1885" actId="21"/>
           <ac:spMkLst>
@@ -370,164 +503,196 @@
             <ac:spMk id="59" creationId="{744B9F38-6F05-2E16-1E9F-1DA26D6EC1D1}"/>
           </ac:spMkLst>
         </pc:spChg>
-        <pc:spChg chg="add mod">
-          <ac:chgData name="Fatima Pillosu" userId="a6295d4dc9e22643" providerId="LiveId" clId="{C1D7A64D-15B7-4FCE-91E9-6F95F059BEA6}" dt="2025-06-29T23:03:19.694" v="1886"/>
+        <pc:spChg chg="add del mod">
+          <ac:chgData name="Fatima Pillosu" userId="a6295d4dc9e22643" providerId="LiveId" clId="{C1D7A64D-15B7-4FCE-91E9-6F95F059BEA6}" dt="2025-07-09T12:48:35.001" v="2097" actId="21"/>
           <ac:spMkLst>
             <pc:docMk/>
             <pc:sldMk cId="3625231182" sldId="256"/>
             <ac:spMk id="69" creationId="{D263CB68-6070-0BB4-645F-52A1DF1CCB45}"/>
           </ac:spMkLst>
         </pc:spChg>
-        <pc:spChg chg="add mod">
-          <ac:chgData name="Fatima Pillosu" userId="a6295d4dc9e22643" providerId="LiveId" clId="{C1D7A64D-15B7-4FCE-91E9-6F95F059BEA6}" dt="2025-06-29T23:03:19.694" v="1886"/>
+        <pc:spChg chg="add del mod">
+          <ac:chgData name="Fatima Pillosu" userId="a6295d4dc9e22643" providerId="LiveId" clId="{C1D7A64D-15B7-4FCE-91E9-6F95F059BEA6}" dt="2025-07-09T12:48:35.001" v="2097" actId="21"/>
           <ac:spMkLst>
             <pc:docMk/>
             <pc:sldMk cId="3625231182" sldId="256"/>
             <ac:spMk id="70" creationId="{49E7EF79-54F5-6957-912D-F5211AE7C345}"/>
           </ac:spMkLst>
         </pc:spChg>
-        <pc:spChg chg="add mod">
-          <ac:chgData name="Fatima Pillosu" userId="a6295d4dc9e22643" providerId="LiveId" clId="{C1D7A64D-15B7-4FCE-91E9-6F95F059BEA6}" dt="2025-06-29T23:03:19.694" v="1886"/>
+        <pc:spChg chg="add del mod">
+          <ac:chgData name="Fatima Pillosu" userId="a6295d4dc9e22643" providerId="LiveId" clId="{C1D7A64D-15B7-4FCE-91E9-6F95F059BEA6}" dt="2025-07-09T12:48:35.001" v="2097" actId="21"/>
           <ac:spMkLst>
             <pc:docMk/>
             <pc:sldMk cId="3625231182" sldId="256"/>
             <ac:spMk id="71" creationId="{F2DC4528-4346-4046-4366-D22CF29233CB}"/>
           </ac:spMkLst>
         </pc:spChg>
-        <pc:spChg chg="add mod">
-          <ac:chgData name="Fatima Pillosu" userId="a6295d4dc9e22643" providerId="LiveId" clId="{C1D7A64D-15B7-4FCE-91E9-6F95F059BEA6}" dt="2025-06-29T23:03:19.694" v="1886"/>
+        <pc:spChg chg="add del mod">
+          <ac:chgData name="Fatima Pillosu" userId="a6295d4dc9e22643" providerId="LiveId" clId="{C1D7A64D-15B7-4FCE-91E9-6F95F059BEA6}" dt="2025-07-09T12:48:35.001" v="2097" actId="21"/>
           <ac:spMkLst>
             <pc:docMk/>
             <pc:sldMk cId="3625231182" sldId="256"/>
             <ac:spMk id="72" creationId="{65821429-491A-9695-79A1-DDBAF1D91760}"/>
           </ac:spMkLst>
         </pc:spChg>
-        <pc:spChg chg="add mod">
-          <ac:chgData name="Fatima Pillosu" userId="a6295d4dc9e22643" providerId="LiveId" clId="{C1D7A64D-15B7-4FCE-91E9-6F95F059BEA6}" dt="2025-06-29T23:03:19.694" v="1886"/>
+        <pc:spChg chg="add del mod">
+          <ac:chgData name="Fatima Pillosu" userId="a6295d4dc9e22643" providerId="LiveId" clId="{C1D7A64D-15B7-4FCE-91E9-6F95F059BEA6}" dt="2025-07-09T12:48:35.001" v="2097" actId="21"/>
           <ac:spMkLst>
             <pc:docMk/>
             <pc:sldMk cId="3625231182" sldId="256"/>
             <ac:spMk id="76" creationId="{FCCCE2D9-7F44-7612-D249-E404F415A435}"/>
           </ac:spMkLst>
         </pc:spChg>
-        <pc:spChg chg="add mod">
-          <ac:chgData name="Fatima Pillosu" userId="a6295d4dc9e22643" providerId="LiveId" clId="{C1D7A64D-15B7-4FCE-91E9-6F95F059BEA6}" dt="2025-06-29T23:03:19.694" v="1886"/>
+        <pc:spChg chg="add del mod">
+          <ac:chgData name="Fatima Pillosu" userId="a6295d4dc9e22643" providerId="LiveId" clId="{C1D7A64D-15B7-4FCE-91E9-6F95F059BEA6}" dt="2025-07-09T12:48:35.001" v="2097" actId="21"/>
           <ac:spMkLst>
             <pc:docMk/>
             <pc:sldMk cId="3625231182" sldId="256"/>
             <ac:spMk id="77" creationId="{A4D6D809-F63A-0BB5-A944-F32D1EB0F1C2}"/>
           </ac:spMkLst>
         </pc:spChg>
-        <pc:spChg chg="add mod">
-          <ac:chgData name="Fatima Pillosu" userId="a6295d4dc9e22643" providerId="LiveId" clId="{C1D7A64D-15B7-4FCE-91E9-6F95F059BEA6}" dt="2025-06-29T23:03:19.694" v="1886"/>
+        <pc:spChg chg="add del mod">
+          <ac:chgData name="Fatima Pillosu" userId="a6295d4dc9e22643" providerId="LiveId" clId="{C1D7A64D-15B7-4FCE-91E9-6F95F059BEA6}" dt="2025-07-09T12:48:35.001" v="2097" actId="21"/>
           <ac:spMkLst>
             <pc:docMk/>
             <pc:sldMk cId="3625231182" sldId="256"/>
             <ac:spMk id="78" creationId="{336F1B2A-522C-7B79-D3EB-34DC5339E4E0}"/>
           </ac:spMkLst>
         </pc:spChg>
-        <pc:spChg chg="add mod">
-          <ac:chgData name="Fatima Pillosu" userId="a6295d4dc9e22643" providerId="LiveId" clId="{C1D7A64D-15B7-4FCE-91E9-6F95F059BEA6}" dt="2025-06-29T23:03:19.694" v="1886"/>
+        <pc:spChg chg="add del mod">
+          <ac:chgData name="Fatima Pillosu" userId="a6295d4dc9e22643" providerId="LiveId" clId="{C1D7A64D-15B7-4FCE-91E9-6F95F059BEA6}" dt="2025-07-09T12:48:35.001" v="2097" actId="21"/>
           <ac:spMkLst>
             <pc:docMk/>
             <pc:sldMk cId="3625231182" sldId="256"/>
             <ac:spMk id="79" creationId="{A3E2E621-7AB8-A040-2A57-53B40E818136}"/>
           </ac:spMkLst>
         </pc:spChg>
-        <pc:spChg chg="add mod">
-          <ac:chgData name="Fatima Pillosu" userId="a6295d4dc9e22643" providerId="LiveId" clId="{C1D7A64D-15B7-4FCE-91E9-6F95F059BEA6}" dt="2025-06-29T23:03:19.694" v="1886"/>
+        <pc:spChg chg="add del mod">
+          <ac:chgData name="Fatima Pillosu" userId="a6295d4dc9e22643" providerId="LiveId" clId="{C1D7A64D-15B7-4FCE-91E9-6F95F059BEA6}" dt="2025-07-09T12:48:35.001" v="2097" actId="21"/>
           <ac:spMkLst>
             <pc:docMk/>
             <pc:sldMk cId="3625231182" sldId="256"/>
             <ac:spMk id="80" creationId="{CD4285D8-26EE-30B9-3358-672E37B89C30}"/>
           </ac:spMkLst>
         </pc:spChg>
-        <pc:spChg chg="add mod">
-          <ac:chgData name="Fatima Pillosu" userId="a6295d4dc9e22643" providerId="LiveId" clId="{C1D7A64D-15B7-4FCE-91E9-6F95F059BEA6}" dt="2025-06-29T23:03:19.694" v="1886"/>
+        <pc:spChg chg="add del mod">
+          <ac:chgData name="Fatima Pillosu" userId="a6295d4dc9e22643" providerId="LiveId" clId="{C1D7A64D-15B7-4FCE-91E9-6F95F059BEA6}" dt="2025-07-09T12:48:35.001" v="2097" actId="21"/>
           <ac:spMkLst>
             <pc:docMk/>
             <pc:sldMk cId="3625231182" sldId="256"/>
             <ac:spMk id="81" creationId="{C6E591DB-9A84-55EC-D1CB-CA85BE21C00A}"/>
           </ac:spMkLst>
         </pc:spChg>
-        <pc:spChg chg="add mod">
-          <ac:chgData name="Fatima Pillosu" userId="a6295d4dc9e22643" providerId="LiveId" clId="{C1D7A64D-15B7-4FCE-91E9-6F95F059BEA6}" dt="2025-06-29T23:03:19.694" v="1886"/>
+        <pc:spChg chg="add del mod">
+          <ac:chgData name="Fatima Pillosu" userId="a6295d4dc9e22643" providerId="LiveId" clId="{C1D7A64D-15B7-4FCE-91E9-6F95F059BEA6}" dt="2025-07-09T12:48:35.001" v="2097" actId="21"/>
           <ac:spMkLst>
             <pc:docMk/>
             <pc:sldMk cId="3625231182" sldId="256"/>
             <ac:spMk id="82" creationId="{8D1946FF-AFE3-1103-CD5E-82A774BB18CF}"/>
           </ac:spMkLst>
         </pc:spChg>
-        <pc:spChg chg="add mod">
-          <ac:chgData name="Fatima Pillosu" userId="a6295d4dc9e22643" providerId="LiveId" clId="{C1D7A64D-15B7-4FCE-91E9-6F95F059BEA6}" dt="2025-06-29T23:03:19.694" v="1886"/>
+        <pc:spChg chg="add del mod">
+          <ac:chgData name="Fatima Pillosu" userId="a6295d4dc9e22643" providerId="LiveId" clId="{C1D7A64D-15B7-4FCE-91E9-6F95F059BEA6}" dt="2025-07-09T12:46:39.493" v="1890" actId="478"/>
           <ac:spMkLst>
             <pc:docMk/>
             <pc:sldMk cId="3625231182" sldId="256"/>
             <ac:spMk id="87" creationId="{B25CCA34-BFB5-F772-0063-FAB8D7BBF736}"/>
           </ac:spMkLst>
         </pc:spChg>
-        <pc:spChg chg="add mod">
-          <ac:chgData name="Fatima Pillosu" userId="a6295d4dc9e22643" providerId="LiveId" clId="{C1D7A64D-15B7-4FCE-91E9-6F95F059BEA6}" dt="2025-06-29T23:03:19.694" v="1886"/>
+        <pc:spChg chg="add del mod">
+          <ac:chgData name="Fatima Pillosu" userId="a6295d4dc9e22643" providerId="LiveId" clId="{C1D7A64D-15B7-4FCE-91E9-6F95F059BEA6}" dt="2025-07-09T12:46:39.493" v="1890" actId="478"/>
           <ac:spMkLst>
             <pc:docMk/>
             <pc:sldMk cId="3625231182" sldId="256"/>
             <ac:spMk id="88" creationId="{29C4E2A0-43E1-087D-8A9D-0E6A45035E7A}"/>
           </ac:spMkLst>
         </pc:spChg>
-        <pc:spChg chg="add mod">
-          <ac:chgData name="Fatima Pillosu" userId="a6295d4dc9e22643" providerId="LiveId" clId="{C1D7A64D-15B7-4FCE-91E9-6F95F059BEA6}" dt="2025-06-29T23:03:19.694" v="1886"/>
+        <pc:spChg chg="add del mod">
+          <ac:chgData name="Fatima Pillosu" userId="a6295d4dc9e22643" providerId="LiveId" clId="{C1D7A64D-15B7-4FCE-91E9-6F95F059BEA6}" dt="2025-07-09T12:48:35.001" v="2097" actId="21"/>
           <ac:spMkLst>
             <pc:docMk/>
             <pc:sldMk cId="3625231182" sldId="256"/>
             <ac:spMk id="89" creationId="{151BDCEA-207C-CE0D-3A4F-4A049384B2D2}"/>
           </ac:spMkLst>
         </pc:spChg>
-        <pc:spChg chg="add mod">
-          <ac:chgData name="Fatima Pillosu" userId="a6295d4dc9e22643" providerId="LiveId" clId="{C1D7A64D-15B7-4FCE-91E9-6F95F059BEA6}" dt="2025-06-29T23:03:19.694" v="1886"/>
+        <pc:spChg chg="add del mod">
+          <ac:chgData name="Fatima Pillosu" userId="a6295d4dc9e22643" providerId="LiveId" clId="{C1D7A64D-15B7-4FCE-91E9-6F95F059BEA6}" dt="2025-07-09T12:48:35.001" v="2097" actId="21"/>
           <ac:spMkLst>
             <pc:docMk/>
             <pc:sldMk cId="3625231182" sldId="256"/>
             <ac:spMk id="90" creationId="{DC152927-0AC6-09A7-D861-071860AB0F82}"/>
           </ac:spMkLst>
         </pc:spChg>
-        <pc:spChg chg="add mod">
-          <ac:chgData name="Fatima Pillosu" userId="a6295d4dc9e22643" providerId="LiveId" clId="{C1D7A64D-15B7-4FCE-91E9-6F95F059BEA6}" dt="2025-06-29T23:03:29.051" v="1888" actId="1035"/>
+        <pc:spChg chg="add del mod">
+          <ac:chgData name="Fatima Pillosu" userId="a6295d4dc9e22643" providerId="LiveId" clId="{C1D7A64D-15B7-4FCE-91E9-6F95F059BEA6}" dt="2025-07-09T12:46:37.359" v="1889" actId="478"/>
           <ac:spMkLst>
             <pc:docMk/>
             <pc:sldMk cId="3625231182" sldId="256"/>
             <ac:spMk id="91" creationId="{BF50A39A-E6EE-6AA9-14A0-307113E840A7}"/>
           </ac:spMkLst>
         </pc:spChg>
-        <pc:spChg chg="add mod">
-          <ac:chgData name="Fatima Pillosu" userId="a6295d4dc9e22643" providerId="LiveId" clId="{C1D7A64D-15B7-4FCE-91E9-6F95F059BEA6}" dt="2025-06-29T23:03:29.051" v="1888" actId="1035"/>
+        <pc:spChg chg="add del mod">
+          <ac:chgData name="Fatima Pillosu" userId="a6295d4dc9e22643" providerId="LiveId" clId="{C1D7A64D-15B7-4FCE-91E9-6F95F059BEA6}" dt="2025-07-09T12:46:37.359" v="1889" actId="478"/>
           <ac:spMkLst>
             <pc:docMk/>
             <pc:sldMk cId="3625231182" sldId="256"/>
             <ac:spMk id="92" creationId="{5952E807-CEB2-8EE7-CC88-867E9EF38F28}"/>
           </ac:spMkLst>
         </pc:spChg>
-        <pc:spChg chg="add mod">
-          <ac:chgData name="Fatima Pillosu" userId="a6295d4dc9e22643" providerId="LiveId" clId="{C1D7A64D-15B7-4FCE-91E9-6F95F059BEA6}" dt="2025-06-29T23:03:29.051" v="1888" actId="1035"/>
+        <pc:spChg chg="add del mod">
+          <ac:chgData name="Fatima Pillosu" userId="a6295d4dc9e22643" providerId="LiveId" clId="{C1D7A64D-15B7-4FCE-91E9-6F95F059BEA6}" dt="2025-07-09T12:48:35.001" v="2097" actId="21"/>
           <ac:spMkLst>
             <pc:docMk/>
             <pc:sldMk cId="3625231182" sldId="256"/>
             <ac:spMk id="93" creationId="{0D399520-912A-FB7B-7316-433D9E562933}"/>
           </ac:spMkLst>
         </pc:spChg>
-        <pc:spChg chg="add mod">
-          <ac:chgData name="Fatima Pillosu" userId="a6295d4dc9e22643" providerId="LiveId" clId="{C1D7A64D-15B7-4FCE-91E9-6F95F059BEA6}" dt="2025-06-29T23:03:29.051" v="1888" actId="1035"/>
+        <pc:spChg chg="add del mod">
+          <ac:chgData name="Fatima Pillosu" userId="a6295d4dc9e22643" providerId="LiveId" clId="{C1D7A64D-15B7-4FCE-91E9-6F95F059BEA6}" dt="2025-07-09T12:48:35.001" v="2097" actId="21"/>
           <ac:spMkLst>
             <pc:docMk/>
             <pc:sldMk cId="3625231182" sldId="256"/>
             <ac:spMk id="94" creationId="{33073E03-F303-77A5-81F7-498EB8604D87}"/>
           </ac:spMkLst>
         </pc:spChg>
+        <pc:picChg chg="add mod">
+          <ac:chgData name="Fatima Pillosu" userId="a6295d4dc9e22643" providerId="LiveId" clId="{C1D7A64D-15B7-4FCE-91E9-6F95F059BEA6}" dt="2025-07-09T12:48:49.330" v="2098"/>
+          <ac:picMkLst>
+            <pc:docMk/>
+            <pc:sldMk cId="3625231182" sldId="256"/>
+            <ac:picMk id="3" creationId="{90A4BF2E-8644-4CE4-DC7C-15BF4AF14321}"/>
+          </ac:picMkLst>
+        </pc:picChg>
+        <pc:picChg chg="add mod">
+          <ac:chgData name="Fatima Pillosu" userId="a6295d4dc9e22643" providerId="LiveId" clId="{C1D7A64D-15B7-4FCE-91E9-6F95F059BEA6}" dt="2025-07-09T12:48:49.330" v="2098"/>
+          <ac:picMkLst>
+            <pc:docMk/>
+            <pc:sldMk cId="3625231182" sldId="256"/>
+            <ac:picMk id="4" creationId="{41DFD3BD-157B-E27A-6ABB-07005E9F401C}"/>
+          </ac:picMkLst>
+        </pc:picChg>
+        <pc:picChg chg="add mod">
+          <ac:chgData name="Fatima Pillosu" userId="a6295d4dc9e22643" providerId="LiveId" clId="{C1D7A64D-15B7-4FCE-91E9-6F95F059BEA6}" dt="2025-07-09T12:48:49.330" v="2098"/>
+          <ac:picMkLst>
+            <pc:docMk/>
+            <pc:sldMk cId="3625231182" sldId="256"/>
+            <ac:picMk id="5" creationId="{4B8E4DFF-DFCA-245A-E8A1-6DF8299D0DBD}"/>
+          </ac:picMkLst>
+        </pc:picChg>
         <pc:picChg chg="del mod">
           <ac:chgData name="Fatima Pillosu" userId="a6295d4dc9e22643" providerId="LiveId" clId="{C1D7A64D-15B7-4FCE-91E9-6F95F059BEA6}" dt="2025-06-29T23:03:08.104" v="1885" actId="21"/>
           <ac:picMkLst>
             <pc:docMk/>
             <pc:sldMk cId="3625231182" sldId="256"/>
             <ac:picMk id="5" creationId="{90A4BF2E-8644-4CE4-DC7C-15BF4AF14321}"/>
+          </ac:picMkLst>
+        </pc:picChg>
+        <pc:picChg chg="add mod">
+          <ac:chgData name="Fatima Pillosu" userId="a6295d4dc9e22643" providerId="LiveId" clId="{C1D7A64D-15B7-4FCE-91E9-6F95F059BEA6}" dt="2025-07-09T12:48:49.330" v="2098"/>
+          <ac:picMkLst>
+            <pc:docMk/>
+            <pc:sldMk cId="3625231182" sldId="256"/>
+            <ac:picMk id="6" creationId="{772D0341-E5F7-2687-75CD-9E4921C16E7D}"/>
           </ac:picMkLst>
         </pc:picChg>
         <pc:picChg chg="del mod">
@@ -546,6 +711,14 @@
             <ac:picMk id="7" creationId="{1FB8DFBF-6153-EC85-40FD-067F60B7B5A1}"/>
           </ac:picMkLst>
         </pc:picChg>
+        <pc:picChg chg="add mod">
+          <ac:chgData name="Fatima Pillosu" userId="a6295d4dc9e22643" providerId="LiveId" clId="{C1D7A64D-15B7-4FCE-91E9-6F95F059BEA6}" dt="2025-07-09T12:48:49.330" v="2098"/>
+          <ac:picMkLst>
+            <pc:docMk/>
+            <pc:sldMk cId="3625231182" sldId="256"/>
+            <ac:picMk id="7" creationId="{BD9E0C66-19FB-2C77-C5A4-61A6DCAD8A49}"/>
+          </ac:picMkLst>
+        </pc:picChg>
         <pc:picChg chg="del mod">
           <ac:chgData name="Fatima Pillosu" userId="a6295d4dc9e22643" providerId="LiveId" clId="{C1D7A64D-15B7-4FCE-91E9-6F95F059BEA6}" dt="2025-06-29T23:03:08.104" v="1885" actId="21"/>
           <ac:picMkLst>
@@ -586,12 +759,36 @@
             <ac:picMk id="12" creationId="{772D0341-E5F7-2687-75CD-9E4921C16E7D}"/>
           </ac:picMkLst>
         </pc:picChg>
+        <pc:picChg chg="add mod">
+          <ac:chgData name="Fatima Pillosu" userId="a6295d4dc9e22643" providerId="LiveId" clId="{C1D7A64D-15B7-4FCE-91E9-6F95F059BEA6}" dt="2025-07-09T12:48:49.330" v="2098"/>
+          <ac:picMkLst>
+            <pc:docMk/>
+            <pc:sldMk cId="3625231182" sldId="256"/>
+            <ac:picMk id="12" creationId="{EB691A0B-FD3C-F64F-4893-DF1AE6C90CCA}"/>
+          </ac:picMkLst>
+        </pc:picChg>
+        <pc:picChg chg="add mod">
+          <ac:chgData name="Fatima Pillosu" userId="a6295d4dc9e22643" providerId="LiveId" clId="{C1D7A64D-15B7-4FCE-91E9-6F95F059BEA6}" dt="2025-07-09T12:48:49.330" v="2098"/>
+          <ac:picMkLst>
+            <pc:docMk/>
+            <pc:sldMk cId="3625231182" sldId="256"/>
+            <ac:picMk id="13" creationId="{46B84CE7-5B19-C530-DAD8-C842A0D3E521}"/>
+          </ac:picMkLst>
+        </pc:picChg>
         <pc:picChg chg="del mod">
           <ac:chgData name="Fatima Pillosu" userId="a6295d4dc9e22643" providerId="LiveId" clId="{C1D7A64D-15B7-4FCE-91E9-6F95F059BEA6}" dt="2025-06-29T23:03:08.104" v="1885" actId="21"/>
           <ac:picMkLst>
             <pc:docMk/>
             <pc:sldMk cId="3625231182" sldId="256"/>
             <ac:picMk id="13" creationId="{BD9E0C66-19FB-2C77-C5A4-61A6DCAD8A49}"/>
+          </ac:picMkLst>
+        </pc:picChg>
+        <pc:picChg chg="add mod">
+          <ac:chgData name="Fatima Pillosu" userId="a6295d4dc9e22643" providerId="LiveId" clId="{C1D7A64D-15B7-4FCE-91E9-6F95F059BEA6}" dt="2025-07-09T12:48:49.330" v="2098"/>
+          <ac:picMkLst>
+            <pc:docMk/>
+            <pc:sldMk cId="3625231182" sldId="256"/>
+            <ac:picMk id="14" creationId="{DDA6905E-87E1-D835-2A09-349AD4DCAFAF}"/>
           </ac:picMkLst>
         </pc:picChg>
         <pc:picChg chg="del mod">
@@ -618,6 +815,14 @@
             <ac:picMk id="21" creationId="{DDA6905E-87E1-D835-2A09-349AD4DCAFAF}"/>
           </ac:picMkLst>
         </pc:picChg>
+        <pc:picChg chg="add mod">
+          <ac:chgData name="Fatima Pillosu" userId="a6295d4dc9e22643" providerId="LiveId" clId="{C1D7A64D-15B7-4FCE-91E9-6F95F059BEA6}" dt="2025-07-09T12:48:49.330" v="2098"/>
+          <ac:picMkLst>
+            <pc:docMk/>
+            <pc:sldMk cId="3625231182" sldId="256"/>
+            <ac:picMk id="25" creationId="{0214E89D-0E4B-1C85-2C15-57E6763586F2}"/>
+          </ac:picMkLst>
+        </pc:picChg>
         <pc:picChg chg="add del mod">
           <ac:chgData name="Fatima Pillosu" userId="a6295d4dc9e22643" providerId="LiveId" clId="{C1D7A64D-15B7-4FCE-91E9-6F95F059BEA6}" dt="2025-06-29T22:26:26.028" v="830" actId="478"/>
           <ac:picMkLst>
@@ -650,110 +855,134 @@
             <ac:picMk id="49" creationId="{0214E89D-0E4B-1C85-2C15-57E6763586F2}"/>
           </ac:picMkLst>
         </pc:picChg>
-        <pc:picChg chg="add mod">
-          <ac:chgData name="Fatima Pillosu" userId="a6295d4dc9e22643" providerId="LiveId" clId="{C1D7A64D-15B7-4FCE-91E9-6F95F059BEA6}" dt="2025-06-29T23:03:19.694" v="1886"/>
+        <pc:picChg chg="add del mod">
+          <ac:chgData name="Fatima Pillosu" userId="a6295d4dc9e22643" providerId="LiveId" clId="{C1D7A64D-15B7-4FCE-91E9-6F95F059BEA6}" dt="2025-07-09T12:48:35.001" v="2097" actId="21"/>
           <ac:picMkLst>
             <pc:docMk/>
             <pc:sldMk cId="3625231182" sldId="256"/>
             <ac:picMk id="60" creationId="{90A4BF2E-8644-4CE4-DC7C-15BF4AF14321}"/>
           </ac:picMkLst>
         </pc:picChg>
-        <pc:picChg chg="add mod">
-          <ac:chgData name="Fatima Pillosu" userId="a6295d4dc9e22643" providerId="LiveId" clId="{C1D7A64D-15B7-4FCE-91E9-6F95F059BEA6}" dt="2025-06-29T23:03:19.694" v="1886"/>
+        <pc:picChg chg="add del mod">
+          <ac:chgData name="Fatima Pillosu" userId="a6295d4dc9e22643" providerId="LiveId" clId="{C1D7A64D-15B7-4FCE-91E9-6F95F059BEA6}" dt="2025-07-09T12:46:39.493" v="1890" actId="478"/>
           <ac:picMkLst>
             <pc:docMk/>
             <pc:sldMk cId="3625231182" sldId="256"/>
             <ac:picMk id="61" creationId="{DC7AD9A6-D303-C5E8-1F66-7B1C068297BC}"/>
           </ac:picMkLst>
         </pc:picChg>
-        <pc:picChg chg="add mod">
-          <ac:chgData name="Fatima Pillosu" userId="a6295d4dc9e22643" providerId="LiveId" clId="{C1D7A64D-15B7-4FCE-91E9-6F95F059BEA6}" dt="2025-06-29T23:03:19.694" v="1886"/>
+        <pc:picChg chg="add del mod">
+          <ac:chgData name="Fatima Pillosu" userId="a6295d4dc9e22643" providerId="LiveId" clId="{C1D7A64D-15B7-4FCE-91E9-6F95F059BEA6}" dt="2025-07-09T12:46:39.493" v="1890" actId="478"/>
           <ac:picMkLst>
             <pc:docMk/>
             <pc:sldMk cId="3625231182" sldId="256"/>
             <ac:picMk id="62" creationId="{1FB8DFBF-6153-EC85-40FD-067F60B7B5A1}"/>
           </ac:picMkLst>
         </pc:picChg>
-        <pc:picChg chg="add mod">
-          <ac:chgData name="Fatima Pillosu" userId="a6295d4dc9e22643" providerId="LiveId" clId="{C1D7A64D-15B7-4FCE-91E9-6F95F059BEA6}" dt="2025-06-29T23:03:19.694" v="1886"/>
+        <pc:picChg chg="add del mod">
+          <ac:chgData name="Fatima Pillosu" userId="a6295d4dc9e22643" providerId="LiveId" clId="{C1D7A64D-15B7-4FCE-91E9-6F95F059BEA6}" dt="2025-07-09T12:48:35.001" v="2097" actId="21"/>
           <ac:picMkLst>
             <pc:docMk/>
             <pc:sldMk cId="3625231182" sldId="256"/>
             <ac:picMk id="63" creationId="{41DFD3BD-157B-E27A-6ABB-07005E9F401C}"/>
           </ac:picMkLst>
         </pc:picChg>
-        <pc:picChg chg="add mod">
-          <ac:chgData name="Fatima Pillosu" userId="a6295d4dc9e22643" providerId="LiveId" clId="{C1D7A64D-15B7-4FCE-91E9-6F95F059BEA6}" dt="2025-06-29T23:03:19.694" v="1886"/>
+        <pc:picChg chg="add del mod">
+          <ac:chgData name="Fatima Pillosu" userId="a6295d4dc9e22643" providerId="LiveId" clId="{C1D7A64D-15B7-4FCE-91E9-6F95F059BEA6}" dt="2025-07-09T12:46:37.359" v="1889" actId="478"/>
           <ac:picMkLst>
             <pc:docMk/>
             <pc:sldMk cId="3625231182" sldId="256"/>
             <ac:picMk id="64" creationId="{0E8EE9BD-0766-80FC-EA19-267A359FC5B1}"/>
           </ac:picMkLst>
         </pc:picChg>
-        <pc:picChg chg="add mod">
-          <ac:chgData name="Fatima Pillosu" userId="a6295d4dc9e22643" providerId="LiveId" clId="{C1D7A64D-15B7-4FCE-91E9-6F95F059BEA6}" dt="2025-06-29T23:03:19.694" v="1886"/>
+        <pc:picChg chg="add del mod">
+          <ac:chgData name="Fatima Pillosu" userId="a6295d4dc9e22643" providerId="LiveId" clId="{C1D7A64D-15B7-4FCE-91E9-6F95F059BEA6}" dt="2025-07-09T12:46:37.359" v="1889" actId="478"/>
           <ac:picMkLst>
             <pc:docMk/>
             <pc:sldMk cId="3625231182" sldId="256"/>
             <ac:picMk id="65" creationId="{E681C30E-1CA1-E743-12C6-848A12B20F27}"/>
           </ac:picMkLst>
         </pc:picChg>
-        <pc:picChg chg="add mod">
-          <ac:chgData name="Fatima Pillosu" userId="a6295d4dc9e22643" providerId="LiveId" clId="{C1D7A64D-15B7-4FCE-91E9-6F95F059BEA6}" dt="2025-06-29T23:03:19.694" v="1886"/>
+        <pc:picChg chg="add del mod">
+          <ac:chgData name="Fatima Pillosu" userId="a6295d4dc9e22643" providerId="LiveId" clId="{C1D7A64D-15B7-4FCE-91E9-6F95F059BEA6}" dt="2025-07-09T12:48:35.001" v="2097" actId="21"/>
           <ac:picMkLst>
             <pc:docMk/>
             <pc:sldMk cId="3625231182" sldId="256"/>
             <ac:picMk id="66" creationId="{4B8E4DFF-DFCA-245A-E8A1-6DF8299D0DBD}"/>
           </ac:picMkLst>
         </pc:picChg>
-        <pc:picChg chg="add mod">
-          <ac:chgData name="Fatima Pillosu" userId="a6295d4dc9e22643" providerId="LiveId" clId="{C1D7A64D-15B7-4FCE-91E9-6F95F059BEA6}" dt="2025-06-29T23:03:19.694" v="1886"/>
+        <pc:picChg chg="add del mod">
+          <ac:chgData name="Fatima Pillosu" userId="a6295d4dc9e22643" providerId="LiveId" clId="{C1D7A64D-15B7-4FCE-91E9-6F95F059BEA6}" dt="2025-07-09T12:48:35.001" v="2097" actId="21"/>
           <ac:picMkLst>
             <pc:docMk/>
             <pc:sldMk cId="3625231182" sldId="256"/>
             <ac:picMk id="67" creationId="{772D0341-E5F7-2687-75CD-9E4921C16E7D}"/>
           </ac:picMkLst>
         </pc:picChg>
-        <pc:picChg chg="add mod">
-          <ac:chgData name="Fatima Pillosu" userId="a6295d4dc9e22643" providerId="LiveId" clId="{C1D7A64D-15B7-4FCE-91E9-6F95F059BEA6}" dt="2025-06-29T23:03:19.694" v="1886"/>
+        <pc:picChg chg="add del mod">
+          <ac:chgData name="Fatima Pillosu" userId="a6295d4dc9e22643" providerId="LiveId" clId="{C1D7A64D-15B7-4FCE-91E9-6F95F059BEA6}" dt="2025-07-09T12:48:35.001" v="2097" actId="21"/>
           <ac:picMkLst>
             <pc:docMk/>
             <pc:sldMk cId="3625231182" sldId="256"/>
             <ac:picMk id="68" creationId="{BD9E0C66-19FB-2C77-C5A4-61A6DCAD8A49}"/>
           </ac:picMkLst>
         </pc:picChg>
-        <pc:picChg chg="add mod">
-          <ac:chgData name="Fatima Pillosu" userId="a6295d4dc9e22643" providerId="LiveId" clId="{C1D7A64D-15B7-4FCE-91E9-6F95F059BEA6}" dt="2025-06-29T23:03:19.694" v="1886"/>
+        <pc:picChg chg="add del mod">
+          <ac:chgData name="Fatima Pillosu" userId="a6295d4dc9e22643" providerId="LiveId" clId="{C1D7A64D-15B7-4FCE-91E9-6F95F059BEA6}" dt="2025-07-09T12:48:35.001" v="2097" actId="21"/>
           <ac:picMkLst>
             <pc:docMk/>
             <pc:sldMk cId="3625231182" sldId="256"/>
             <ac:picMk id="73" creationId="{EB691A0B-FD3C-F64F-4893-DF1AE6C90CCA}"/>
           </ac:picMkLst>
         </pc:picChg>
-        <pc:picChg chg="add mod">
-          <ac:chgData name="Fatima Pillosu" userId="a6295d4dc9e22643" providerId="LiveId" clId="{C1D7A64D-15B7-4FCE-91E9-6F95F059BEA6}" dt="2025-06-29T23:03:19.694" v="1886"/>
+        <pc:picChg chg="add del mod">
+          <ac:chgData name="Fatima Pillosu" userId="a6295d4dc9e22643" providerId="LiveId" clId="{C1D7A64D-15B7-4FCE-91E9-6F95F059BEA6}" dt="2025-07-09T12:48:35.001" v="2097" actId="21"/>
           <ac:picMkLst>
             <pc:docMk/>
             <pc:sldMk cId="3625231182" sldId="256"/>
             <ac:picMk id="74" creationId="{46B84CE7-5B19-C530-DAD8-C842A0D3E521}"/>
           </ac:picMkLst>
         </pc:picChg>
-        <pc:picChg chg="add mod">
-          <ac:chgData name="Fatima Pillosu" userId="a6295d4dc9e22643" providerId="LiveId" clId="{C1D7A64D-15B7-4FCE-91E9-6F95F059BEA6}" dt="2025-06-29T23:03:19.694" v="1886"/>
+        <pc:picChg chg="add del mod">
+          <ac:chgData name="Fatima Pillosu" userId="a6295d4dc9e22643" providerId="LiveId" clId="{C1D7A64D-15B7-4FCE-91E9-6F95F059BEA6}" dt="2025-07-09T12:48:35.001" v="2097" actId="21"/>
           <ac:picMkLst>
             <pc:docMk/>
             <pc:sldMk cId="3625231182" sldId="256"/>
             <ac:picMk id="75" creationId="{DDA6905E-87E1-D835-2A09-349AD4DCAFAF}"/>
           </ac:picMkLst>
         </pc:picChg>
-        <pc:picChg chg="add mod">
-          <ac:chgData name="Fatima Pillosu" userId="a6295d4dc9e22643" providerId="LiveId" clId="{C1D7A64D-15B7-4FCE-91E9-6F95F059BEA6}" dt="2025-06-29T23:03:19.694" v="1886"/>
+        <pc:picChg chg="add del mod">
+          <ac:chgData name="Fatima Pillosu" userId="a6295d4dc9e22643" providerId="LiveId" clId="{C1D7A64D-15B7-4FCE-91E9-6F95F059BEA6}" dt="2025-07-09T12:48:35.001" v="2097" actId="21"/>
           <ac:picMkLst>
             <pc:docMk/>
             <pc:sldMk cId="3625231182" sldId="256"/>
             <ac:picMk id="86" creationId="{0214E89D-0E4B-1C85-2C15-57E6763586F2}"/>
           </ac:picMkLst>
         </pc:picChg>
+        <pc:cxnChg chg="add mod">
+          <ac:chgData name="Fatima Pillosu" userId="a6295d4dc9e22643" providerId="LiveId" clId="{C1D7A64D-15B7-4FCE-91E9-6F95F059BEA6}" dt="2025-07-09T12:48:49.330" v="2098"/>
+          <ac:cxnSpMkLst>
+            <pc:docMk/>
+            <pc:sldMk cId="3625231182" sldId="256"/>
+            <ac:cxnSpMk id="22" creationId="{FBA798FD-722F-8374-9D1E-0A705D72B06B}"/>
+          </ac:cxnSpMkLst>
+        </pc:cxnChg>
+        <pc:cxnChg chg="add mod">
+          <ac:chgData name="Fatima Pillosu" userId="a6295d4dc9e22643" providerId="LiveId" clId="{C1D7A64D-15B7-4FCE-91E9-6F95F059BEA6}" dt="2025-07-09T12:48:49.330" v="2098"/>
+          <ac:cxnSpMkLst>
+            <pc:docMk/>
+            <pc:sldMk cId="3625231182" sldId="256"/>
+            <ac:cxnSpMk id="23" creationId="{47D27A78-60CD-0D6E-2AD5-D6B4159D41E8}"/>
+          </ac:cxnSpMkLst>
+        </pc:cxnChg>
+        <pc:cxnChg chg="add mod">
+          <ac:chgData name="Fatima Pillosu" userId="a6295d4dc9e22643" providerId="LiveId" clId="{C1D7A64D-15B7-4FCE-91E9-6F95F059BEA6}" dt="2025-07-09T12:48:49.330" v="2098"/>
+          <ac:cxnSpMkLst>
+            <pc:docMk/>
+            <pc:sldMk cId="3625231182" sldId="256"/>
+            <ac:cxnSpMk id="24" creationId="{181C78C6-3A56-E166-ACC7-87B32FAB6D8E}"/>
+          </ac:cxnSpMkLst>
+        </pc:cxnChg>
         <pc:cxnChg chg="add del mod">
           <ac:chgData name="Fatima Pillosu" userId="a6295d4dc9e22643" providerId="LiveId" clId="{C1D7A64D-15B7-4FCE-91E9-6F95F059BEA6}" dt="2025-06-29T23:03:08.104" v="1885" actId="21"/>
           <ac:cxnSpMkLst>
@@ -778,24 +1007,24 @@
             <ac:cxnSpMk id="43" creationId="{181C78C6-3A56-E166-ACC7-87B32FAB6D8E}"/>
           </ac:cxnSpMkLst>
         </pc:cxnChg>
-        <pc:cxnChg chg="add mod">
-          <ac:chgData name="Fatima Pillosu" userId="a6295d4dc9e22643" providerId="LiveId" clId="{C1D7A64D-15B7-4FCE-91E9-6F95F059BEA6}" dt="2025-06-29T23:03:19.694" v="1886"/>
+        <pc:cxnChg chg="add del mod">
+          <ac:chgData name="Fatima Pillosu" userId="a6295d4dc9e22643" providerId="LiveId" clId="{C1D7A64D-15B7-4FCE-91E9-6F95F059BEA6}" dt="2025-07-09T12:48:35.001" v="2097" actId="21"/>
           <ac:cxnSpMkLst>
             <pc:docMk/>
             <pc:sldMk cId="3625231182" sldId="256"/>
             <ac:cxnSpMk id="83" creationId="{FBA798FD-722F-8374-9D1E-0A705D72B06B}"/>
           </ac:cxnSpMkLst>
         </pc:cxnChg>
-        <pc:cxnChg chg="add mod">
-          <ac:chgData name="Fatima Pillosu" userId="a6295d4dc9e22643" providerId="LiveId" clId="{C1D7A64D-15B7-4FCE-91E9-6F95F059BEA6}" dt="2025-06-29T23:03:19.694" v="1886"/>
+        <pc:cxnChg chg="add del mod">
+          <ac:chgData name="Fatima Pillosu" userId="a6295d4dc9e22643" providerId="LiveId" clId="{C1D7A64D-15B7-4FCE-91E9-6F95F059BEA6}" dt="2025-07-09T12:48:35.001" v="2097" actId="21"/>
           <ac:cxnSpMkLst>
             <pc:docMk/>
             <pc:sldMk cId="3625231182" sldId="256"/>
             <ac:cxnSpMk id="84" creationId="{47D27A78-60CD-0D6E-2AD5-D6B4159D41E8}"/>
           </ac:cxnSpMkLst>
         </pc:cxnChg>
-        <pc:cxnChg chg="add mod">
-          <ac:chgData name="Fatima Pillosu" userId="a6295d4dc9e22643" providerId="LiveId" clId="{C1D7A64D-15B7-4FCE-91E9-6F95F059BEA6}" dt="2025-06-29T23:03:19.694" v="1886"/>
+        <pc:cxnChg chg="add del mod">
+          <ac:chgData name="Fatima Pillosu" userId="a6295d4dc9e22643" providerId="LiveId" clId="{C1D7A64D-15B7-4FCE-91E9-6F95F059BEA6}" dt="2025-07-09T12:48:35.001" v="2097" actId="21"/>
           <ac:cxnSpMkLst>
             <pc:docMk/>
             <pc:sldMk cId="3625231182" sldId="256"/>
@@ -837,15 +1066,15 @@
         </p:nvSpPr>
         <p:spPr>
           <a:xfrm>
-            <a:off x="310515" y="609766"/>
-            <a:ext cx="3519170" cy="1297152"/>
+            <a:off x="310515" y="477264"/>
+            <a:ext cx="3519170" cy="1015283"/>
           </a:xfrm>
         </p:spPr>
         <p:txBody>
           <a:bodyPr anchor="b"/>
           <a:lstStyle>
             <a:lvl1pPr algn="ctr">
-              <a:defRPr sz="2717"/>
+              <a:defRPr sz="2551"/>
             </a:lvl1pPr>
           </a:lstStyle>
           <a:p>
@@ -869,8 +1098,8 @@
         </p:nvSpPr>
         <p:spPr>
           <a:xfrm>
-            <a:off x="517525" y="1956941"/>
-            <a:ext cx="3105150" cy="899554"/>
+            <a:off x="517525" y="1531700"/>
+            <a:ext cx="3105150" cy="704082"/>
           </a:xfrm>
         </p:spPr>
         <p:txBody>
@@ -878,39 +1107,39 @@
           <a:lstStyle>
             <a:lvl1pPr marL="0" indent="0" algn="ctr">
               <a:buNone/>
-              <a:defRPr sz="1087"/>
+              <a:defRPr sz="1020"/>
             </a:lvl1pPr>
-            <a:lvl2pPr marL="207020" indent="0" algn="ctr">
-              <a:buNone/>
-              <a:defRPr sz="906"/>
+            <a:lvl2pPr marL="194401" indent="0" algn="ctr">
+              <a:buNone/>
+              <a:defRPr sz="850"/>
             </a:lvl2pPr>
-            <a:lvl3pPr marL="414040" indent="0" algn="ctr">
-              <a:buNone/>
-              <a:defRPr sz="815"/>
+            <a:lvl3pPr marL="388803" indent="0" algn="ctr">
+              <a:buNone/>
+              <a:defRPr sz="765"/>
             </a:lvl3pPr>
-            <a:lvl4pPr marL="621060" indent="0" algn="ctr">
-              <a:buNone/>
-              <a:defRPr sz="724"/>
+            <a:lvl4pPr marL="583204" indent="0" algn="ctr">
+              <a:buNone/>
+              <a:defRPr sz="680"/>
             </a:lvl4pPr>
-            <a:lvl5pPr marL="828081" indent="0" algn="ctr">
-              <a:buNone/>
-              <a:defRPr sz="724"/>
+            <a:lvl5pPr marL="777606" indent="0" algn="ctr">
+              <a:buNone/>
+              <a:defRPr sz="680"/>
             </a:lvl5pPr>
-            <a:lvl6pPr marL="1035101" indent="0" algn="ctr">
-              <a:buNone/>
-              <a:defRPr sz="724"/>
+            <a:lvl6pPr marL="972007" indent="0" algn="ctr">
+              <a:buNone/>
+              <a:defRPr sz="680"/>
             </a:lvl6pPr>
-            <a:lvl7pPr marL="1242121" indent="0" algn="ctr">
-              <a:buNone/>
-              <a:defRPr sz="724"/>
+            <a:lvl7pPr marL="1166409" indent="0" algn="ctr">
+              <a:buNone/>
+              <a:defRPr sz="680"/>
             </a:lvl7pPr>
-            <a:lvl8pPr marL="1449141" indent="0" algn="ctr">
-              <a:buNone/>
-              <a:defRPr sz="724"/>
+            <a:lvl8pPr marL="1360810" indent="0" algn="ctr">
+              <a:buNone/>
+              <a:defRPr sz="680"/>
             </a:lvl8pPr>
-            <a:lvl9pPr marL="1656161" indent="0" algn="ctr">
-              <a:buNone/>
-              <a:defRPr sz="724"/>
+            <a:lvl9pPr marL="1555212" indent="0" algn="ctr">
+              <a:buNone/>
+              <a:defRPr sz="680"/>
             </a:lvl9pPr>
           </a:lstStyle>
           <a:p>
@@ -939,7 +1168,7 @@
           <a:p>
             <a:fld id="{229EEE7B-5B8B-48DD-91DD-513D1D569173}" type="datetimeFigureOut">
               <a:rPr lang="en-GB" smtClean="0"/>
-              <a:t>29/06/2025</a:t>
+              <a:t>09/07/2025</a:t>
             </a:fld>
             <a:endParaRPr lang="en-GB"/>
           </a:p>
@@ -990,7 +1219,7 @@
     </p:spTree>
     <p:extLst>
       <p:ext uri="{BB962C8B-B14F-4D97-AF65-F5344CB8AC3E}">
-        <p14:creationId xmlns:p14="http://schemas.microsoft.com/office/powerpoint/2010/main" val="4197090488"/>
+        <p14:creationId xmlns:p14="http://schemas.microsoft.com/office/powerpoint/2010/main" val="2567129997"/>
       </p:ext>
     </p:extLst>
   </p:cSld>
@@ -1109,7 +1338,7 @@
           <a:p>
             <a:fld id="{229EEE7B-5B8B-48DD-91DD-513D1D569173}" type="datetimeFigureOut">
               <a:rPr lang="en-GB" smtClean="0"/>
-              <a:t>29/06/2025</a:t>
+              <a:t>09/07/2025</a:t>
             </a:fld>
             <a:endParaRPr lang="en-GB"/>
           </a:p>
@@ -1160,7 +1389,7 @@
     </p:spTree>
     <p:extLst>
       <p:ext uri="{BB962C8B-B14F-4D97-AF65-F5344CB8AC3E}">
-        <p14:creationId xmlns:p14="http://schemas.microsoft.com/office/powerpoint/2010/main" val="3332415091"/>
+        <p14:creationId xmlns:p14="http://schemas.microsoft.com/office/powerpoint/2010/main" val="1549858134"/>
       </p:ext>
     </p:extLst>
   </p:cSld>
@@ -1199,8 +1428,8 @@
         </p:nvSpPr>
         <p:spPr>
           <a:xfrm>
-            <a:off x="2962831" y="198368"/>
-            <a:ext cx="892731" cy="3157497"/>
+            <a:off x="2962831" y="155263"/>
+            <a:ext cx="892731" cy="2471377"/>
           </a:xfrm>
         </p:spPr>
         <p:txBody>
@@ -1227,8 +1456,8 @@
         </p:nvSpPr>
         <p:spPr>
           <a:xfrm>
-            <a:off x="284639" y="198368"/>
-            <a:ext cx="2626439" cy="3157497"/>
+            <a:off x="284639" y="155263"/>
+            <a:ext cx="2626439" cy="2471377"/>
           </a:xfrm>
         </p:spPr>
         <p:txBody>
@@ -1289,7 +1518,7 @@
           <a:p>
             <a:fld id="{229EEE7B-5B8B-48DD-91DD-513D1D569173}" type="datetimeFigureOut">
               <a:rPr lang="en-GB" smtClean="0"/>
-              <a:t>29/06/2025</a:t>
+              <a:t>09/07/2025</a:t>
             </a:fld>
             <a:endParaRPr lang="en-GB"/>
           </a:p>
@@ -1340,7 +1569,7 @@
     </p:spTree>
     <p:extLst>
       <p:ext uri="{BB962C8B-B14F-4D97-AF65-F5344CB8AC3E}">
-        <p14:creationId xmlns:p14="http://schemas.microsoft.com/office/powerpoint/2010/main" val="1652028017"/>
+        <p14:creationId xmlns:p14="http://schemas.microsoft.com/office/powerpoint/2010/main" val="2564922381"/>
       </p:ext>
     </p:extLst>
   </p:cSld>
@@ -1459,7 +1688,7 @@
           <a:p>
             <a:fld id="{229EEE7B-5B8B-48DD-91DD-513D1D569173}" type="datetimeFigureOut">
               <a:rPr lang="en-GB" smtClean="0"/>
-              <a:t>29/06/2025</a:t>
+              <a:t>09/07/2025</a:t>
             </a:fld>
             <a:endParaRPr lang="en-GB"/>
           </a:p>
@@ -1510,7 +1739,7 @@
     </p:spTree>
     <p:extLst>
       <p:ext uri="{BB962C8B-B14F-4D97-AF65-F5344CB8AC3E}">
-        <p14:creationId xmlns:p14="http://schemas.microsoft.com/office/powerpoint/2010/main" val="686904512"/>
+        <p14:creationId xmlns:p14="http://schemas.microsoft.com/office/powerpoint/2010/main" val="3083910373"/>
       </p:ext>
     </p:extLst>
   </p:cSld>
@@ -1549,15 +1778,15 @@
         </p:nvSpPr>
         <p:spPr>
           <a:xfrm>
-            <a:off x="282482" y="928880"/>
-            <a:ext cx="3570923" cy="1549855"/>
+            <a:off x="282482" y="727035"/>
+            <a:ext cx="3570923" cy="1213074"/>
           </a:xfrm>
         </p:spPr>
         <p:txBody>
           <a:bodyPr anchor="b"/>
           <a:lstStyle>
             <a:lvl1pPr>
-              <a:defRPr sz="2717"/>
+              <a:defRPr sz="2551"/>
             </a:lvl1pPr>
           </a:lstStyle>
           <a:p>
@@ -1581,8 +1810,8 @@
         </p:nvSpPr>
         <p:spPr>
           <a:xfrm>
-            <a:off x="282482" y="2493397"/>
-            <a:ext cx="3570923" cy="815032"/>
+            <a:off x="282482" y="1951585"/>
+            <a:ext cx="3570923" cy="637927"/>
           </a:xfrm>
         </p:spPr>
         <p:txBody>
@@ -1590,7 +1819,7 @@
           <a:lstStyle>
             <a:lvl1pPr marL="0" indent="0">
               <a:buNone/>
-              <a:defRPr sz="1087">
+              <a:defRPr sz="1020">
                 <a:solidFill>
                   <a:schemeClr val="tx1">
                     <a:tint val="82000"/>
@@ -1598,9 +1827,9 @@
                 </a:solidFill>
               </a:defRPr>
             </a:lvl1pPr>
-            <a:lvl2pPr marL="207020" indent="0">
-              <a:buNone/>
-              <a:defRPr sz="906">
+            <a:lvl2pPr marL="194401" indent="0">
+              <a:buNone/>
+              <a:defRPr sz="850">
                 <a:solidFill>
                   <a:schemeClr val="tx1">
                     <a:tint val="82000"/>
@@ -1608,9 +1837,9 @@
                 </a:solidFill>
               </a:defRPr>
             </a:lvl2pPr>
-            <a:lvl3pPr marL="414040" indent="0">
-              <a:buNone/>
-              <a:defRPr sz="815">
+            <a:lvl3pPr marL="388803" indent="0">
+              <a:buNone/>
+              <a:defRPr sz="765">
                 <a:solidFill>
                   <a:schemeClr val="tx1">
                     <a:tint val="82000"/>
@@ -1618,9 +1847,9 @@
                 </a:solidFill>
               </a:defRPr>
             </a:lvl3pPr>
-            <a:lvl4pPr marL="621060" indent="0">
-              <a:buNone/>
-              <a:defRPr sz="724">
+            <a:lvl4pPr marL="583204" indent="0">
+              <a:buNone/>
+              <a:defRPr sz="680">
                 <a:solidFill>
                   <a:schemeClr val="tx1">
                     <a:tint val="82000"/>
@@ -1628,9 +1857,9 @@
                 </a:solidFill>
               </a:defRPr>
             </a:lvl4pPr>
-            <a:lvl5pPr marL="828081" indent="0">
-              <a:buNone/>
-              <a:defRPr sz="724">
+            <a:lvl5pPr marL="777606" indent="0">
+              <a:buNone/>
+              <a:defRPr sz="680">
                 <a:solidFill>
                   <a:schemeClr val="tx1">
                     <a:tint val="82000"/>
@@ -1638,9 +1867,9 @@
                 </a:solidFill>
               </a:defRPr>
             </a:lvl5pPr>
-            <a:lvl6pPr marL="1035101" indent="0">
-              <a:buNone/>
-              <a:defRPr sz="724">
+            <a:lvl6pPr marL="972007" indent="0">
+              <a:buNone/>
+              <a:defRPr sz="680">
                 <a:solidFill>
                   <a:schemeClr val="tx1">
                     <a:tint val="82000"/>
@@ -1648,9 +1877,9 @@
                 </a:solidFill>
               </a:defRPr>
             </a:lvl6pPr>
-            <a:lvl7pPr marL="1242121" indent="0">
-              <a:buNone/>
-              <a:defRPr sz="724">
+            <a:lvl7pPr marL="1166409" indent="0">
+              <a:buNone/>
+              <a:defRPr sz="680">
                 <a:solidFill>
                   <a:schemeClr val="tx1">
                     <a:tint val="82000"/>
@@ -1658,9 +1887,9 @@
                 </a:solidFill>
               </a:defRPr>
             </a:lvl7pPr>
-            <a:lvl8pPr marL="1449141" indent="0">
-              <a:buNone/>
-              <a:defRPr sz="724">
+            <a:lvl8pPr marL="1360810" indent="0">
+              <a:buNone/>
+              <a:defRPr sz="680">
                 <a:solidFill>
                   <a:schemeClr val="tx1">
                     <a:tint val="82000"/>
@@ -1668,9 +1897,9 @@
                 </a:solidFill>
               </a:defRPr>
             </a:lvl8pPr>
-            <a:lvl9pPr marL="1656161" indent="0">
-              <a:buNone/>
-              <a:defRPr sz="724">
+            <a:lvl9pPr marL="1555212" indent="0">
+              <a:buNone/>
+              <a:defRPr sz="680">
                 <a:solidFill>
                   <a:schemeClr val="tx1">
                     <a:tint val="82000"/>
@@ -1705,7 +1934,7 @@
           <a:p>
             <a:fld id="{229EEE7B-5B8B-48DD-91DD-513D1D569173}" type="datetimeFigureOut">
               <a:rPr lang="en-GB" smtClean="0"/>
-              <a:t>29/06/2025</a:t>
+              <a:t>09/07/2025</a:t>
             </a:fld>
             <a:endParaRPr lang="en-GB"/>
           </a:p>
@@ -1756,7 +1985,7 @@
     </p:spTree>
     <p:extLst>
       <p:ext uri="{BB962C8B-B14F-4D97-AF65-F5344CB8AC3E}">
-        <p14:creationId xmlns:p14="http://schemas.microsoft.com/office/powerpoint/2010/main" val="3746408254"/>
+        <p14:creationId xmlns:p14="http://schemas.microsoft.com/office/powerpoint/2010/main" val="263730783"/>
       </p:ext>
     </p:extLst>
   </p:cSld>
@@ -1818,8 +2047,8 @@
         </p:nvSpPr>
         <p:spPr>
           <a:xfrm>
-            <a:off x="284639" y="991838"/>
-            <a:ext cx="1759585" cy="2364026"/>
+            <a:off x="284639" y="776313"/>
+            <a:ext cx="1759585" cy="1850326"/>
           </a:xfrm>
         </p:spPr>
         <p:txBody>
@@ -1875,8 +2104,8 @@
         </p:nvSpPr>
         <p:spPr>
           <a:xfrm>
-            <a:off x="2095976" y="991838"/>
-            <a:ext cx="1759585" cy="2364026"/>
+            <a:off x="2095976" y="776313"/>
+            <a:ext cx="1759585" cy="1850326"/>
           </a:xfrm>
         </p:spPr>
         <p:txBody>
@@ -1937,7 +2166,7 @@
           <a:p>
             <a:fld id="{229EEE7B-5B8B-48DD-91DD-513D1D569173}" type="datetimeFigureOut">
               <a:rPr lang="en-GB" smtClean="0"/>
-              <a:t>29/06/2025</a:t>
+              <a:t>09/07/2025</a:t>
             </a:fld>
             <a:endParaRPr lang="en-GB"/>
           </a:p>
@@ -1988,7 +2217,7 @@
     </p:spTree>
     <p:extLst>
       <p:ext uri="{BB962C8B-B14F-4D97-AF65-F5344CB8AC3E}">
-        <p14:creationId xmlns:p14="http://schemas.microsoft.com/office/powerpoint/2010/main" val="378560073"/>
+        <p14:creationId xmlns:p14="http://schemas.microsoft.com/office/powerpoint/2010/main" val="3830800204"/>
       </p:ext>
     </p:extLst>
   </p:cSld>
@@ -2027,8 +2256,8 @@
         </p:nvSpPr>
         <p:spPr>
           <a:xfrm>
-            <a:off x="285178" y="198369"/>
-            <a:ext cx="3570923" cy="720161"/>
+            <a:off x="285178" y="155263"/>
+            <a:ext cx="3570923" cy="563671"/>
           </a:xfrm>
         </p:spPr>
         <p:txBody>
@@ -2055,8 +2284,8 @@
         </p:nvSpPr>
         <p:spPr>
           <a:xfrm>
-            <a:off x="285179" y="913354"/>
-            <a:ext cx="1751498" cy="447621"/>
+            <a:off x="285179" y="714884"/>
+            <a:ext cx="1751498" cy="350353"/>
           </a:xfrm>
         </p:spPr>
         <p:txBody>
@@ -2064,39 +2293,39 @@
           <a:lstStyle>
             <a:lvl1pPr marL="0" indent="0">
               <a:buNone/>
-              <a:defRPr sz="1087" b="1"/>
+              <a:defRPr sz="1020" b="1"/>
             </a:lvl1pPr>
-            <a:lvl2pPr marL="207020" indent="0">
-              <a:buNone/>
-              <a:defRPr sz="906" b="1"/>
+            <a:lvl2pPr marL="194401" indent="0">
+              <a:buNone/>
+              <a:defRPr sz="850" b="1"/>
             </a:lvl2pPr>
-            <a:lvl3pPr marL="414040" indent="0">
-              <a:buNone/>
-              <a:defRPr sz="815" b="1"/>
+            <a:lvl3pPr marL="388803" indent="0">
+              <a:buNone/>
+              <a:defRPr sz="765" b="1"/>
             </a:lvl3pPr>
-            <a:lvl4pPr marL="621060" indent="0">
-              <a:buNone/>
-              <a:defRPr sz="724" b="1"/>
+            <a:lvl4pPr marL="583204" indent="0">
+              <a:buNone/>
+              <a:defRPr sz="680" b="1"/>
             </a:lvl4pPr>
-            <a:lvl5pPr marL="828081" indent="0">
-              <a:buNone/>
-              <a:defRPr sz="724" b="1"/>
+            <a:lvl5pPr marL="777606" indent="0">
+              <a:buNone/>
+              <a:defRPr sz="680" b="1"/>
             </a:lvl5pPr>
-            <a:lvl6pPr marL="1035101" indent="0">
-              <a:buNone/>
-              <a:defRPr sz="724" b="1"/>
+            <a:lvl6pPr marL="972007" indent="0">
+              <a:buNone/>
+              <a:defRPr sz="680" b="1"/>
             </a:lvl6pPr>
-            <a:lvl7pPr marL="1242121" indent="0">
-              <a:buNone/>
-              <a:defRPr sz="724" b="1"/>
+            <a:lvl7pPr marL="1166409" indent="0">
+              <a:buNone/>
+              <a:defRPr sz="680" b="1"/>
             </a:lvl7pPr>
-            <a:lvl8pPr marL="1449141" indent="0">
-              <a:buNone/>
-              <a:defRPr sz="724" b="1"/>
+            <a:lvl8pPr marL="1360810" indent="0">
+              <a:buNone/>
+              <a:defRPr sz="680" b="1"/>
             </a:lvl8pPr>
-            <a:lvl9pPr marL="1656161" indent="0">
-              <a:buNone/>
-              <a:defRPr sz="724" b="1"/>
+            <a:lvl9pPr marL="1555212" indent="0">
+              <a:buNone/>
+              <a:defRPr sz="680" b="1"/>
             </a:lvl9pPr>
           </a:lstStyle>
           <a:p>
@@ -2120,8 +2349,8 @@
         </p:nvSpPr>
         <p:spPr>
           <a:xfrm>
-            <a:off x="285179" y="1360975"/>
-            <a:ext cx="1751498" cy="2001789"/>
+            <a:off x="285179" y="1065237"/>
+            <a:ext cx="1751498" cy="1566803"/>
           </a:xfrm>
         </p:spPr>
         <p:txBody>
@@ -2177,8 +2406,8 @@
         </p:nvSpPr>
         <p:spPr>
           <a:xfrm>
-            <a:off x="2095977" y="913354"/>
-            <a:ext cx="1760124" cy="447621"/>
+            <a:off x="2095977" y="714884"/>
+            <a:ext cx="1760124" cy="350353"/>
           </a:xfrm>
         </p:spPr>
         <p:txBody>
@@ -2186,39 +2415,39 @@
           <a:lstStyle>
             <a:lvl1pPr marL="0" indent="0">
               <a:buNone/>
-              <a:defRPr sz="1087" b="1"/>
+              <a:defRPr sz="1020" b="1"/>
             </a:lvl1pPr>
-            <a:lvl2pPr marL="207020" indent="0">
-              <a:buNone/>
-              <a:defRPr sz="906" b="1"/>
+            <a:lvl2pPr marL="194401" indent="0">
+              <a:buNone/>
+              <a:defRPr sz="850" b="1"/>
             </a:lvl2pPr>
-            <a:lvl3pPr marL="414040" indent="0">
-              <a:buNone/>
-              <a:defRPr sz="815" b="1"/>
+            <a:lvl3pPr marL="388803" indent="0">
+              <a:buNone/>
+              <a:defRPr sz="765" b="1"/>
             </a:lvl3pPr>
-            <a:lvl4pPr marL="621060" indent="0">
-              <a:buNone/>
-              <a:defRPr sz="724" b="1"/>
+            <a:lvl4pPr marL="583204" indent="0">
+              <a:buNone/>
+              <a:defRPr sz="680" b="1"/>
             </a:lvl4pPr>
-            <a:lvl5pPr marL="828081" indent="0">
-              <a:buNone/>
-              <a:defRPr sz="724" b="1"/>
+            <a:lvl5pPr marL="777606" indent="0">
+              <a:buNone/>
+              <a:defRPr sz="680" b="1"/>
             </a:lvl5pPr>
-            <a:lvl6pPr marL="1035101" indent="0">
-              <a:buNone/>
-              <a:defRPr sz="724" b="1"/>
+            <a:lvl6pPr marL="972007" indent="0">
+              <a:buNone/>
+              <a:defRPr sz="680" b="1"/>
             </a:lvl6pPr>
-            <a:lvl7pPr marL="1242121" indent="0">
-              <a:buNone/>
-              <a:defRPr sz="724" b="1"/>
+            <a:lvl7pPr marL="1166409" indent="0">
+              <a:buNone/>
+              <a:defRPr sz="680" b="1"/>
             </a:lvl7pPr>
-            <a:lvl8pPr marL="1449141" indent="0">
-              <a:buNone/>
-              <a:defRPr sz="724" b="1"/>
+            <a:lvl8pPr marL="1360810" indent="0">
+              <a:buNone/>
+              <a:defRPr sz="680" b="1"/>
             </a:lvl8pPr>
-            <a:lvl9pPr marL="1656161" indent="0">
-              <a:buNone/>
-              <a:defRPr sz="724" b="1"/>
+            <a:lvl9pPr marL="1555212" indent="0">
+              <a:buNone/>
+              <a:defRPr sz="680" b="1"/>
             </a:lvl9pPr>
           </a:lstStyle>
           <a:p>
@@ -2242,8 +2471,8 @@
         </p:nvSpPr>
         <p:spPr>
           <a:xfrm>
-            <a:off x="2095977" y="1360975"/>
-            <a:ext cx="1760124" cy="2001789"/>
+            <a:off x="2095977" y="1065237"/>
+            <a:ext cx="1760124" cy="1566803"/>
           </a:xfrm>
         </p:spPr>
         <p:txBody>
@@ -2304,7 +2533,7 @@
           <a:p>
             <a:fld id="{229EEE7B-5B8B-48DD-91DD-513D1D569173}" type="datetimeFigureOut">
               <a:rPr lang="en-GB" smtClean="0"/>
-              <a:t>29/06/2025</a:t>
+              <a:t>09/07/2025</a:t>
             </a:fld>
             <a:endParaRPr lang="en-GB"/>
           </a:p>
@@ -2355,7 +2584,7 @@
     </p:spTree>
     <p:extLst>
       <p:ext uri="{BB962C8B-B14F-4D97-AF65-F5344CB8AC3E}">
-        <p14:creationId xmlns:p14="http://schemas.microsoft.com/office/powerpoint/2010/main" val="582925937"/>
+        <p14:creationId xmlns:p14="http://schemas.microsoft.com/office/powerpoint/2010/main" val="4272845670"/>
       </p:ext>
     </p:extLst>
   </p:cSld>
@@ -2422,7 +2651,7 @@
           <a:p>
             <a:fld id="{229EEE7B-5B8B-48DD-91DD-513D1D569173}" type="datetimeFigureOut">
               <a:rPr lang="en-GB" smtClean="0"/>
-              <a:t>29/06/2025</a:t>
+              <a:t>09/07/2025</a:t>
             </a:fld>
             <a:endParaRPr lang="en-GB"/>
           </a:p>
@@ -2473,7 +2702,7 @@
     </p:spTree>
     <p:extLst>
       <p:ext uri="{BB962C8B-B14F-4D97-AF65-F5344CB8AC3E}">
-        <p14:creationId xmlns:p14="http://schemas.microsoft.com/office/powerpoint/2010/main" val="2266999230"/>
+        <p14:creationId xmlns:p14="http://schemas.microsoft.com/office/powerpoint/2010/main" val="219009071"/>
       </p:ext>
     </p:extLst>
   </p:cSld>
@@ -2517,7 +2746,7 @@
           <a:p>
             <a:fld id="{229EEE7B-5B8B-48DD-91DD-513D1D569173}" type="datetimeFigureOut">
               <a:rPr lang="en-GB" smtClean="0"/>
-              <a:t>29/06/2025</a:t>
+              <a:t>09/07/2025</a:t>
             </a:fld>
             <a:endParaRPr lang="en-GB"/>
           </a:p>
@@ -2568,7 +2797,7 @@
     </p:spTree>
     <p:extLst>
       <p:ext uri="{BB962C8B-B14F-4D97-AF65-F5344CB8AC3E}">
-        <p14:creationId xmlns:p14="http://schemas.microsoft.com/office/powerpoint/2010/main" val="3923062011"/>
+        <p14:creationId xmlns:p14="http://schemas.microsoft.com/office/powerpoint/2010/main" val="2787697834"/>
       </p:ext>
     </p:extLst>
   </p:cSld>
@@ -2607,15 +2836,15 @@
         </p:nvSpPr>
         <p:spPr>
           <a:xfrm>
-            <a:off x="285178" y="248391"/>
-            <a:ext cx="1335322" cy="869368"/>
+            <a:off x="285178" y="194416"/>
+            <a:ext cx="1335322" cy="680456"/>
           </a:xfrm>
         </p:spPr>
         <p:txBody>
           <a:bodyPr anchor="b"/>
           <a:lstStyle>
             <a:lvl1pPr>
-              <a:defRPr sz="1449"/>
+              <a:defRPr sz="1361"/>
             </a:lvl1pPr>
           </a:lstStyle>
           <a:p>
@@ -2639,39 +2868,39 @@
         </p:nvSpPr>
         <p:spPr>
           <a:xfrm>
-            <a:off x="1760124" y="536456"/>
-            <a:ext cx="2095976" cy="2647778"/>
+            <a:off x="1760124" y="419885"/>
+            <a:ext cx="2095976" cy="2072419"/>
           </a:xfrm>
         </p:spPr>
         <p:txBody>
           <a:bodyPr/>
           <a:lstStyle>
             <a:lvl1pPr>
-              <a:defRPr sz="1449"/>
+              <a:defRPr sz="1361"/>
             </a:lvl1pPr>
             <a:lvl2pPr>
-              <a:defRPr sz="1268"/>
+              <a:defRPr sz="1191"/>
             </a:lvl2pPr>
             <a:lvl3pPr>
-              <a:defRPr sz="1087"/>
+              <a:defRPr sz="1020"/>
             </a:lvl3pPr>
             <a:lvl4pPr>
-              <a:defRPr sz="906"/>
+              <a:defRPr sz="850"/>
             </a:lvl4pPr>
             <a:lvl5pPr>
-              <a:defRPr sz="906"/>
+              <a:defRPr sz="850"/>
             </a:lvl5pPr>
             <a:lvl6pPr>
-              <a:defRPr sz="906"/>
+              <a:defRPr sz="850"/>
             </a:lvl6pPr>
             <a:lvl7pPr>
-              <a:defRPr sz="906"/>
+              <a:defRPr sz="850"/>
             </a:lvl7pPr>
             <a:lvl8pPr>
-              <a:defRPr sz="906"/>
+              <a:defRPr sz="850"/>
             </a:lvl8pPr>
             <a:lvl9pPr>
-              <a:defRPr sz="906"/>
+              <a:defRPr sz="850"/>
             </a:lvl9pPr>
           </a:lstStyle>
           <a:p>
@@ -2724,8 +2953,8 @@
         </p:nvSpPr>
         <p:spPr>
           <a:xfrm>
-            <a:off x="285178" y="1117759"/>
-            <a:ext cx="1335322" cy="2070787"/>
+            <a:off x="285178" y="874872"/>
+            <a:ext cx="1335322" cy="1620807"/>
           </a:xfrm>
         </p:spPr>
         <p:txBody>
@@ -2733,39 +2962,39 @@
           <a:lstStyle>
             <a:lvl1pPr marL="0" indent="0">
               <a:buNone/>
-              <a:defRPr sz="724"/>
+              <a:defRPr sz="680"/>
             </a:lvl1pPr>
-            <a:lvl2pPr marL="207020" indent="0">
-              <a:buNone/>
-              <a:defRPr sz="634"/>
+            <a:lvl2pPr marL="194401" indent="0">
+              <a:buNone/>
+              <a:defRPr sz="595"/>
             </a:lvl2pPr>
-            <a:lvl3pPr marL="414040" indent="0">
-              <a:buNone/>
-              <a:defRPr sz="543"/>
+            <a:lvl3pPr marL="388803" indent="0">
+              <a:buNone/>
+              <a:defRPr sz="510"/>
             </a:lvl3pPr>
-            <a:lvl4pPr marL="621060" indent="0">
-              <a:buNone/>
-              <a:defRPr sz="453"/>
+            <a:lvl4pPr marL="583204" indent="0">
+              <a:buNone/>
+              <a:defRPr sz="425"/>
             </a:lvl4pPr>
-            <a:lvl5pPr marL="828081" indent="0">
-              <a:buNone/>
-              <a:defRPr sz="453"/>
+            <a:lvl5pPr marL="777606" indent="0">
+              <a:buNone/>
+              <a:defRPr sz="425"/>
             </a:lvl5pPr>
-            <a:lvl6pPr marL="1035101" indent="0">
-              <a:buNone/>
-              <a:defRPr sz="453"/>
+            <a:lvl6pPr marL="972007" indent="0">
+              <a:buNone/>
+              <a:defRPr sz="425"/>
             </a:lvl6pPr>
-            <a:lvl7pPr marL="1242121" indent="0">
-              <a:buNone/>
-              <a:defRPr sz="453"/>
+            <a:lvl7pPr marL="1166409" indent="0">
+              <a:buNone/>
+              <a:defRPr sz="425"/>
             </a:lvl7pPr>
-            <a:lvl8pPr marL="1449141" indent="0">
-              <a:buNone/>
-              <a:defRPr sz="453"/>
+            <a:lvl8pPr marL="1360810" indent="0">
+              <a:buNone/>
+              <a:defRPr sz="425"/>
             </a:lvl8pPr>
-            <a:lvl9pPr marL="1656161" indent="0">
-              <a:buNone/>
-              <a:defRPr sz="453"/>
+            <a:lvl9pPr marL="1555212" indent="0">
+              <a:buNone/>
+              <a:defRPr sz="425"/>
             </a:lvl9pPr>
           </a:lstStyle>
           <a:p>
@@ -2794,7 +3023,7 @@
           <a:p>
             <a:fld id="{229EEE7B-5B8B-48DD-91DD-513D1D569173}" type="datetimeFigureOut">
               <a:rPr lang="en-GB" smtClean="0"/>
-              <a:t>29/06/2025</a:t>
+              <a:t>09/07/2025</a:t>
             </a:fld>
             <a:endParaRPr lang="en-GB"/>
           </a:p>
@@ -2845,7 +3074,7 @@
     </p:spTree>
     <p:extLst>
       <p:ext uri="{BB962C8B-B14F-4D97-AF65-F5344CB8AC3E}">
-        <p14:creationId xmlns:p14="http://schemas.microsoft.com/office/powerpoint/2010/main" val="2086919517"/>
+        <p14:creationId xmlns:p14="http://schemas.microsoft.com/office/powerpoint/2010/main" val="3101422274"/>
       </p:ext>
     </p:extLst>
   </p:cSld>
@@ -2884,15 +3113,15 @@
         </p:nvSpPr>
         <p:spPr>
           <a:xfrm>
-            <a:off x="285178" y="248391"/>
-            <a:ext cx="1335322" cy="869368"/>
+            <a:off x="285178" y="194416"/>
+            <a:ext cx="1335322" cy="680456"/>
           </a:xfrm>
         </p:spPr>
         <p:txBody>
           <a:bodyPr anchor="b"/>
           <a:lstStyle>
             <a:lvl1pPr>
-              <a:defRPr sz="1449"/>
+              <a:defRPr sz="1361"/>
             </a:lvl1pPr>
           </a:lstStyle>
           <a:p>
@@ -2916,8 +3145,8 @@
         </p:nvSpPr>
         <p:spPr>
           <a:xfrm>
-            <a:off x="1760124" y="536456"/>
-            <a:ext cx="2095976" cy="2647778"/>
+            <a:off x="1760124" y="419885"/>
+            <a:ext cx="2095976" cy="2072419"/>
           </a:xfrm>
         </p:spPr>
         <p:txBody>
@@ -2925,39 +3154,39 @@
           <a:lstStyle>
             <a:lvl1pPr marL="0" indent="0">
               <a:buNone/>
-              <a:defRPr sz="1449"/>
+              <a:defRPr sz="1361"/>
             </a:lvl1pPr>
-            <a:lvl2pPr marL="207020" indent="0">
-              <a:buNone/>
-              <a:defRPr sz="1268"/>
+            <a:lvl2pPr marL="194401" indent="0">
+              <a:buNone/>
+              <a:defRPr sz="1191"/>
             </a:lvl2pPr>
-            <a:lvl3pPr marL="414040" indent="0">
-              <a:buNone/>
-              <a:defRPr sz="1087"/>
+            <a:lvl3pPr marL="388803" indent="0">
+              <a:buNone/>
+              <a:defRPr sz="1020"/>
             </a:lvl3pPr>
-            <a:lvl4pPr marL="621060" indent="0">
-              <a:buNone/>
-              <a:defRPr sz="906"/>
+            <a:lvl4pPr marL="583204" indent="0">
+              <a:buNone/>
+              <a:defRPr sz="850"/>
             </a:lvl4pPr>
-            <a:lvl5pPr marL="828081" indent="0">
-              <a:buNone/>
-              <a:defRPr sz="906"/>
+            <a:lvl5pPr marL="777606" indent="0">
+              <a:buNone/>
+              <a:defRPr sz="850"/>
             </a:lvl5pPr>
-            <a:lvl6pPr marL="1035101" indent="0">
-              <a:buNone/>
-              <a:defRPr sz="906"/>
+            <a:lvl6pPr marL="972007" indent="0">
+              <a:buNone/>
+              <a:defRPr sz="850"/>
             </a:lvl6pPr>
-            <a:lvl7pPr marL="1242121" indent="0">
-              <a:buNone/>
-              <a:defRPr sz="906"/>
+            <a:lvl7pPr marL="1166409" indent="0">
+              <a:buNone/>
+              <a:defRPr sz="850"/>
             </a:lvl7pPr>
-            <a:lvl8pPr marL="1449141" indent="0">
-              <a:buNone/>
-              <a:defRPr sz="906"/>
+            <a:lvl8pPr marL="1360810" indent="0">
+              <a:buNone/>
+              <a:defRPr sz="850"/>
             </a:lvl8pPr>
-            <a:lvl9pPr marL="1656161" indent="0">
-              <a:buNone/>
-              <a:defRPr sz="906"/>
+            <a:lvl9pPr marL="1555212" indent="0">
+              <a:buNone/>
+              <a:defRPr sz="850"/>
             </a:lvl9pPr>
           </a:lstStyle>
           <a:p>
@@ -2981,8 +3210,8 @@
         </p:nvSpPr>
         <p:spPr>
           <a:xfrm>
-            <a:off x="285178" y="1117759"/>
-            <a:ext cx="1335322" cy="2070787"/>
+            <a:off x="285178" y="874872"/>
+            <a:ext cx="1335322" cy="1620807"/>
           </a:xfrm>
         </p:spPr>
         <p:txBody>
@@ -2990,39 +3219,39 @@
           <a:lstStyle>
             <a:lvl1pPr marL="0" indent="0">
               <a:buNone/>
-              <a:defRPr sz="724"/>
+              <a:defRPr sz="680"/>
             </a:lvl1pPr>
-            <a:lvl2pPr marL="207020" indent="0">
-              <a:buNone/>
-              <a:defRPr sz="634"/>
+            <a:lvl2pPr marL="194401" indent="0">
+              <a:buNone/>
+              <a:defRPr sz="595"/>
             </a:lvl2pPr>
-            <a:lvl3pPr marL="414040" indent="0">
-              <a:buNone/>
-              <a:defRPr sz="543"/>
+            <a:lvl3pPr marL="388803" indent="0">
+              <a:buNone/>
+              <a:defRPr sz="510"/>
             </a:lvl3pPr>
-            <a:lvl4pPr marL="621060" indent="0">
-              <a:buNone/>
-              <a:defRPr sz="453"/>
+            <a:lvl4pPr marL="583204" indent="0">
+              <a:buNone/>
+              <a:defRPr sz="425"/>
             </a:lvl4pPr>
-            <a:lvl5pPr marL="828081" indent="0">
-              <a:buNone/>
-              <a:defRPr sz="453"/>
+            <a:lvl5pPr marL="777606" indent="0">
+              <a:buNone/>
+              <a:defRPr sz="425"/>
             </a:lvl5pPr>
-            <a:lvl6pPr marL="1035101" indent="0">
-              <a:buNone/>
-              <a:defRPr sz="453"/>
+            <a:lvl6pPr marL="972007" indent="0">
+              <a:buNone/>
+              <a:defRPr sz="425"/>
             </a:lvl6pPr>
-            <a:lvl7pPr marL="1242121" indent="0">
-              <a:buNone/>
-              <a:defRPr sz="453"/>
+            <a:lvl7pPr marL="1166409" indent="0">
+              <a:buNone/>
+              <a:defRPr sz="425"/>
             </a:lvl7pPr>
-            <a:lvl8pPr marL="1449141" indent="0">
-              <a:buNone/>
-              <a:defRPr sz="453"/>
+            <a:lvl8pPr marL="1360810" indent="0">
+              <a:buNone/>
+              <a:defRPr sz="425"/>
             </a:lvl8pPr>
-            <a:lvl9pPr marL="1656161" indent="0">
-              <a:buNone/>
-              <a:defRPr sz="453"/>
+            <a:lvl9pPr marL="1555212" indent="0">
+              <a:buNone/>
+              <a:defRPr sz="425"/>
             </a:lvl9pPr>
           </a:lstStyle>
           <a:p>
@@ -3051,7 +3280,7 @@
           <a:p>
             <a:fld id="{229EEE7B-5B8B-48DD-91DD-513D1D569173}" type="datetimeFigureOut">
               <a:rPr lang="en-GB" smtClean="0"/>
-              <a:t>29/06/2025</a:t>
+              <a:t>09/07/2025</a:t>
             </a:fld>
             <a:endParaRPr lang="en-GB"/>
           </a:p>
@@ -3102,7 +3331,7 @@
     </p:spTree>
     <p:extLst>
       <p:ext uri="{BB962C8B-B14F-4D97-AF65-F5344CB8AC3E}">
-        <p14:creationId xmlns:p14="http://schemas.microsoft.com/office/powerpoint/2010/main" val="2777501025"/>
+        <p14:creationId xmlns:p14="http://schemas.microsoft.com/office/powerpoint/2010/main" val="2962450471"/>
       </p:ext>
     </p:extLst>
   </p:cSld>
@@ -3146,8 +3375,8 @@
         </p:nvSpPr>
         <p:spPr>
           <a:xfrm>
-            <a:off x="284639" y="198369"/>
-            <a:ext cx="3570923" cy="720161"/>
+            <a:off x="284639" y="155263"/>
+            <a:ext cx="3570923" cy="563671"/>
           </a:xfrm>
           <a:prstGeom prst="rect">
             <a:avLst/>
@@ -3179,8 +3408,8 @@
         </p:nvSpPr>
         <p:spPr>
           <a:xfrm>
-            <a:off x="284639" y="991838"/>
-            <a:ext cx="3570923" cy="2364026"/>
+            <a:off x="284639" y="776313"/>
+            <a:ext cx="3570923" cy="1850326"/>
           </a:xfrm>
           <a:prstGeom prst="rect">
             <a:avLst/>
@@ -3241,8 +3470,8 @@
         </p:nvSpPr>
         <p:spPr>
           <a:xfrm>
-            <a:off x="284639" y="3453324"/>
-            <a:ext cx="931545" cy="198368"/>
+            <a:off x="284639" y="2702921"/>
+            <a:ext cx="931545" cy="155263"/>
           </a:xfrm>
           <a:prstGeom prst="rect">
             <a:avLst/>
@@ -3252,7 +3481,7 @@
           <a:bodyPr vert="horz" lIns="91440" tIns="45720" rIns="91440" bIns="45720" rtlCol="0" anchor="ctr"/>
           <a:lstStyle>
             <a:lvl1pPr algn="l">
-              <a:defRPr sz="543">
+              <a:defRPr sz="510">
                 <a:solidFill>
                   <a:schemeClr val="tx1">
                     <a:tint val="82000"/>
@@ -3264,7 +3493,7 @@
           <a:p>
             <a:fld id="{229EEE7B-5B8B-48DD-91DD-513D1D569173}" type="datetimeFigureOut">
               <a:rPr lang="en-GB" smtClean="0"/>
-              <a:t>29/06/2025</a:t>
+              <a:t>09/07/2025</a:t>
             </a:fld>
             <a:endParaRPr lang="en-GB"/>
           </a:p>
@@ -3282,8 +3511,8 @@
         </p:nvSpPr>
         <p:spPr>
           <a:xfrm>
-            <a:off x="1371441" y="3453324"/>
-            <a:ext cx="1397318" cy="198368"/>
+            <a:off x="1371441" y="2702921"/>
+            <a:ext cx="1397318" cy="155263"/>
           </a:xfrm>
           <a:prstGeom prst="rect">
             <a:avLst/>
@@ -3293,7 +3522,7 @@
           <a:bodyPr vert="horz" lIns="91440" tIns="45720" rIns="91440" bIns="45720" rtlCol="0" anchor="ctr"/>
           <a:lstStyle>
             <a:lvl1pPr algn="ctr">
-              <a:defRPr sz="543">
+              <a:defRPr sz="510">
                 <a:solidFill>
                   <a:schemeClr val="tx1">
                     <a:tint val="82000"/>
@@ -3319,8 +3548,8 @@
         </p:nvSpPr>
         <p:spPr>
           <a:xfrm>
-            <a:off x="2924016" y="3453324"/>
-            <a:ext cx="931545" cy="198368"/>
+            <a:off x="2924016" y="2702921"/>
+            <a:ext cx="931545" cy="155263"/>
           </a:xfrm>
           <a:prstGeom prst="rect">
             <a:avLst/>
@@ -3330,7 +3559,7 @@
           <a:bodyPr vert="horz" lIns="91440" tIns="45720" rIns="91440" bIns="45720" rtlCol="0" anchor="ctr"/>
           <a:lstStyle>
             <a:lvl1pPr algn="r">
-              <a:defRPr sz="543">
+              <a:defRPr sz="510">
                 <a:solidFill>
                   <a:schemeClr val="tx1">
                     <a:tint val="82000"/>
@@ -3351,27 +3580,27 @@
     </p:spTree>
     <p:extLst>
       <p:ext uri="{BB962C8B-B14F-4D97-AF65-F5344CB8AC3E}">
-        <p14:creationId xmlns:p14="http://schemas.microsoft.com/office/powerpoint/2010/main" val="1775442117"/>
+        <p14:creationId xmlns:p14="http://schemas.microsoft.com/office/powerpoint/2010/main" val="2149665943"/>
       </p:ext>
     </p:extLst>
   </p:cSld>
   <p:clrMap bg1="lt1" tx1="dk1" bg2="lt2" tx2="dk2" accent1="accent1" accent2="accent2" accent3="accent3" accent4="accent4" accent5="accent5" accent6="accent6" hlink="hlink" folHlink="folHlink"/>
   <p:sldLayoutIdLst>
-    <p:sldLayoutId id="2147483673" r:id="rId1"/>
-    <p:sldLayoutId id="2147483674" r:id="rId2"/>
-    <p:sldLayoutId id="2147483675" r:id="rId3"/>
-    <p:sldLayoutId id="2147483676" r:id="rId4"/>
-    <p:sldLayoutId id="2147483677" r:id="rId5"/>
-    <p:sldLayoutId id="2147483678" r:id="rId6"/>
-    <p:sldLayoutId id="2147483679" r:id="rId7"/>
-    <p:sldLayoutId id="2147483680" r:id="rId8"/>
-    <p:sldLayoutId id="2147483681" r:id="rId9"/>
-    <p:sldLayoutId id="2147483682" r:id="rId10"/>
-    <p:sldLayoutId id="2147483683" r:id="rId11"/>
+    <p:sldLayoutId id="2147483685" r:id="rId1"/>
+    <p:sldLayoutId id="2147483686" r:id="rId2"/>
+    <p:sldLayoutId id="2147483687" r:id="rId3"/>
+    <p:sldLayoutId id="2147483688" r:id="rId4"/>
+    <p:sldLayoutId id="2147483689" r:id="rId5"/>
+    <p:sldLayoutId id="2147483690" r:id="rId6"/>
+    <p:sldLayoutId id="2147483691" r:id="rId7"/>
+    <p:sldLayoutId id="2147483692" r:id="rId8"/>
+    <p:sldLayoutId id="2147483693" r:id="rId9"/>
+    <p:sldLayoutId id="2147483694" r:id="rId10"/>
+    <p:sldLayoutId id="2147483695" r:id="rId11"/>
   </p:sldLayoutIdLst>
   <p:txStyles>
     <p:titleStyle>
-      <a:lvl1pPr algn="l" defTabSz="414040" rtl="0" eaLnBrk="1" latinLnBrk="0" hangingPunct="1">
+      <a:lvl1pPr algn="l" defTabSz="388803" rtl="0" eaLnBrk="1" latinLnBrk="0" hangingPunct="1">
         <a:lnSpc>
           <a:spcPct val="90000"/>
         </a:lnSpc>
@@ -3379,7 +3608,7 @@
           <a:spcPct val="0"/>
         </a:spcBef>
         <a:buNone/>
-        <a:defRPr sz="1992" kern="1200">
+        <a:defRPr sz="1871" kern="1200">
           <a:solidFill>
             <a:schemeClr val="tx1"/>
           </a:solidFill>
@@ -3390,16 +3619,16 @@
       </a:lvl1pPr>
     </p:titleStyle>
     <p:bodyStyle>
-      <a:lvl1pPr marL="103510" indent="-103510" algn="l" defTabSz="414040" rtl="0" eaLnBrk="1" latinLnBrk="0" hangingPunct="1">
+      <a:lvl1pPr marL="97201" indent="-97201" algn="l" defTabSz="388803" rtl="0" eaLnBrk="1" latinLnBrk="0" hangingPunct="1">
         <a:lnSpc>
           <a:spcPct val="90000"/>
         </a:lnSpc>
         <a:spcBef>
-          <a:spcPts val="453"/>
+          <a:spcPts val="425"/>
         </a:spcBef>
         <a:buFont typeface="Arial" panose="020B0604020202020204" pitchFamily="34" charset="0"/>
         <a:buChar char="•"/>
-        <a:defRPr sz="1268" kern="1200">
+        <a:defRPr sz="1191" kern="1200">
           <a:solidFill>
             <a:schemeClr val="tx1"/>
           </a:solidFill>
@@ -3408,16 +3637,16 @@
           <a:cs typeface="+mn-cs"/>
         </a:defRPr>
       </a:lvl1pPr>
-      <a:lvl2pPr marL="310530" indent="-103510" algn="l" defTabSz="414040" rtl="0" eaLnBrk="1" latinLnBrk="0" hangingPunct="1">
+      <a:lvl2pPr marL="291602" indent="-97201" algn="l" defTabSz="388803" rtl="0" eaLnBrk="1" latinLnBrk="0" hangingPunct="1">
         <a:lnSpc>
           <a:spcPct val="90000"/>
         </a:lnSpc>
         <a:spcBef>
-          <a:spcPts val="226"/>
+          <a:spcPts val="213"/>
         </a:spcBef>
         <a:buFont typeface="Arial" panose="020B0604020202020204" pitchFamily="34" charset="0"/>
         <a:buChar char="•"/>
-        <a:defRPr sz="1087" kern="1200">
+        <a:defRPr sz="1020" kern="1200">
           <a:solidFill>
             <a:schemeClr val="tx1"/>
           </a:solidFill>
@@ -3426,16 +3655,16 @@
           <a:cs typeface="+mn-cs"/>
         </a:defRPr>
       </a:lvl2pPr>
-      <a:lvl3pPr marL="517550" indent="-103510" algn="l" defTabSz="414040" rtl="0" eaLnBrk="1" latinLnBrk="0" hangingPunct="1">
+      <a:lvl3pPr marL="486004" indent="-97201" algn="l" defTabSz="388803" rtl="0" eaLnBrk="1" latinLnBrk="0" hangingPunct="1">
         <a:lnSpc>
           <a:spcPct val="90000"/>
         </a:lnSpc>
         <a:spcBef>
-          <a:spcPts val="226"/>
+          <a:spcPts val="213"/>
         </a:spcBef>
         <a:buFont typeface="Arial" panose="020B0604020202020204" pitchFamily="34" charset="0"/>
         <a:buChar char="•"/>
-        <a:defRPr sz="906" kern="1200">
+        <a:defRPr sz="850" kern="1200">
           <a:solidFill>
             <a:schemeClr val="tx1"/>
           </a:solidFill>
@@ -3444,16 +3673,16 @@
           <a:cs typeface="+mn-cs"/>
         </a:defRPr>
       </a:lvl3pPr>
-      <a:lvl4pPr marL="724571" indent="-103510" algn="l" defTabSz="414040" rtl="0" eaLnBrk="1" latinLnBrk="0" hangingPunct="1">
+      <a:lvl4pPr marL="680405" indent="-97201" algn="l" defTabSz="388803" rtl="0" eaLnBrk="1" latinLnBrk="0" hangingPunct="1">
         <a:lnSpc>
           <a:spcPct val="90000"/>
         </a:lnSpc>
         <a:spcBef>
-          <a:spcPts val="226"/>
+          <a:spcPts val="213"/>
         </a:spcBef>
         <a:buFont typeface="Arial" panose="020B0604020202020204" pitchFamily="34" charset="0"/>
         <a:buChar char="•"/>
-        <a:defRPr sz="815" kern="1200">
+        <a:defRPr sz="765" kern="1200">
           <a:solidFill>
             <a:schemeClr val="tx1"/>
           </a:solidFill>
@@ -3462,16 +3691,16 @@
           <a:cs typeface="+mn-cs"/>
         </a:defRPr>
       </a:lvl4pPr>
-      <a:lvl5pPr marL="931591" indent="-103510" algn="l" defTabSz="414040" rtl="0" eaLnBrk="1" latinLnBrk="0" hangingPunct="1">
+      <a:lvl5pPr marL="874806" indent="-97201" algn="l" defTabSz="388803" rtl="0" eaLnBrk="1" latinLnBrk="0" hangingPunct="1">
         <a:lnSpc>
           <a:spcPct val="90000"/>
         </a:lnSpc>
         <a:spcBef>
-          <a:spcPts val="226"/>
+          <a:spcPts val="213"/>
         </a:spcBef>
         <a:buFont typeface="Arial" panose="020B0604020202020204" pitchFamily="34" charset="0"/>
         <a:buChar char="•"/>
-        <a:defRPr sz="815" kern="1200">
+        <a:defRPr sz="765" kern="1200">
           <a:solidFill>
             <a:schemeClr val="tx1"/>
           </a:solidFill>
@@ -3480,16 +3709,16 @@
           <a:cs typeface="+mn-cs"/>
         </a:defRPr>
       </a:lvl5pPr>
-      <a:lvl6pPr marL="1138611" indent="-103510" algn="l" defTabSz="414040" rtl="0" eaLnBrk="1" latinLnBrk="0" hangingPunct="1">
+      <a:lvl6pPr marL="1069208" indent="-97201" algn="l" defTabSz="388803" rtl="0" eaLnBrk="1" latinLnBrk="0" hangingPunct="1">
         <a:lnSpc>
           <a:spcPct val="90000"/>
         </a:lnSpc>
         <a:spcBef>
-          <a:spcPts val="226"/>
+          <a:spcPts val="213"/>
         </a:spcBef>
         <a:buFont typeface="Arial" panose="020B0604020202020204" pitchFamily="34" charset="0"/>
         <a:buChar char="•"/>
-        <a:defRPr sz="815" kern="1200">
+        <a:defRPr sz="765" kern="1200">
           <a:solidFill>
             <a:schemeClr val="tx1"/>
           </a:solidFill>
@@ -3498,16 +3727,16 @@
           <a:cs typeface="+mn-cs"/>
         </a:defRPr>
       </a:lvl6pPr>
-      <a:lvl7pPr marL="1345631" indent="-103510" algn="l" defTabSz="414040" rtl="0" eaLnBrk="1" latinLnBrk="0" hangingPunct="1">
+      <a:lvl7pPr marL="1263609" indent="-97201" algn="l" defTabSz="388803" rtl="0" eaLnBrk="1" latinLnBrk="0" hangingPunct="1">
         <a:lnSpc>
           <a:spcPct val="90000"/>
         </a:lnSpc>
         <a:spcBef>
-          <a:spcPts val="226"/>
+          <a:spcPts val="213"/>
         </a:spcBef>
         <a:buFont typeface="Arial" panose="020B0604020202020204" pitchFamily="34" charset="0"/>
         <a:buChar char="•"/>
-        <a:defRPr sz="815" kern="1200">
+        <a:defRPr sz="765" kern="1200">
           <a:solidFill>
             <a:schemeClr val="tx1"/>
           </a:solidFill>
@@ -3516,16 +3745,16 @@
           <a:cs typeface="+mn-cs"/>
         </a:defRPr>
       </a:lvl7pPr>
-      <a:lvl8pPr marL="1552651" indent="-103510" algn="l" defTabSz="414040" rtl="0" eaLnBrk="1" latinLnBrk="0" hangingPunct="1">
+      <a:lvl8pPr marL="1458011" indent="-97201" algn="l" defTabSz="388803" rtl="0" eaLnBrk="1" latinLnBrk="0" hangingPunct="1">
         <a:lnSpc>
           <a:spcPct val="90000"/>
         </a:lnSpc>
         <a:spcBef>
-          <a:spcPts val="226"/>
+          <a:spcPts val="213"/>
         </a:spcBef>
         <a:buFont typeface="Arial" panose="020B0604020202020204" pitchFamily="34" charset="0"/>
         <a:buChar char="•"/>
-        <a:defRPr sz="815" kern="1200">
+        <a:defRPr sz="765" kern="1200">
           <a:solidFill>
             <a:schemeClr val="tx1"/>
           </a:solidFill>
@@ -3534,16 +3763,16 @@
           <a:cs typeface="+mn-cs"/>
         </a:defRPr>
       </a:lvl8pPr>
-      <a:lvl9pPr marL="1759671" indent="-103510" algn="l" defTabSz="414040" rtl="0" eaLnBrk="1" latinLnBrk="0" hangingPunct="1">
+      <a:lvl9pPr marL="1652412" indent="-97201" algn="l" defTabSz="388803" rtl="0" eaLnBrk="1" latinLnBrk="0" hangingPunct="1">
         <a:lnSpc>
           <a:spcPct val="90000"/>
         </a:lnSpc>
         <a:spcBef>
-          <a:spcPts val="226"/>
+          <a:spcPts val="213"/>
         </a:spcBef>
         <a:buFont typeface="Arial" panose="020B0604020202020204" pitchFamily="34" charset="0"/>
         <a:buChar char="•"/>
-        <a:defRPr sz="815" kern="1200">
+        <a:defRPr sz="765" kern="1200">
           <a:solidFill>
             <a:schemeClr val="tx1"/>
           </a:solidFill>
@@ -3557,8 +3786,8 @@
       <a:defPPr>
         <a:defRPr lang="en-US"/>
       </a:defPPr>
-      <a:lvl1pPr marL="0" algn="l" defTabSz="414040" rtl="0" eaLnBrk="1" latinLnBrk="0" hangingPunct="1">
-        <a:defRPr sz="815" kern="1200">
+      <a:lvl1pPr marL="0" algn="l" defTabSz="388803" rtl="0" eaLnBrk="1" latinLnBrk="0" hangingPunct="1">
+        <a:defRPr sz="765" kern="1200">
           <a:solidFill>
             <a:schemeClr val="tx1"/>
           </a:solidFill>
@@ -3567,8 +3796,8 @@
           <a:cs typeface="+mn-cs"/>
         </a:defRPr>
       </a:lvl1pPr>
-      <a:lvl2pPr marL="207020" algn="l" defTabSz="414040" rtl="0" eaLnBrk="1" latinLnBrk="0" hangingPunct="1">
-        <a:defRPr sz="815" kern="1200">
+      <a:lvl2pPr marL="194401" algn="l" defTabSz="388803" rtl="0" eaLnBrk="1" latinLnBrk="0" hangingPunct="1">
+        <a:defRPr sz="765" kern="1200">
           <a:solidFill>
             <a:schemeClr val="tx1"/>
           </a:solidFill>
@@ -3577,8 +3806,8 @@
           <a:cs typeface="+mn-cs"/>
         </a:defRPr>
       </a:lvl2pPr>
-      <a:lvl3pPr marL="414040" algn="l" defTabSz="414040" rtl="0" eaLnBrk="1" latinLnBrk="0" hangingPunct="1">
-        <a:defRPr sz="815" kern="1200">
+      <a:lvl3pPr marL="388803" algn="l" defTabSz="388803" rtl="0" eaLnBrk="1" latinLnBrk="0" hangingPunct="1">
+        <a:defRPr sz="765" kern="1200">
           <a:solidFill>
             <a:schemeClr val="tx1"/>
           </a:solidFill>
@@ -3587,8 +3816,8 @@
           <a:cs typeface="+mn-cs"/>
         </a:defRPr>
       </a:lvl3pPr>
-      <a:lvl4pPr marL="621060" algn="l" defTabSz="414040" rtl="0" eaLnBrk="1" latinLnBrk="0" hangingPunct="1">
-        <a:defRPr sz="815" kern="1200">
+      <a:lvl4pPr marL="583204" algn="l" defTabSz="388803" rtl="0" eaLnBrk="1" latinLnBrk="0" hangingPunct="1">
+        <a:defRPr sz="765" kern="1200">
           <a:solidFill>
             <a:schemeClr val="tx1"/>
           </a:solidFill>
@@ -3597,8 +3826,8 @@
           <a:cs typeface="+mn-cs"/>
         </a:defRPr>
       </a:lvl4pPr>
-      <a:lvl5pPr marL="828081" algn="l" defTabSz="414040" rtl="0" eaLnBrk="1" latinLnBrk="0" hangingPunct="1">
-        <a:defRPr sz="815" kern="1200">
+      <a:lvl5pPr marL="777606" algn="l" defTabSz="388803" rtl="0" eaLnBrk="1" latinLnBrk="0" hangingPunct="1">
+        <a:defRPr sz="765" kern="1200">
           <a:solidFill>
             <a:schemeClr val="tx1"/>
           </a:solidFill>
@@ -3607,8 +3836,8 @@
           <a:cs typeface="+mn-cs"/>
         </a:defRPr>
       </a:lvl5pPr>
-      <a:lvl6pPr marL="1035101" algn="l" defTabSz="414040" rtl="0" eaLnBrk="1" latinLnBrk="0" hangingPunct="1">
-        <a:defRPr sz="815" kern="1200">
+      <a:lvl6pPr marL="972007" algn="l" defTabSz="388803" rtl="0" eaLnBrk="1" latinLnBrk="0" hangingPunct="1">
+        <a:defRPr sz="765" kern="1200">
           <a:solidFill>
             <a:schemeClr val="tx1"/>
           </a:solidFill>
@@ -3617,8 +3846,8 @@
           <a:cs typeface="+mn-cs"/>
         </a:defRPr>
       </a:lvl6pPr>
-      <a:lvl7pPr marL="1242121" algn="l" defTabSz="414040" rtl="0" eaLnBrk="1" latinLnBrk="0" hangingPunct="1">
-        <a:defRPr sz="815" kern="1200">
+      <a:lvl7pPr marL="1166409" algn="l" defTabSz="388803" rtl="0" eaLnBrk="1" latinLnBrk="0" hangingPunct="1">
+        <a:defRPr sz="765" kern="1200">
           <a:solidFill>
             <a:schemeClr val="tx1"/>
           </a:solidFill>
@@ -3627,8 +3856,8 @@
           <a:cs typeface="+mn-cs"/>
         </a:defRPr>
       </a:lvl7pPr>
-      <a:lvl8pPr marL="1449141" algn="l" defTabSz="414040" rtl="0" eaLnBrk="1" latinLnBrk="0" hangingPunct="1">
-        <a:defRPr sz="815" kern="1200">
+      <a:lvl8pPr marL="1360810" algn="l" defTabSz="388803" rtl="0" eaLnBrk="1" latinLnBrk="0" hangingPunct="1">
+        <a:defRPr sz="765" kern="1200">
           <a:solidFill>
             <a:schemeClr val="tx1"/>
           </a:solidFill>
@@ -3637,8 +3866,8 @@
           <a:cs typeface="+mn-cs"/>
         </a:defRPr>
       </a:lvl8pPr>
-      <a:lvl9pPr marL="1656161" algn="l" defTabSz="414040" rtl="0" eaLnBrk="1" latinLnBrk="0" hangingPunct="1">
-        <a:defRPr sz="815" kern="1200">
+      <a:lvl9pPr marL="1555212" algn="l" defTabSz="388803" rtl="0" eaLnBrk="1" latinLnBrk="0" hangingPunct="1">
+        <a:defRPr sz="765" kern="1200">
           <a:solidFill>
             <a:schemeClr val="tx1"/>
           </a:solidFill>
@@ -3671,7 +3900,7 @@
       </p:grpSpPr>
       <p:pic>
         <p:nvPicPr>
-          <p:cNvPr id="60" name="Picture 59">
+          <p:cNvPr id="3" name="Picture 2">
             <a:extLst>
               <a:ext uri="{FF2B5EF4-FFF2-40B4-BE49-F238E27FC236}">
                 <a16:creationId xmlns:a16="http://schemas.microsoft.com/office/drawing/2014/main" id="{90A4BF2E-8644-4CE4-DC7C-15BF4AF14321}"/>
@@ -3691,7 +3920,7 @@
         </p:blipFill>
         <p:spPr>
           <a:xfrm>
-            <a:off x="1217527" y="2157431"/>
+            <a:off x="1013745" y="2423755"/>
             <a:ext cx="585000" cy="360000"/>
           </a:xfrm>
           <a:prstGeom prst="rect">
@@ -3701,10 +3930,10 @@
       </p:pic>
       <p:pic>
         <p:nvPicPr>
-          <p:cNvPr id="61" name="Picture 60">
+          <p:cNvPr id="4" name="Picture 3">
             <a:extLst>
               <a:ext uri="{FF2B5EF4-FFF2-40B4-BE49-F238E27FC236}">
-                <a16:creationId xmlns:a16="http://schemas.microsoft.com/office/drawing/2014/main" id="{DC7AD9A6-D303-C5E8-1F66-7B1C068297BC}"/>
+                <a16:creationId xmlns:a16="http://schemas.microsoft.com/office/drawing/2014/main" id="{41DFD3BD-157B-E27A-6ABB-07005E9F401C}"/>
               </a:ext>
             </a:extLst>
           </p:cNvPr>
@@ -3721,7 +3950,7 @@
         </p:blipFill>
         <p:spPr>
           <a:xfrm>
-            <a:off x="2328004" y="2157431"/>
+            <a:off x="232175" y="2423755"/>
             <a:ext cx="581970" cy="360000"/>
           </a:xfrm>
           <a:prstGeom prst="rect">
@@ -3731,10 +3960,10 @@
       </p:pic>
       <p:pic>
         <p:nvPicPr>
-          <p:cNvPr id="62" name="Picture 61">
+          <p:cNvPr id="5" name="Picture 4">
             <a:extLst>
               <a:ext uri="{FF2B5EF4-FFF2-40B4-BE49-F238E27FC236}">
-                <a16:creationId xmlns:a16="http://schemas.microsoft.com/office/drawing/2014/main" id="{1FB8DFBF-6153-EC85-40FD-067F60B7B5A1}"/>
+                <a16:creationId xmlns:a16="http://schemas.microsoft.com/office/drawing/2014/main" id="{4B8E4DFF-DFCA-245A-E8A1-6DF8299D0DBD}"/>
               </a:ext>
             </a:extLst>
           </p:cNvPr>
@@ -3751,7 +3980,7 @@
         </p:blipFill>
         <p:spPr>
           <a:xfrm>
-            <a:off x="3435450" y="2157431"/>
+            <a:off x="2682412" y="2426718"/>
             <a:ext cx="581970" cy="360000"/>
           </a:xfrm>
           <a:prstGeom prst="rect">
@@ -3761,10 +3990,10 @@
       </p:pic>
       <p:pic>
         <p:nvPicPr>
-          <p:cNvPr id="63" name="Picture 62">
+          <p:cNvPr id="6" name="Picture 5">
             <a:extLst>
               <a:ext uri="{FF2B5EF4-FFF2-40B4-BE49-F238E27FC236}">
-                <a16:creationId xmlns:a16="http://schemas.microsoft.com/office/drawing/2014/main" id="{41DFD3BD-157B-E27A-6ABB-07005E9F401C}"/>
+                <a16:creationId xmlns:a16="http://schemas.microsoft.com/office/drawing/2014/main" id="{772D0341-E5F7-2687-75CD-9E4921C16E7D}"/>
               </a:ext>
             </a:extLst>
           </p:cNvPr>
@@ -3781,8 +4010,8 @@
         </p:blipFill>
         <p:spPr>
           <a:xfrm>
-            <a:off x="110080" y="2157431"/>
-            <a:ext cx="581970" cy="360000"/>
+            <a:off x="3099481" y="2417669"/>
+            <a:ext cx="585003" cy="360000"/>
           </a:xfrm>
           <a:prstGeom prst="rect">
             <a:avLst/>
@@ -3791,10 +4020,10 @@
       </p:pic>
       <p:pic>
         <p:nvPicPr>
-          <p:cNvPr id="64" name="Picture 63">
+          <p:cNvPr id="7" name="Picture 6">
             <a:extLst>
               <a:ext uri="{FF2B5EF4-FFF2-40B4-BE49-F238E27FC236}">
-                <a16:creationId xmlns:a16="http://schemas.microsoft.com/office/drawing/2014/main" id="{0E8EE9BD-0766-80FC-EA19-267A359FC5B1}"/>
+                <a16:creationId xmlns:a16="http://schemas.microsoft.com/office/drawing/2014/main" id="{BD9E0C66-19FB-2C77-C5A4-61A6DCAD8A49}"/>
               </a:ext>
             </a:extLst>
           </p:cNvPr>
@@ -3811,126 +4040,6 @@
         </p:blipFill>
         <p:spPr>
           <a:xfrm>
-            <a:off x="3432022" y="3242260"/>
-            <a:ext cx="581970" cy="360000"/>
-          </a:xfrm>
-          <a:prstGeom prst="rect">
-            <a:avLst/>
-          </a:prstGeom>
-        </p:spPr>
-      </p:pic>
-      <p:pic>
-        <p:nvPicPr>
-          <p:cNvPr id="65" name="Picture 64">
-            <a:extLst>
-              <a:ext uri="{FF2B5EF4-FFF2-40B4-BE49-F238E27FC236}">
-                <a16:creationId xmlns:a16="http://schemas.microsoft.com/office/drawing/2014/main" id="{E681C30E-1CA1-E743-12C6-848A12B20F27}"/>
-              </a:ext>
-            </a:extLst>
-          </p:cNvPr>
-          <p:cNvPicPr>
-            <a:picLocks noChangeAspect="1"/>
-          </p:cNvPicPr>
-          <p:nvPr/>
-        </p:nvPicPr>
-        <p:blipFill>
-          <a:blip r:embed="rId7"/>
-          <a:stretch>
-            <a:fillRect/>
-          </a:stretch>
-        </p:blipFill>
-        <p:spPr>
-          <a:xfrm>
-            <a:off x="2328004" y="3242857"/>
-            <a:ext cx="581970" cy="360000"/>
-          </a:xfrm>
-          <a:prstGeom prst="rect">
-            <a:avLst/>
-          </a:prstGeom>
-        </p:spPr>
-      </p:pic>
-      <p:pic>
-        <p:nvPicPr>
-          <p:cNvPr id="66" name="Picture 65">
-            <a:extLst>
-              <a:ext uri="{FF2B5EF4-FFF2-40B4-BE49-F238E27FC236}">
-                <a16:creationId xmlns:a16="http://schemas.microsoft.com/office/drawing/2014/main" id="{4B8E4DFF-DFCA-245A-E8A1-6DF8299D0DBD}"/>
-              </a:ext>
-            </a:extLst>
-          </p:cNvPr>
-          <p:cNvPicPr>
-            <a:picLocks noChangeAspect="1"/>
-          </p:cNvPicPr>
-          <p:nvPr/>
-        </p:nvPicPr>
-        <p:blipFill>
-          <a:blip r:embed="rId8"/>
-          <a:stretch>
-            <a:fillRect/>
-          </a:stretch>
-        </p:blipFill>
-        <p:spPr>
-          <a:xfrm>
-            <a:off x="126208" y="3242857"/>
-            <a:ext cx="581970" cy="360000"/>
-          </a:xfrm>
-          <a:prstGeom prst="rect">
-            <a:avLst/>
-          </a:prstGeom>
-        </p:spPr>
-      </p:pic>
-      <p:pic>
-        <p:nvPicPr>
-          <p:cNvPr id="67" name="Picture 66">
-            <a:extLst>
-              <a:ext uri="{FF2B5EF4-FFF2-40B4-BE49-F238E27FC236}">
-                <a16:creationId xmlns:a16="http://schemas.microsoft.com/office/drawing/2014/main" id="{772D0341-E5F7-2687-75CD-9E4921C16E7D}"/>
-              </a:ext>
-            </a:extLst>
-          </p:cNvPr>
-          <p:cNvPicPr>
-            <a:picLocks noChangeAspect="1"/>
-          </p:cNvPicPr>
-          <p:nvPr/>
-        </p:nvPicPr>
-        <p:blipFill>
-          <a:blip r:embed="rId9"/>
-          <a:stretch>
-            <a:fillRect/>
-          </a:stretch>
-        </p:blipFill>
-        <p:spPr>
-          <a:xfrm>
-            <a:off x="1170713" y="3233808"/>
-            <a:ext cx="585003" cy="360000"/>
-          </a:xfrm>
-          <a:prstGeom prst="rect">
-            <a:avLst/>
-          </a:prstGeom>
-        </p:spPr>
-      </p:pic>
-      <p:pic>
-        <p:nvPicPr>
-          <p:cNvPr id="68" name="Picture 67">
-            <a:extLst>
-              <a:ext uri="{FF2B5EF4-FFF2-40B4-BE49-F238E27FC236}">
-                <a16:creationId xmlns:a16="http://schemas.microsoft.com/office/drawing/2014/main" id="{BD9E0C66-19FB-2C77-C5A4-61A6DCAD8A49}"/>
-              </a:ext>
-            </a:extLst>
-          </p:cNvPr>
-          <p:cNvPicPr>
-            <a:picLocks noChangeAspect="1"/>
-          </p:cNvPicPr>
-          <p:nvPr/>
-        </p:nvPicPr>
-        <p:blipFill>
-          <a:blip r:embed="rId10"/>
-          <a:stretch>
-            <a:fillRect/>
-          </a:stretch>
-        </p:blipFill>
-        <p:spPr>
-          <a:xfrm>
             <a:off x="3865185" y="908870"/>
             <a:ext cx="232788" cy="144000"/>
           </a:xfrm>
@@ -3941,7 +4050,7 @@
       </p:pic>
       <p:sp>
         <p:nvSpPr>
-          <p:cNvPr id="69" name="Rectangle 68">
+          <p:cNvPr id="8" name="Rectangle 7">
             <a:extLst>
               <a:ext uri="{FF2B5EF4-FFF2-40B4-BE49-F238E27FC236}">
                 <a16:creationId xmlns:a16="http://schemas.microsoft.com/office/drawing/2014/main" id="{D263CB68-6070-0BB4-645F-52A1DF1CCB45}"/>
@@ -4012,7 +4121,7 @@
       </p:sp>
       <p:sp>
         <p:nvSpPr>
-          <p:cNvPr id="70" name="TextBox 69">
+          <p:cNvPr id="9" name="TextBox 8">
             <a:extLst>
               <a:ext uri="{FF2B5EF4-FFF2-40B4-BE49-F238E27FC236}">
                 <a16:creationId xmlns:a16="http://schemas.microsoft.com/office/drawing/2014/main" id="{49E7EF79-54F5-6957-912D-F5211AE7C345}"/>
@@ -4061,7 +4170,7 @@
       </p:sp>
       <p:sp>
         <p:nvSpPr>
-          <p:cNvPr id="71" name="TextBox 70">
+          <p:cNvPr id="10" name="TextBox 9">
             <a:extLst>
               <a:ext uri="{FF2B5EF4-FFF2-40B4-BE49-F238E27FC236}">
                 <a16:creationId xmlns:a16="http://schemas.microsoft.com/office/drawing/2014/main" id="{F2DC4528-4346-4046-4366-D22CF29233CB}"/>
@@ -4110,7 +4219,7 @@
       </p:sp>
       <p:sp>
         <p:nvSpPr>
-          <p:cNvPr id="72" name="TextBox 71">
+          <p:cNvPr id="11" name="TextBox 10">
             <a:extLst>
               <a:ext uri="{FF2B5EF4-FFF2-40B4-BE49-F238E27FC236}">
                 <a16:creationId xmlns:a16="http://schemas.microsoft.com/office/drawing/2014/main" id="{65821429-491A-9695-79A1-DDBAF1D91760}"/>
@@ -4159,7 +4268,7 @@
       </p:sp>
       <p:pic>
         <p:nvPicPr>
-          <p:cNvPr id="73" name="Picture 72">
+          <p:cNvPr id="12" name="Picture 11">
             <a:extLst>
               <a:ext uri="{FF2B5EF4-FFF2-40B4-BE49-F238E27FC236}">
                 <a16:creationId xmlns:a16="http://schemas.microsoft.com/office/drawing/2014/main" id="{EB691A0B-FD3C-F64F-4893-DF1AE6C90CCA}"/>
@@ -4172,7 +4281,7 @@
           <p:nvPr/>
         </p:nvPicPr>
         <p:blipFill>
-          <a:blip r:embed="rId11"/>
+          <a:blip r:embed="rId7"/>
           <a:stretch>
             <a:fillRect/>
           </a:stretch>
@@ -4189,7 +4298,7 @@
       </p:pic>
       <p:pic>
         <p:nvPicPr>
-          <p:cNvPr id="74" name="Picture 73">
+          <p:cNvPr id="13" name="Picture 12">
             <a:extLst>
               <a:ext uri="{FF2B5EF4-FFF2-40B4-BE49-F238E27FC236}">
                 <a16:creationId xmlns:a16="http://schemas.microsoft.com/office/drawing/2014/main" id="{46B84CE7-5B19-C530-DAD8-C842A0D3E521}"/>
@@ -4202,7 +4311,7 @@
           <p:nvPr/>
         </p:nvPicPr>
         <p:blipFill>
-          <a:blip r:embed="rId12"/>
+          <a:blip r:embed="rId8"/>
           <a:stretch>
             <a:fillRect/>
           </a:stretch>
@@ -4219,7 +4328,7 @@
       </p:pic>
       <p:pic>
         <p:nvPicPr>
-          <p:cNvPr id="75" name="Picture 74">
+          <p:cNvPr id="14" name="Picture 13">
             <a:extLst>
               <a:ext uri="{FF2B5EF4-FFF2-40B4-BE49-F238E27FC236}">
                 <a16:creationId xmlns:a16="http://schemas.microsoft.com/office/drawing/2014/main" id="{DDA6905E-87E1-D835-2A09-349AD4DCAFAF}"/>
@@ -4232,7 +4341,7 @@
           <p:nvPr/>
         </p:nvPicPr>
         <p:blipFill>
-          <a:blip r:embed="rId13"/>
+          <a:blip r:embed="rId9"/>
           <a:stretch>
             <a:fillRect/>
           </a:stretch>
@@ -4249,7 +4358,7 @@
       </p:pic>
       <p:sp>
         <p:nvSpPr>
-          <p:cNvPr id="76" name="TextBox 75">
+          <p:cNvPr id="15" name="TextBox 14">
             <a:extLst>
               <a:ext uri="{FF2B5EF4-FFF2-40B4-BE49-F238E27FC236}">
                 <a16:creationId xmlns:a16="http://schemas.microsoft.com/office/drawing/2014/main" id="{FCCCE2D9-7F44-7612-D249-E404F415A435}"/>
@@ -4298,7 +4407,7 @@
       </p:sp>
       <p:sp>
         <p:nvSpPr>
-          <p:cNvPr id="77" name="TextBox 76">
+          <p:cNvPr id="16" name="TextBox 15">
             <a:extLst>
               <a:ext uri="{FF2B5EF4-FFF2-40B4-BE49-F238E27FC236}">
                 <a16:creationId xmlns:a16="http://schemas.microsoft.com/office/drawing/2014/main" id="{A4D6D809-F63A-0BB5-A944-F32D1EB0F1C2}"/>
@@ -4347,7 +4456,7 @@
       </p:sp>
       <p:sp>
         <p:nvSpPr>
-          <p:cNvPr id="78" name="TextBox 77">
+          <p:cNvPr id="17" name="TextBox 16">
             <a:extLst>
               <a:ext uri="{FF2B5EF4-FFF2-40B4-BE49-F238E27FC236}">
                 <a16:creationId xmlns:a16="http://schemas.microsoft.com/office/drawing/2014/main" id="{336F1B2A-522C-7B79-D3EB-34DC5339E4E0}"/>
@@ -4396,7 +4505,7 @@
       </p:sp>
       <p:sp>
         <p:nvSpPr>
-          <p:cNvPr id="79" name="TextBox 78">
+          <p:cNvPr id="18" name="TextBox 17">
             <a:extLst>
               <a:ext uri="{FF2B5EF4-FFF2-40B4-BE49-F238E27FC236}">
                 <a16:creationId xmlns:a16="http://schemas.microsoft.com/office/drawing/2014/main" id="{A3E2E621-7AB8-A040-2A57-53B40E818136}"/>
@@ -4449,7 +4558,7 @@
       </p:sp>
       <p:sp>
         <p:nvSpPr>
-          <p:cNvPr id="80" name="TextBox 79">
+          <p:cNvPr id="19" name="TextBox 18">
             <a:extLst>
               <a:ext uri="{FF2B5EF4-FFF2-40B4-BE49-F238E27FC236}">
                 <a16:creationId xmlns:a16="http://schemas.microsoft.com/office/drawing/2014/main" id="{CD4285D8-26EE-30B9-3358-672E37B89C30}"/>
@@ -4523,7 +4632,7 @@
       </p:sp>
       <p:sp>
         <p:nvSpPr>
-          <p:cNvPr id="81" name="TextBox 80">
+          <p:cNvPr id="20" name="TextBox 19">
             <a:extLst>
               <a:ext uri="{FF2B5EF4-FFF2-40B4-BE49-F238E27FC236}">
                 <a16:creationId xmlns:a16="http://schemas.microsoft.com/office/drawing/2014/main" id="{C6E591DB-9A84-55EC-D1CB-CA85BE21C00A}"/>
@@ -4535,8 +4644,8 @@
         </p:nvSpPr>
         <p:spPr>
           <a:xfrm>
-            <a:off x="-76874" y="1709783"/>
-            <a:ext cx="4217074" cy="461665"/>
+            <a:off x="-42826" y="1709783"/>
+            <a:ext cx="2146974" cy="707886"/>
           </a:xfrm>
           <a:prstGeom prst="rect">
             <a:avLst/>
@@ -4587,7 +4696,7 @@
       </p:sp>
       <p:sp>
         <p:nvSpPr>
-          <p:cNvPr id="82" name="TextBox 81">
+          <p:cNvPr id="21" name="TextBox 20">
             <a:extLst>
               <a:ext uri="{FF2B5EF4-FFF2-40B4-BE49-F238E27FC236}">
                 <a16:creationId xmlns:a16="http://schemas.microsoft.com/office/drawing/2014/main" id="{8D1946FF-AFE3-1103-CD5E-82A774BB18CF}"/>
@@ -4599,8 +4708,8 @@
         </p:nvSpPr>
         <p:spPr>
           <a:xfrm>
-            <a:off x="-76876" y="2794649"/>
-            <a:ext cx="4217076" cy="461665"/>
+            <a:off x="2180890" y="1709783"/>
+            <a:ext cx="2095500" cy="707886"/>
           </a:xfrm>
           <a:prstGeom prst="rect">
             <a:avLst/>
@@ -4651,7 +4760,7 @@
       </p:sp>
       <p:cxnSp>
         <p:nvCxnSpPr>
-          <p:cNvPr id="83" name="Straight Connector 82">
+          <p:cNvPr id="22" name="Straight Connector 21">
             <a:extLst>
               <a:ext uri="{FF2B5EF4-FFF2-40B4-BE49-F238E27FC236}">
                 <a16:creationId xmlns:a16="http://schemas.microsoft.com/office/drawing/2014/main" id="{FBA798FD-722F-8374-9D1E-0A705D72B06B}"/>
@@ -4697,7 +4806,7 @@
       </p:cxnSp>
       <p:cxnSp>
         <p:nvCxnSpPr>
-          <p:cNvPr id="84" name="Straight Connector 83">
+          <p:cNvPr id="23" name="Straight Connector 22">
             <a:extLst>
               <a:ext uri="{FF2B5EF4-FFF2-40B4-BE49-F238E27FC236}">
                 <a16:creationId xmlns:a16="http://schemas.microsoft.com/office/drawing/2014/main" id="{47D27A78-60CD-0D6E-2AD5-D6B4159D41E8}"/>
@@ -4743,7 +4852,7 @@
       </p:cxnSp>
       <p:cxnSp>
         <p:nvCxnSpPr>
-          <p:cNvPr id="85" name="Straight Connector 84">
+          <p:cNvPr id="24" name="Straight Connector 23">
             <a:extLst>
               <a:ext uri="{FF2B5EF4-FFF2-40B4-BE49-F238E27FC236}">
                 <a16:creationId xmlns:a16="http://schemas.microsoft.com/office/drawing/2014/main" id="{181C78C6-3A56-E166-ACC7-87B32FAB6D8E}"/>
@@ -4789,7 +4898,7 @@
       </p:cxnSp>
       <p:pic>
         <p:nvPicPr>
-          <p:cNvPr id="86" name="Graphic 85">
+          <p:cNvPr id="25" name="Graphic 24">
             <a:extLst>
               <a:ext uri="{FF2B5EF4-FFF2-40B4-BE49-F238E27FC236}">
                 <a16:creationId xmlns:a16="http://schemas.microsoft.com/office/drawing/2014/main" id="{0214E89D-0E4B-1C85-2C15-57E6763586F2}"/>
@@ -4802,10 +4911,10 @@
           <p:nvPr/>
         </p:nvPicPr>
         <p:blipFill>
-          <a:blip r:embed="rId14">
+          <a:blip r:embed="rId10">
             <a:extLst>
               <a:ext uri="{96DAC541-7B7A-43D3-8B79-37D633B846F1}">
-                <asvg:svgBlip xmlns:asvg="http://schemas.microsoft.com/office/drawing/2016/SVG/main" r:embed="rId15"/>
+                <asvg:svgBlip xmlns:asvg="http://schemas.microsoft.com/office/drawing/2016/SVG/main" r:embed="rId11"/>
               </a:ext>
             </a:extLst>
           </a:blip>
@@ -4824,10 +4933,10 @@
       </p:pic>
       <p:sp>
         <p:nvSpPr>
-          <p:cNvPr id="87" name="TextBox 86">
+          <p:cNvPr id="26" name="TextBox 25">
             <a:extLst>
               <a:ext uri="{FF2B5EF4-FFF2-40B4-BE49-F238E27FC236}">
-                <a16:creationId xmlns:a16="http://schemas.microsoft.com/office/drawing/2014/main" id="{B25CCA34-BFB5-F772-0063-FAB8D7BBF736}"/>
+                <a16:creationId xmlns:a16="http://schemas.microsoft.com/office/drawing/2014/main" id="{151BDCEA-207C-CE0D-3A4F-4A049384B2D2}"/>
               </a:ext>
             </a:extLst>
           </p:cNvPr>
@@ -4836,7 +4945,7 @@
         </p:nvSpPr>
         <p:spPr>
           <a:xfrm>
-            <a:off x="2359654" y="2497522"/>
+            <a:off x="1012796" y="2739339"/>
             <a:ext cx="518671" cy="215444"/>
           </a:xfrm>
           <a:prstGeom prst="rect">
@@ -4862,17 +4971,17 @@
                 <a:latin typeface="Calibri Light" panose="020F0302020204030204" pitchFamily="34" charset="0"/>
                 <a:cs typeface="Calibri Light" panose="020F0302020204030204" pitchFamily="34" charset="0"/>
               </a:rPr>
-              <a:t>North</a:t>
-            </a:r>
-          </a:p>
-        </p:txBody>
-      </p:sp>
-      <p:sp>
-        <p:nvSpPr>
-          <p:cNvPr id="88" name="TextBox 87">
+              <a:t>East</a:t>
+            </a:r>
+          </a:p>
+        </p:txBody>
+      </p:sp>
+      <p:sp>
+        <p:nvSpPr>
+          <p:cNvPr id="27" name="TextBox 26">
             <a:extLst>
               <a:ext uri="{FF2B5EF4-FFF2-40B4-BE49-F238E27FC236}">
-                <a16:creationId xmlns:a16="http://schemas.microsoft.com/office/drawing/2014/main" id="{29C4E2A0-43E1-087D-8A9D-0E6A45035E7A}"/>
+                <a16:creationId xmlns:a16="http://schemas.microsoft.com/office/drawing/2014/main" id="{DC152927-0AC6-09A7-D861-071860AB0F82}"/>
               </a:ext>
             </a:extLst>
           </p:cNvPr>
@@ -4881,7 +4990,7 @@
         </p:nvSpPr>
         <p:spPr>
           <a:xfrm>
-            <a:off x="3467100" y="2491801"/>
+            <a:off x="228946" y="2739339"/>
             <a:ext cx="518671" cy="215444"/>
           </a:xfrm>
           <a:prstGeom prst="rect">
@@ -4907,17 +5016,17 @@
                 <a:latin typeface="Calibri Light" panose="020F0302020204030204" pitchFamily="34" charset="0"/>
                 <a:cs typeface="Calibri Light" panose="020F0302020204030204" pitchFamily="34" charset="0"/>
               </a:rPr>
-              <a:t>South</a:t>
-            </a:r>
-          </a:p>
-        </p:txBody>
-      </p:sp>
-      <p:sp>
-        <p:nvSpPr>
-          <p:cNvPr id="89" name="TextBox 88">
+              <a:t>West</a:t>
+            </a:r>
+          </a:p>
+        </p:txBody>
+      </p:sp>
+      <p:sp>
+        <p:nvSpPr>
+          <p:cNvPr id="28" name="TextBox 27">
             <a:extLst>
               <a:ext uri="{FF2B5EF4-FFF2-40B4-BE49-F238E27FC236}">
-                <a16:creationId xmlns:a16="http://schemas.microsoft.com/office/drawing/2014/main" id="{151BDCEA-207C-CE0D-3A4F-4A049384B2D2}"/>
+                <a16:creationId xmlns:a16="http://schemas.microsoft.com/office/drawing/2014/main" id="{0D399520-912A-FB7B-7316-433D9E562933}"/>
               </a:ext>
             </a:extLst>
           </p:cNvPr>
@@ -4926,7 +5035,7 @@
         </p:nvSpPr>
         <p:spPr>
           <a:xfrm>
-            <a:off x="1216578" y="2491801"/>
+            <a:off x="3145346" y="2739339"/>
             <a:ext cx="518671" cy="215444"/>
           </a:xfrm>
           <a:prstGeom prst="rect">
@@ -4959,187 +5068,7 @@
       </p:sp>
       <p:sp>
         <p:nvSpPr>
-          <p:cNvPr id="90" name="TextBox 89">
-            <a:extLst>
-              <a:ext uri="{FF2B5EF4-FFF2-40B4-BE49-F238E27FC236}">
-                <a16:creationId xmlns:a16="http://schemas.microsoft.com/office/drawing/2014/main" id="{DC152927-0AC6-09A7-D861-071860AB0F82}"/>
-              </a:ext>
-            </a:extLst>
-          </p:cNvPr>
-          <p:cNvSpPr txBox="1"/>
-          <p:nvPr/>
-        </p:nvSpPr>
-        <p:spPr>
-          <a:xfrm>
-            <a:off x="106851" y="2517431"/>
-            <a:ext cx="518671" cy="215444"/>
-          </a:xfrm>
-          <a:prstGeom prst="rect">
-            <a:avLst/>
-          </a:prstGeom>
-          <a:noFill/>
-          <a:ln>
-            <a:noFill/>
-          </a:ln>
-        </p:spPr>
-        <p:txBody>
-          <a:bodyPr wrap="square" rtlCol="0">
-            <a:spAutoFit/>
-          </a:bodyPr>
-          <a:lstStyle/>
-          <a:p>
-            <a:pPr algn="ctr"/>
-            <a:r>
-              <a:rPr lang="en-US" sz="800" dirty="0">
-                <a:solidFill>
-                  <a:srgbClr val="222222"/>
-                </a:solidFill>
-                <a:latin typeface="Calibri Light" panose="020F0302020204030204" pitchFamily="34" charset="0"/>
-                <a:cs typeface="Calibri Light" panose="020F0302020204030204" pitchFamily="34" charset="0"/>
-              </a:rPr>
-              <a:t>West</a:t>
-            </a:r>
-          </a:p>
-        </p:txBody>
-      </p:sp>
-      <p:sp>
-        <p:nvSpPr>
-          <p:cNvPr id="91" name="TextBox 90">
-            <a:extLst>
-              <a:ext uri="{FF2B5EF4-FFF2-40B4-BE49-F238E27FC236}">
-                <a16:creationId xmlns:a16="http://schemas.microsoft.com/office/drawing/2014/main" id="{BF50A39A-E6EE-6AA9-14A0-307113E840A7}"/>
-              </a:ext>
-            </a:extLst>
-          </p:cNvPr>
-          <p:cNvSpPr txBox="1"/>
-          <p:nvPr/>
-        </p:nvSpPr>
-        <p:spPr>
-          <a:xfrm>
-            <a:off x="2359654" y="3561199"/>
-            <a:ext cx="518671" cy="215444"/>
-          </a:xfrm>
-          <a:prstGeom prst="rect">
-            <a:avLst/>
-          </a:prstGeom>
-          <a:noFill/>
-          <a:ln>
-            <a:noFill/>
-          </a:ln>
-        </p:spPr>
-        <p:txBody>
-          <a:bodyPr wrap="square" rtlCol="0">
-            <a:spAutoFit/>
-          </a:bodyPr>
-          <a:lstStyle/>
-          <a:p>
-            <a:pPr algn="ctr"/>
-            <a:r>
-              <a:rPr lang="en-US" sz="800" dirty="0">
-                <a:solidFill>
-                  <a:srgbClr val="222222"/>
-                </a:solidFill>
-                <a:latin typeface="Calibri Light" panose="020F0302020204030204" pitchFamily="34" charset="0"/>
-                <a:cs typeface="Calibri Light" panose="020F0302020204030204" pitchFamily="34" charset="0"/>
-              </a:rPr>
-              <a:t>North</a:t>
-            </a:r>
-          </a:p>
-        </p:txBody>
-      </p:sp>
-      <p:sp>
-        <p:nvSpPr>
-          <p:cNvPr id="92" name="TextBox 91">
-            <a:extLst>
-              <a:ext uri="{FF2B5EF4-FFF2-40B4-BE49-F238E27FC236}">
-                <a16:creationId xmlns:a16="http://schemas.microsoft.com/office/drawing/2014/main" id="{5952E807-CEB2-8EE7-CC88-867E9EF38F28}"/>
-              </a:ext>
-            </a:extLst>
-          </p:cNvPr>
-          <p:cNvSpPr txBox="1"/>
-          <p:nvPr/>
-        </p:nvSpPr>
-        <p:spPr>
-          <a:xfrm>
-            <a:off x="3467100" y="3555478"/>
-            <a:ext cx="518671" cy="215444"/>
-          </a:xfrm>
-          <a:prstGeom prst="rect">
-            <a:avLst/>
-          </a:prstGeom>
-          <a:noFill/>
-          <a:ln>
-            <a:noFill/>
-          </a:ln>
-        </p:spPr>
-        <p:txBody>
-          <a:bodyPr wrap="square" rtlCol="0">
-            <a:spAutoFit/>
-          </a:bodyPr>
-          <a:lstStyle/>
-          <a:p>
-            <a:pPr algn="ctr"/>
-            <a:r>
-              <a:rPr lang="en-US" sz="800" dirty="0">
-                <a:solidFill>
-                  <a:srgbClr val="222222"/>
-                </a:solidFill>
-                <a:latin typeface="Calibri Light" panose="020F0302020204030204" pitchFamily="34" charset="0"/>
-                <a:cs typeface="Calibri Light" panose="020F0302020204030204" pitchFamily="34" charset="0"/>
-              </a:rPr>
-              <a:t>South</a:t>
-            </a:r>
-          </a:p>
-        </p:txBody>
-      </p:sp>
-      <p:sp>
-        <p:nvSpPr>
-          <p:cNvPr id="93" name="TextBox 92">
-            <a:extLst>
-              <a:ext uri="{FF2B5EF4-FFF2-40B4-BE49-F238E27FC236}">
-                <a16:creationId xmlns:a16="http://schemas.microsoft.com/office/drawing/2014/main" id="{0D399520-912A-FB7B-7316-433D9E562933}"/>
-              </a:ext>
-            </a:extLst>
-          </p:cNvPr>
-          <p:cNvSpPr txBox="1"/>
-          <p:nvPr/>
-        </p:nvSpPr>
-        <p:spPr>
-          <a:xfrm>
-            <a:off x="1216578" y="3555478"/>
-            <a:ext cx="518671" cy="215444"/>
-          </a:xfrm>
-          <a:prstGeom prst="rect">
-            <a:avLst/>
-          </a:prstGeom>
-          <a:noFill/>
-          <a:ln>
-            <a:noFill/>
-          </a:ln>
-        </p:spPr>
-        <p:txBody>
-          <a:bodyPr wrap="square" rtlCol="0">
-            <a:spAutoFit/>
-          </a:bodyPr>
-          <a:lstStyle/>
-          <a:p>
-            <a:pPr algn="ctr"/>
-            <a:r>
-              <a:rPr lang="en-US" sz="800" dirty="0">
-                <a:solidFill>
-                  <a:srgbClr val="222222"/>
-                </a:solidFill>
-                <a:latin typeface="Calibri Light" panose="020F0302020204030204" pitchFamily="34" charset="0"/>
-                <a:cs typeface="Calibri Light" panose="020F0302020204030204" pitchFamily="34" charset="0"/>
-              </a:rPr>
-              <a:t>East</a:t>
-            </a:r>
-          </a:p>
-        </p:txBody>
-      </p:sp>
-      <p:sp>
-        <p:nvSpPr>
-          <p:cNvPr id="94" name="TextBox 93">
+          <p:cNvPr id="29" name="TextBox 28">
             <a:extLst>
               <a:ext uri="{FF2B5EF4-FFF2-40B4-BE49-F238E27FC236}">
                 <a16:creationId xmlns:a16="http://schemas.microsoft.com/office/drawing/2014/main" id="{33073E03-F303-77A5-81F7-498EB8604D87}"/>
@@ -5151,7 +5080,7 @@
         </p:nvSpPr>
         <p:spPr>
           <a:xfrm>
-            <a:off x="106851" y="3581108"/>
+            <a:off x="2663055" y="2739339"/>
             <a:ext cx="518671" cy="215444"/>
           </a:xfrm>
           <a:prstGeom prst="rect">

</xml_diff>

<commit_message>
Added better referencing to the training approaches
</commit_message>
<xml_diff>
--- a/chapter_07/figures/training_approaches.pptx
+++ b/chapter_07/figures/training_approaches.pptx
@@ -115,7 +115,7 @@
 <file path=ppt/revisionInfo.xml><?xml version="1.0" encoding="utf-8"?>
 <p1510:revInfo xmlns:a="http://schemas.openxmlformats.org/drawingml/2006/main" xmlns:r="http://schemas.openxmlformats.org/officeDocument/2006/relationships" xmlns:p1510="http://schemas.microsoft.com/office/powerpoint/2015/10/main">
   <p1510:revLst>
-    <p1510:client id="{C1D7A64D-15B7-4FCE-91E9-6F95F059BEA6}" v="25" dt="2025-07-09T12:48:49.330"/>
+    <p1510:client id="{C1D7A64D-15B7-4FCE-91E9-6F95F059BEA6}" v="34" dt="2025-07-10T13:50:27.166"/>
   </p1510:revLst>
 </p1510:revInfo>
 </file>
@@ -125,16 +125,24 @@
   <pc:docChgLst>
     <pc:chgData name="Fatima Pillosu" userId="a6295d4dc9e22643" providerId="LiveId" clId="{C1D7A64D-15B7-4FCE-91E9-6F95F059BEA6}"/>
     <pc:docChg chg="undo custSel modSld">
-      <pc:chgData name="Fatima Pillosu" userId="a6295d4dc9e22643" providerId="LiveId" clId="{C1D7A64D-15B7-4FCE-91E9-6F95F059BEA6}" dt="2025-07-09T12:48:59.019" v="2099" actId="554"/>
+      <pc:chgData name="Fatima Pillosu" userId="a6295d4dc9e22643" providerId="LiveId" clId="{C1D7A64D-15B7-4FCE-91E9-6F95F059BEA6}" dt="2025-07-10T13:53:12.605" v="2378" actId="1037"/>
       <pc:docMkLst>
         <pc:docMk/>
       </pc:docMkLst>
       <pc:sldChg chg="addSp delSp modSp mod">
-        <pc:chgData name="Fatima Pillosu" userId="a6295d4dc9e22643" providerId="LiveId" clId="{C1D7A64D-15B7-4FCE-91E9-6F95F059BEA6}" dt="2025-07-09T12:48:59.019" v="2099" actId="554"/>
+        <pc:chgData name="Fatima Pillosu" userId="a6295d4dc9e22643" providerId="LiveId" clId="{C1D7A64D-15B7-4FCE-91E9-6F95F059BEA6}" dt="2025-07-10T13:53:12.605" v="2378" actId="1037"/>
         <pc:sldMkLst>
           <pc:docMk/>
           <pc:sldMk cId="3625231182" sldId="256"/>
         </pc:sldMkLst>
+        <pc:spChg chg="add mod">
+          <ac:chgData name="Fatima Pillosu" userId="a6295d4dc9e22643" providerId="LiveId" clId="{C1D7A64D-15B7-4FCE-91E9-6F95F059BEA6}" dt="2025-07-10T13:48:42.132" v="2208" actId="12788"/>
+          <ac:spMkLst>
+            <pc:docMk/>
+            <pc:sldMk cId="3625231182" sldId="256"/>
+            <ac:spMk id="2" creationId="{2E80BDC4-448A-F867-2CE0-2FF19E022ABF}"/>
+          </ac:spMkLst>
+        </pc:spChg>
         <pc:spChg chg="add del">
           <ac:chgData name="Fatima Pillosu" userId="a6295d4dc9e22643" providerId="LiveId" clId="{C1D7A64D-15B7-4FCE-91E9-6F95F059BEA6}" dt="2025-07-09T12:48:33.465" v="2096" actId="478"/>
           <ac:spMkLst>
@@ -152,11 +160,99 @@
           </ac:spMkLst>
         </pc:spChg>
         <pc:spChg chg="add mod">
-          <ac:chgData name="Fatima Pillosu" userId="a6295d4dc9e22643" providerId="LiveId" clId="{C1D7A64D-15B7-4FCE-91E9-6F95F059BEA6}" dt="2025-07-09T12:48:49.330" v="2098"/>
+          <ac:chgData name="Fatima Pillosu" userId="a6295d4dc9e22643" providerId="LiveId" clId="{C1D7A64D-15B7-4FCE-91E9-6F95F059BEA6}" dt="2025-07-10T13:53:12.605" v="2378" actId="1037"/>
           <ac:spMkLst>
             <pc:docMk/>
             <pc:sldMk cId="3625231182" sldId="256"/>
             <ac:spMk id="8" creationId="{D263CB68-6070-0BB4-645F-52A1DF1CCB45}"/>
+          </ac:spMkLst>
+        </pc:spChg>
+        <pc:spChg chg="add mod">
+          <ac:chgData name="Fatima Pillosu" userId="a6295d4dc9e22643" providerId="LiveId" clId="{C1D7A64D-15B7-4FCE-91E9-6F95F059BEA6}" dt="2025-07-10T13:53:12.605" v="2378" actId="1037"/>
+          <ac:spMkLst>
+            <pc:docMk/>
+            <pc:sldMk cId="3625231182" sldId="256"/>
+            <ac:spMk id="9" creationId="{49E7EF79-54F5-6957-912D-F5211AE7C345}"/>
+          </ac:spMkLst>
+        </pc:spChg>
+        <pc:spChg chg="add mod">
+          <ac:chgData name="Fatima Pillosu" userId="a6295d4dc9e22643" providerId="LiveId" clId="{C1D7A64D-15B7-4FCE-91E9-6F95F059BEA6}" dt="2025-07-10T13:53:12.605" v="2378" actId="1037"/>
+          <ac:spMkLst>
+            <pc:docMk/>
+            <pc:sldMk cId="3625231182" sldId="256"/>
+            <ac:spMk id="10" creationId="{F2DC4528-4346-4046-4366-D22CF29233CB}"/>
+          </ac:spMkLst>
+        </pc:spChg>
+        <pc:spChg chg="add mod">
+          <ac:chgData name="Fatima Pillosu" userId="a6295d4dc9e22643" providerId="LiveId" clId="{C1D7A64D-15B7-4FCE-91E9-6F95F059BEA6}" dt="2025-07-10T13:53:12.605" v="2378" actId="1037"/>
+          <ac:spMkLst>
+            <pc:docMk/>
+            <pc:sldMk cId="3625231182" sldId="256"/>
+            <ac:spMk id="11" creationId="{65821429-491A-9695-79A1-DDBAF1D91760}"/>
+          </ac:spMkLst>
+        </pc:spChg>
+        <pc:spChg chg="del mod">
+          <ac:chgData name="Fatima Pillosu" userId="a6295d4dc9e22643" providerId="LiveId" clId="{C1D7A64D-15B7-4FCE-91E9-6F95F059BEA6}" dt="2025-06-29T22:09:08.254" v="364" actId="478"/>
+          <ac:spMkLst>
+            <pc:docMk/>
+            <pc:sldMk cId="3625231182" sldId="256"/>
+            <ac:spMk id="14" creationId="{2F2D05E8-4713-1153-B926-48BFD60244F4}"/>
+          </ac:spMkLst>
+        </pc:spChg>
+        <pc:spChg chg="del mod ord">
+          <ac:chgData name="Fatima Pillosu" userId="a6295d4dc9e22643" providerId="LiveId" clId="{C1D7A64D-15B7-4FCE-91E9-6F95F059BEA6}" dt="2025-06-29T23:03:08.104" v="1885" actId="21"/>
+          <ac:spMkLst>
+            <pc:docMk/>
+            <pc:sldMk cId="3625231182" sldId="256"/>
+            <ac:spMk id="15" creationId="{D263CB68-6070-0BB4-645F-52A1DF1CCB45}"/>
+          </ac:spMkLst>
+        </pc:spChg>
+        <pc:spChg chg="add mod">
+          <ac:chgData name="Fatima Pillosu" userId="a6295d4dc9e22643" providerId="LiveId" clId="{C1D7A64D-15B7-4FCE-91E9-6F95F059BEA6}" dt="2025-07-10T13:53:12.605" v="2378" actId="1037"/>
+          <ac:spMkLst>
+            <pc:docMk/>
+            <pc:sldMk cId="3625231182" sldId="256"/>
+            <ac:spMk id="15" creationId="{FCCCE2D9-7F44-7612-D249-E404F415A435}"/>
+          </ac:spMkLst>
+        </pc:spChg>
+        <pc:spChg chg="del mod">
+          <ac:chgData name="Fatima Pillosu" userId="a6295d4dc9e22643" providerId="LiveId" clId="{C1D7A64D-15B7-4FCE-91E9-6F95F059BEA6}" dt="2025-06-29T23:03:08.104" v="1885" actId="21"/>
+          <ac:spMkLst>
+            <pc:docMk/>
+            <pc:sldMk cId="3625231182" sldId="256"/>
+            <ac:spMk id="16" creationId="{49E7EF79-54F5-6957-912D-F5211AE7C345}"/>
+          </ac:spMkLst>
+        </pc:spChg>
+        <pc:spChg chg="add mod">
+          <ac:chgData name="Fatima Pillosu" userId="a6295d4dc9e22643" providerId="LiveId" clId="{C1D7A64D-15B7-4FCE-91E9-6F95F059BEA6}" dt="2025-07-10T13:53:12.605" v="2378" actId="1037"/>
+          <ac:spMkLst>
+            <pc:docMk/>
+            <pc:sldMk cId="3625231182" sldId="256"/>
+            <ac:spMk id="16" creationId="{A4D6D809-F63A-0BB5-A944-F32D1EB0F1C2}"/>
+          </ac:spMkLst>
+        </pc:spChg>
+        <pc:spChg chg="add mod">
+          <ac:chgData name="Fatima Pillosu" userId="a6295d4dc9e22643" providerId="LiveId" clId="{C1D7A64D-15B7-4FCE-91E9-6F95F059BEA6}" dt="2025-07-10T13:53:12.605" v="2378" actId="1037"/>
+          <ac:spMkLst>
+            <pc:docMk/>
+            <pc:sldMk cId="3625231182" sldId="256"/>
+            <ac:spMk id="17" creationId="{336F1B2A-522C-7B79-D3EB-34DC5339E4E0}"/>
+          </ac:spMkLst>
+        </pc:spChg>
+        <pc:spChg chg="del mod">
+          <ac:chgData name="Fatima Pillosu" userId="a6295d4dc9e22643" providerId="LiveId" clId="{C1D7A64D-15B7-4FCE-91E9-6F95F059BEA6}" dt="2025-06-29T23:03:08.104" v="1885" actId="21"/>
+          <ac:spMkLst>
+            <pc:docMk/>
+            <pc:sldMk cId="3625231182" sldId="256"/>
+            <ac:spMk id="17" creationId="{F2DC4528-4346-4046-4366-D22CF29233CB}"/>
+          </ac:spMkLst>
+        </pc:spChg>
+        <pc:spChg chg="del mod">
+          <ac:chgData name="Fatima Pillosu" userId="a6295d4dc9e22643" providerId="LiveId" clId="{C1D7A64D-15B7-4FCE-91E9-6F95F059BEA6}" dt="2025-06-29T23:03:08.104" v="1885" actId="21"/>
+          <ac:spMkLst>
+            <pc:docMk/>
+            <pc:sldMk cId="3625231182" sldId="256"/>
+            <ac:spMk id="18" creationId="{65821429-491A-9695-79A1-DDBAF1D91760}"/>
           </ac:spMkLst>
         </pc:spChg>
         <pc:spChg chg="add mod">
@@ -164,47 +260,39 @@
           <ac:spMkLst>
             <pc:docMk/>
             <pc:sldMk cId="3625231182" sldId="256"/>
-            <ac:spMk id="9" creationId="{49E7EF79-54F5-6957-912D-F5211AE7C345}"/>
+            <ac:spMk id="18" creationId="{A3E2E621-7AB8-A040-2A57-53B40E818136}"/>
           </ac:spMkLst>
         </pc:spChg>
         <pc:spChg chg="add mod">
-          <ac:chgData name="Fatima Pillosu" userId="a6295d4dc9e22643" providerId="LiveId" clId="{C1D7A64D-15B7-4FCE-91E9-6F95F059BEA6}" dt="2025-07-09T12:48:49.330" v="2098"/>
-          <ac:spMkLst>
-            <pc:docMk/>
-            <pc:sldMk cId="3625231182" sldId="256"/>
-            <ac:spMk id="10" creationId="{F2DC4528-4346-4046-4366-D22CF29233CB}"/>
+          <ac:chgData name="Fatima Pillosu" userId="a6295d4dc9e22643" providerId="LiveId" clId="{C1D7A64D-15B7-4FCE-91E9-6F95F059BEA6}" dt="2025-07-10T13:49:29.655" v="2236" actId="20577"/>
+          <ac:spMkLst>
+            <pc:docMk/>
+            <pc:sldMk cId="3625231182" sldId="256"/>
+            <ac:spMk id="19" creationId="{CD4285D8-26EE-30B9-3358-672E37B89C30}"/>
           </ac:spMkLst>
         </pc:spChg>
         <pc:spChg chg="add mod">
-          <ac:chgData name="Fatima Pillosu" userId="a6295d4dc9e22643" providerId="LiveId" clId="{C1D7A64D-15B7-4FCE-91E9-6F95F059BEA6}" dt="2025-07-09T12:48:49.330" v="2098"/>
-          <ac:spMkLst>
-            <pc:docMk/>
-            <pc:sldMk cId="3625231182" sldId="256"/>
-            <ac:spMk id="11" creationId="{65821429-491A-9695-79A1-DDBAF1D91760}"/>
-          </ac:spMkLst>
-        </pc:spChg>
-        <pc:spChg chg="del mod">
-          <ac:chgData name="Fatima Pillosu" userId="a6295d4dc9e22643" providerId="LiveId" clId="{C1D7A64D-15B7-4FCE-91E9-6F95F059BEA6}" dt="2025-06-29T22:09:08.254" v="364" actId="478"/>
-          <ac:spMkLst>
-            <pc:docMk/>
-            <pc:sldMk cId="3625231182" sldId="256"/>
-            <ac:spMk id="14" creationId="{2F2D05E8-4713-1153-B926-48BFD60244F4}"/>
-          </ac:spMkLst>
-        </pc:spChg>
-        <pc:spChg chg="del mod ord">
-          <ac:chgData name="Fatima Pillosu" userId="a6295d4dc9e22643" providerId="LiveId" clId="{C1D7A64D-15B7-4FCE-91E9-6F95F059BEA6}" dt="2025-06-29T23:03:08.104" v="1885" actId="21"/>
-          <ac:spMkLst>
-            <pc:docMk/>
-            <pc:sldMk cId="3625231182" sldId="256"/>
-            <ac:spMk id="15" creationId="{D263CB68-6070-0BB4-645F-52A1DF1CCB45}"/>
+          <ac:chgData name="Fatima Pillosu" userId="a6295d4dc9e22643" providerId="LiveId" clId="{C1D7A64D-15B7-4FCE-91E9-6F95F059BEA6}" dt="2025-07-10T13:49:36.385" v="2240" actId="20577"/>
+          <ac:spMkLst>
+            <pc:docMk/>
+            <pc:sldMk cId="3625231182" sldId="256"/>
+            <ac:spMk id="20" creationId="{C6E591DB-9A84-55EC-D1CB-CA85BE21C00A}"/>
           </ac:spMkLst>
         </pc:spChg>
         <pc:spChg chg="add mod">
-          <ac:chgData name="Fatima Pillosu" userId="a6295d4dc9e22643" providerId="LiveId" clId="{C1D7A64D-15B7-4FCE-91E9-6F95F059BEA6}" dt="2025-07-09T12:48:49.330" v="2098"/>
-          <ac:spMkLst>
-            <pc:docMk/>
-            <pc:sldMk cId="3625231182" sldId="256"/>
-            <ac:spMk id="15" creationId="{FCCCE2D9-7F44-7612-D249-E404F415A435}"/>
+          <ac:chgData name="Fatima Pillosu" userId="a6295d4dc9e22643" providerId="LiveId" clId="{C1D7A64D-15B7-4FCE-91E9-6F95F059BEA6}" dt="2025-07-10T13:50:21.399" v="2269" actId="20577"/>
+          <ac:spMkLst>
+            <pc:docMk/>
+            <pc:sldMk cId="3625231182" sldId="256"/>
+            <ac:spMk id="21" creationId="{8D1946FF-AFE3-1103-CD5E-82A774BB18CF}"/>
+          </ac:spMkLst>
+        </pc:spChg>
+        <pc:spChg chg="del">
+          <ac:chgData name="Fatima Pillosu" userId="a6295d4dc9e22643" providerId="LiveId" clId="{C1D7A64D-15B7-4FCE-91E9-6F95F059BEA6}" dt="2025-06-29T22:08:25.640" v="275" actId="478"/>
+          <ac:spMkLst>
+            <pc:docMk/>
+            <pc:sldMk cId="3625231182" sldId="256"/>
+            <ac:spMk id="22" creationId="{42812344-6852-1F9F-A492-AEB4CD688F2F}"/>
           </ac:spMkLst>
         </pc:spChg>
         <pc:spChg chg="del mod">
@@ -212,23 +300,7 @@
           <ac:spMkLst>
             <pc:docMk/>
             <pc:sldMk cId="3625231182" sldId="256"/>
-            <ac:spMk id="16" creationId="{49E7EF79-54F5-6957-912D-F5211AE7C345}"/>
-          </ac:spMkLst>
-        </pc:spChg>
-        <pc:spChg chg="add mod">
-          <ac:chgData name="Fatima Pillosu" userId="a6295d4dc9e22643" providerId="LiveId" clId="{C1D7A64D-15B7-4FCE-91E9-6F95F059BEA6}" dt="2025-07-09T12:48:49.330" v="2098"/>
-          <ac:spMkLst>
-            <pc:docMk/>
-            <pc:sldMk cId="3625231182" sldId="256"/>
-            <ac:spMk id="16" creationId="{A4D6D809-F63A-0BB5-A944-F32D1EB0F1C2}"/>
-          </ac:spMkLst>
-        </pc:spChg>
-        <pc:spChg chg="add mod">
-          <ac:chgData name="Fatima Pillosu" userId="a6295d4dc9e22643" providerId="LiveId" clId="{C1D7A64D-15B7-4FCE-91E9-6F95F059BEA6}" dt="2025-07-09T12:48:49.330" v="2098"/>
-          <ac:spMkLst>
-            <pc:docMk/>
-            <pc:sldMk cId="3625231182" sldId="256"/>
-            <ac:spMk id="17" creationId="{336F1B2A-522C-7B79-D3EB-34DC5339E4E0}"/>
+            <ac:spMk id="23" creationId="{FCCCE2D9-7F44-7612-D249-E404F415A435}"/>
           </ac:spMkLst>
         </pc:spChg>
         <pc:spChg chg="del mod">
@@ -236,7 +308,7 @@
           <ac:spMkLst>
             <pc:docMk/>
             <pc:sldMk cId="3625231182" sldId="256"/>
-            <ac:spMk id="17" creationId="{F2DC4528-4346-4046-4366-D22CF29233CB}"/>
+            <ac:spMk id="24" creationId="{A4D6D809-F63A-0BB5-A944-F32D1EB0F1C2}"/>
           </ac:spMkLst>
         </pc:spChg>
         <pc:spChg chg="del mod">
@@ -244,47 +316,63 @@
           <ac:spMkLst>
             <pc:docMk/>
             <pc:sldMk cId="3625231182" sldId="256"/>
-            <ac:spMk id="18" creationId="{65821429-491A-9695-79A1-DDBAF1D91760}"/>
-          </ac:spMkLst>
-        </pc:spChg>
-        <pc:spChg chg="add mod">
-          <ac:chgData name="Fatima Pillosu" userId="a6295d4dc9e22643" providerId="LiveId" clId="{C1D7A64D-15B7-4FCE-91E9-6F95F059BEA6}" dt="2025-07-09T12:48:49.330" v="2098"/>
-          <ac:spMkLst>
-            <pc:docMk/>
-            <pc:sldMk cId="3625231182" sldId="256"/>
-            <ac:spMk id="18" creationId="{A3E2E621-7AB8-A040-2A57-53B40E818136}"/>
-          </ac:spMkLst>
-        </pc:spChg>
-        <pc:spChg chg="add mod">
-          <ac:chgData name="Fatima Pillosu" userId="a6295d4dc9e22643" providerId="LiveId" clId="{C1D7A64D-15B7-4FCE-91E9-6F95F059BEA6}" dt="2025-07-09T12:48:49.330" v="2098"/>
-          <ac:spMkLst>
-            <pc:docMk/>
-            <pc:sldMk cId="3625231182" sldId="256"/>
-            <ac:spMk id="19" creationId="{CD4285D8-26EE-30B9-3358-672E37B89C30}"/>
-          </ac:spMkLst>
-        </pc:spChg>
-        <pc:spChg chg="add mod">
-          <ac:chgData name="Fatima Pillosu" userId="a6295d4dc9e22643" providerId="LiveId" clId="{C1D7A64D-15B7-4FCE-91E9-6F95F059BEA6}" dt="2025-07-09T12:48:49.330" v="2098"/>
-          <ac:spMkLst>
-            <pc:docMk/>
-            <pc:sldMk cId="3625231182" sldId="256"/>
-            <ac:spMk id="20" creationId="{C6E591DB-9A84-55EC-D1CB-CA85BE21C00A}"/>
-          </ac:spMkLst>
-        </pc:spChg>
-        <pc:spChg chg="add mod">
-          <ac:chgData name="Fatima Pillosu" userId="a6295d4dc9e22643" providerId="LiveId" clId="{C1D7A64D-15B7-4FCE-91E9-6F95F059BEA6}" dt="2025-07-09T12:48:49.330" v="2098"/>
-          <ac:spMkLst>
-            <pc:docMk/>
-            <pc:sldMk cId="3625231182" sldId="256"/>
-            <ac:spMk id="21" creationId="{8D1946FF-AFE3-1103-CD5E-82A774BB18CF}"/>
-          </ac:spMkLst>
-        </pc:spChg>
-        <pc:spChg chg="del">
-          <ac:chgData name="Fatima Pillosu" userId="a6295d4dc9e22643" providerId="LiveId" clId="{C1D7A64D-15B7-4FCE-91E9-6F95F059BEA6}" dt="2025-06-29T22:08:25.640" v="275" actId="478"/>
-          <ac:spMkLst>
-            <pc:docMk/>
-            <pc:sldMk cId="3625231182" sldId="256"/>
-            <ac:spMk id="22" creationId="{42812344-6852-1F9F-A492-AEB4CD688F2F}"/>
+            <ac:spMk id="25" creationId="{336F1B2A-522C-7B79-D3EB-34DC5339E4E0}"/>
+          </ac:spMkLst>
+        </pc:spChg>
+        <pc:spChg chg="add del mod">
+          <ac:chgData name="Fatima Pillosu" userId="a6295d4dc9e22643" providerId="LiveId" clId="{C1D7A64D-15B7-4FCE-91E9-6F95F059BEA6}" dt="2025-07-10T13:49:43.723" v="2242" actId="478"/>
+          <ac:spMkLst>
+            <pc:docMk/>
+            <pc:sldMk cId="3625231182" sldId="256"/>
+            <ac:spMk id="26" creationId="{151BDCEA-207C-CE0D-3A4F-4A049384B2D2}"/>
+          </ac:spMkLst>
+        </pc:spChg>
+        <pc:spChg chg="del mod">
+          <ac:chgData name="Fatima Pillosu" userId="a6295d4dc9e22643" providerId="LiveId" clId="{C1D7A64D-15B7-4FCE-91E9-6F95F059BEA6}" dt="2025-06-29T22:10:55.894" v="429" actId="478"/>
+          <ac:spMkLst>
+            <pc:docMk/>
+            <pc:sldMk cId="3625231182" sldId="256"/>
+            <ac:spMk id="26" creationId="{CEAD783E-22AA-24CE-4F50-8F1EB94C5FEC}"/>
+          </ac:spMkLst>
+        </pc:spChg>
+        <pc:spChg chg="del mod">
+          <ac:chgData name="Fatima Pillosu" userId="a6295d4dc9e22643" providerId="LiveId" clId="{C1D7A64D-15B7-4FCE-91E9-6F95F059BEA6}" dt="2025-06-29T22:40:46.857" v="965" actId="478"/>
+          <ac:spMkLst>
+            <pc:docMk/>
+            <pc:sldMk cId="3625231182" sldId="256"/>
+            <ac:spMk id="27" creationId="{54E20E32-D41C-783A-92BA-2993DE9F2D9B}"/>
+          </ac:spMkLst>
+        </pc:spChg>
+        <pc:spChg chg="add del mod">
+          <ac:chgData name="Fatima Pillosu" userId="a6295d4dc9e22643" providerId="LiveId" clId="{C1D7A64D-15B7-4FCE-91E9-6F95F059BEA6}" dt="2025-07-10T13:49:42.130" v="2241" actId="478"/>
+          <ac:spMkLst>
+            <pc:docMk/>
+            <pc:sldMk cId="3625231182" sldId="256"/>
+            <ac:spMk id="27" creationId="{DC152927-0AC6-09A7-D861-071860AB0F82}"/>
+          </ac:spMkLst>
+        </pc:spChg>
+        <pc:spChg chg="add del mod">
+          <ac:chgData name="Fatima Pillosu" userId="a6295d4dc9e22643" providerId="LiveId" clId="{C1D7A64D-15B7-4FCE-91E9-6F95F059BEA6}" dt="2025-07-10T13:50:29.952" v="2271" actId="478"/>
+          <ac:spMkLst>
+            <pc:docMk/>
+            <pc:sldMk cId="3625231182" sldId="256"/>
+            <ac:spMk id="28" creationId="{0D399520-912A-FB7B-7316-433D9E562933}"/>
+          </ac:spMkLst>
+        </pc:spChg>
+        <pc:spChg chg="del mod">
+          <ac:chgData name="Fatima Pillosu" userId="a6295d4dc9e22643" providerId="LiveId" clId="{C1D7A64D-15B7-4FCE-91E9-6F95F059BEA6}" dt="2025-06-29T22:24:10.060" v="757" actId="478"/>
+          <ac:spMkLst>
+            <pc:docMk/>
+            <pc:sldMk cId="3625231182" sldId="256"/>
+            <ac:spMk id="28" creationId="{8DA2561F-0467-FF76-CD45-646BA340117A}"/>
+          </ac:spMkLst>
+        </pc:spChg>
+        <pc:spChg chg="add del mod">
+          <ac:chgData name="Fatima Pillosu" userId="a6295d4dc9e22643" providerId="LiveId" clId="{C1D7A64D-15B7-4FCE-91E9-6F95F059BEA6}" dt="2025-07-10T13:50:29.952" v="2271" actId="478"/>
+          <ac:spMkLst>
+            <pc:docMk/>
+            <pc:sldMk cId="3625231182" sldId="256"/>
+            <ac:spMk id="29" creationId="{33073E03-F303-77A5-81F7-498EB8604D87}"/>
           </ac:spMkLst>
         </pc:spChg>
         <pc:spChg chg="del mod">
@@ -292,7 +380,15 @@
           <ac:spMkLst>
             <pc:docMk/>
             <pc:sldMk cId="3625231182" sldId="256"/>
-            <ac:spMk id="23" creationId="{FCCCE2D9-7F44-7612-D249-E404F415A435}"/>
+            <ac:spMk id="29" creationId="{A3E2E621-7AB8-A040-2A57-53B40E818136}"/>
+          </ac:spMkLst>
+        </pc:spChg>
+        <pc:spChg chg="add mod">
+          <ac:chgData name="Fatima Pillosu" userId="a6295d4dc9e22643" providerId="LiveId" clId="{C1D7A64D-15B7-4FCE-91E9-6F95F059BEA6}" dt="2025-07-10T13:45:49.772" v="2171"/>
+          <ac:spMkLst>
+            <pc:docMk/>
+            <pc:sldMk cId="3625231182" sldId="256"/>
+            <ac:spMk id="30" creationId="{9FAD5A44-739C-D7FE-D73B-8D3EB63F8DC0}"/>
           </ac:spMkLst>
         </pc:spChg>
         <pc:spChg chg="del mod">
@@ -300,86 +396,6 @@
           <ac:spMkLst>
             <pc:docMk/>
             <pc:sldMk cId="3625231182" sldId="256"/>
-            <ac:spMk id="24" creationId="{A4D6D809-F63A-0BB5-A944-F32D1EB0F1C2}"/>
-          </ac:spMkLst>
-        </pc:spChg>
-        <pc:spChg chg="del mod">
-          <ac:chgData name="Fatima Pillosu" userId="a6295d4dc9e22643" providerId="LiveId" clId="{C1D7A64D-15B7-4FCE-91E9-6F95F059BEA6}" dt="2025-06-29T23:03:08.104" v="1885" actId="21"/>
-          <ac:spMkLst>
-            <pc:docMk/>
-            <pc:sldMk cId="3625231182" sldId="256"/>
-            <ac:spMk id="25" creationId="{336F1B2A-522C-7B79-D3EB-34DC5339E4E0}"/>
-          </ac:spMkLst>
-        </pc:spChg>
-        <pc:spChg chg="add mod">
-          <ac:chgData name="Fatima Pillosu" userId="a6295d4dc9e22643" providerId="LiveId" clId="{C1D7A64D-15B7-4FCE-91E9-6F95F059BEA6}" dt="2025-07-09T12:48:59.019" v="2099" actId="554"/>
-          <ac:spMkLst>
-            <pc:docMk/>
-            <pc:sldMk cId="3625231182" sldId="256"/>
-            <ac:spMk id="26" creationId="{151BDCEA-207C-CE0D-3A4F-4A049384B2D2}"/>
-          </ac:spMkLst>
-        </pc:spChg>
-        <pc:spChg chg="del mod">
-          <ac:chgData name="Fatima Pillosu" userId="a6295d4dc9e22643" providerId="LiveId" clId="{C1D7A64D-15B7-4FCE-91E9-6F95F059BEA6}" dt="2025-06-29T22:10:55.894" v="429" actId="478"/>
-          <ac:spMkLst>
-            <pc:docMk/>
-            <pc:sldMk cId="3625231182" sldId="256"/>
-            <ac:spMk id="26" creationId="{CEAD783E-22AA-24CE-4F50-8F1EB94C5FEC}"/>
-          </ac:spMkLst>
-        </pc:spChg>
-        <pc:spChg chg="del mod">
-          <ac:chgData name="Fatima Pillosu" userId="a6295d4dc9e22643" providerId="LiveId" clId="{C1D7A64D-15B7-4FCE-91E9-6F95F059BEA6}" dt="2025-06-29T22:40:46.857" v="965" actId="478"/>
-          <ac:spMkLst>
-            <pc:docMk/>
-            <pc:sldMk cId="3625231182" sldId="256"/>
-            <ac:spMk id="27" creationId="{54E20E32-D41C-783A-92BA-2993DE9F2D9B}"/>
-          </ac:spMkLst>
-        </pc:spChg>
-        <pc:spChg chg="add mod">
-          <ac:chgData name="Fatima Pillosu" userId="a6295d4dc9e22643" providerId="LiveId" clId="{C1D7A64D-15B7-4FCE-91E9-6F95F059BEA6}" dt="2025-07-09T12:48:59.019" v="2099" actId="554"/>
-          <ac:spMkLst>
-            <pc:docMk/>
-            <pc:sldMk cId="3625231182" sldId="256"/>
-            <ac:spMk id="27" creationId="{DC152927-0AC6-09A7-D861-071860AB0F82}"/>
-          </ac:spMkLst>
-        </pc:spChg>
-        <pc:spChg chg="add mod">
-          <ac:chgData name="Fatima Pillosu" userId="a6295d4dc9e22643" providerId="LiveId" clId="{C1D7A64D-15B7-4FCE-91E9-6F95F059BEA6}" dt="2025-07-09T12:48:59.019" v="2099" actId="554"/>
-          <ac:spMkLst>
-            <pc:docMk/>
-            <pc:sldMk cId="3625231182" sldId="256"/>
-            <ac:spMk id="28" creationId="{0D399520-912A-FB7B-7316-433D9E562933}"/>
-          </ac:spMkLst>
-        </pc:spChg>
-        <pc:spChg chg="del mod">
-          <ac:chgData name="Fatima Pillosu" userId="a6295d4dc9e22643" providerId="LiveId" clId="{C1D7A64D-15B7-4FCE-91E9-6F95F059BEA6}" dt="2025-06-29T22:24:10.060" v="757" actId="478"/>
-          <ac:spMkLst>
-            <pc:docMk/>
-            <pc:sldMk cId="3625231182" sldId="256"/>
-            <ac:spMk id="28" creationId="{8DA2561F-0467-FF76-CD45-646BA340117A}"/>
-          </ac:spMkLst>
-        </pc:spChg>
-        <pc:spChg chg="add mod">
-          <ac:chgData name="Fatima Pillosu" userId="a6295d4dc9e22643" providerId="LiveId" clId="{C1D7A64D-15B7-4FCE-91E9-6F95F059BEA6}" dt="2025-07-09T12:48:59.019" v="2099" actId="554"/>
-          <ac:spMkLst>
-            <pc:docMk/>
-            <pc:sldMk cId="3625231182" sldId="256"/>
-            <ac:spMk id="29" creationId="{33073E03-F303-77A5-81F7-498EB8604D87}"/>
-          </ac:spMkLst>
-        </pc:spChg>
-        <pc:spChg chg="del mod">
-          <ac:chgData name="Fatima Pillosu" userId="a6295d4dc9e22643" providerId="LiveId" clId="{C1D7A64D-15B7-4FCE-91E9-6F95F059BEA6}" dt="2025-06-29T23:03:08.104" v="1885" actId="21"/>
-          <ac:spMkLst>
-            <pc:docMk/>
-            <pc:sldMk cId="3625231182" sldId="256"/>
-            <ac:spMk id="29" creationId="{A3E2E621-7AB8-A040-2A57-53B40E818136}"/>
-          </ac:spMkLst>
-        </pc:spChg>
-        <pc:spChg chg="del mod">
-          <ac:chgData name="Fatima Pillosu" userId="a6295d4dc9e22643" providerId="LiveId" clId="{C1D7A64D-15B7-4FCE-91E9-6F95F059BEA6}" dt="2025-06-29T23:03:08.104" v="1885" actId="21"/>
-          <ac:spMkLst>
-            <pc:docMk/>
-            <pc:sldMk cId="3625231182" sldId="256"/>
             <ac:spMk id="30" creationId="{CD4285D8-26EE-30B9-3358-672E37B89C30}"/>
           </ac:spMkLst>
         </pc:spChg>
@@ -391,6 +407,14 @@
             <ac:spMk id="31" creationId="{C6E591DB-9A84-55EC-D1CB-CA85BE21C00A}"/>
           </ac:spMkLst>
         </pc:spChg>
+        <pc:spChg chg="add mod">
+          <ac:chgData name="Fatima Pillosu" userId="a6295d4dc9e22643" providerId="LiveId" clId="{C1D7A64D-15B7-4FCE-91E9-6F95F059BEA6}" dt="2025-07-10T13:48:49.351" v="2210" actId="20577"/>
+          <ac:spMkLst>
+            <pc:docMk/>
+            <pc:sldMk cId="3625231182" sldId="256"/>
+            <ac:spMk id="32" creationId="{3FD943B1-6BB5-2F8A-2C27-6CBECED16F74}"/>
+          </ac:spMkLst>
+        </pc:spChg>
         <pc:spChg chg="add del mod">
           <ac:chgData name="Fatima Pillosu" userId="a6295d4dc9e22643" providerId="LiveId" clId="{C1D7A64D-15B7-4FCE-91E9-6F95F059BEA6}" dt="2025-06-29T23:03:08.104" v="1885" actId="21"/>
           <ac:spMkLst>
@@ -407,6 +431,14 @@
             <ac:spMk id="33" creationId="{5DBEF880-152E-4877-0127-81806F95BD35}"/>
           </ac:spMkLst>
         </pc:spChg>
+        <pc:spChg chg="add mod">
+          <ac:chgData name="Fatima Pillosu" userId="a6295d4dc9e22643" providerId="LiveId" clId="{C1D7A64D-15B7-4FCE-91E9-6F95F059BEA6}" dt="2025-07-10T13:53:12.605" v="2378" actId="1037"/>
+          <ac:spMkLst>
+            <pc:docMk/>
+            <pc:sldMk cId="3625231182" sldId="256"/>
+            <ac:spMk id="33" creationId="{87289969-BCC2-529D-8721-8D2679FD6FE0}"/>
+          </ac:spMkLst>
+        </pc:spChg>
         <pc:spChg chg="add del mod">
           <ac:chgData name="Fatima Pillosu" userId="a6295d4dc9e22643" providerId="LiveId" clId="{C1D7A64D-15B7-4FCE-91E9-6F95F059BEA6}" dt="2025-06-29T22:16:03.941" v="535" actId="478"/>
           <ac:spMkLst>
@@ -415,12 +447,44 @@
             <ac:spMk id="34" creationId="{2853C14E-EEE4-84B6-6CA7-D886153DD02D}"/>
           </ac:spMkLst>
         </pc:spChg>
+        <pc:spChg chg="add mod">
+          <ac:chgData name="Fatima Pillosu" userId="a6295d4dc9e22643" providerId="LiveId" clId="{C1D7A64D-15B7-4FCE-91E9-6F95F059BEA6}" dt="2025-07-10T13:49:59.551" v="2255" actId="20577"/>
+          <ac:spMkLst>
+            <pc:docMk/>
+            <pc:sldMk cId="3625231182" sldId="256"/>
+            <ac:spMk id="34" creationId="{39109DB5-478B-DF93-BCD9-9C00D3305A60}"/>
+          </ac:spMkLst>
+        </pc:spChg>
+        <pc:spChg chg="add mod">
+          <ac:chgData name="Fatima Pillosu" userId="a6295d4dc9e22643" providerId="LiveId" clId="{C1D7A64D-15B7-4FCE-91E9-6F95F059BEA6}" dt="2025-07-10T13:50:08.986" v="2264" actId="20577"/>
+          <ac:spMkLst>
+            <pc:docMk/>
+            <pc:sldMk cId="3625231182" sldId="256"/>
+            <ac:spMk id="35" creationId="{0C16509C-6817-1340-CB24-8C505B180F4D}"/>
+          </ac:spMkLst>
+        </pc:spChg>
         <pc:spChg chg="add del mod">
           <ac:chgData name="Fatima Pillosu" userId="a6295d4dc9e22643" providerId="LiveId" clId="{C1D7A64D-15B7-4FCE-91E9-6F95F059BEA6}" dt="2025-06-29T22:15:33.102" v="531" actId="478"/>
           <ac:spMkLst>
             <pc:docMk/>
             <pc:sldMk cId="3625231182" sldId="256"/>
             <ac:spMk id="35" creationId="{267C66CE-278C-0AF6-B116-3DFED6840CEA}"/>
+          </ac:spMkLst>
+        </pc:spChg>
+        <pc:spChg chg="add mod">
+          <ac:chgData name="Fatima Pillosu" userId="a6295d4dc9e22643" providerId="LiveId" clId="{C1D7A64D-15B7-4FCE-91E9-6F95F059BEA6}" dt="2025-07-10T13:51:03.891" v="2365" actId="20577"/>
+          <ac:spMkLst>
+            <pc:docMk/>
+            <pc:sldMk cId="3625231182" sldId="256"/>
+            <ac:spMk id="36" creationId="{6AA39C67-285B-2705-9A9B-CE9A67567D95}"/>
+          </ac:spMkLst>
+        </pc:spChg>
+        <pc:spChg chg="add mod">
+          <ac:chgData name="Fatima Pillosu" userId="a6295d4dc9e22643" providerId="LiveId" clId="{C1D7A64D-15B7-4FCE-91E9-6F95F059BEA6}" dt="2025-07-10T13:51:07.113" v="2367" actId="20577"/>
+          <ac:spMkLst>
+            <pc:docMk/>
+            <pc:sldMk cId="3625231182" sldId="256"/>
+            <ac:spMk id="37" creationId="{305BCB07-94A7-5D7E-EBA5-EE3EF87D4F29}"/>
           </ac:spMkLst>
         </pc:spChg>
         <pc:spChg chg="add del mod">
@@ -712,7 +776,7 @@
           </ac:picMkLst>
         </pc:picChg>
         <pc:picChg chg="add mod">
-          <ac:chgData name="Fatima Pillosu" userId="a6295d4dc9e22643" providerId="LiveId" clId="{C1D7A64D-15B7-4FCE-91E9-6F95F059BEA6}" dt="2025-07-09T12:48:49.330" v="2098"/>
+          <ac:chgData name="Fatima Pillosu" userId="a6295d4dc9e22643" providerId="LiveId" clId="{C1D7A64D-15B7-4FCE-91E9-6F95F059BEA6}" dt="2025-07-10T13:53:12.605" v="2378" actId="1037"/>
           <ac:picMkLst>
             <pc:docMk/>
             <pc:sldMk cId="3625231182" sldId="256"/>
@@ -759,8 +823,8 @@
             <ac:picMk id="12" creationId="{772D0341-E5F7-2687-75CD-9E4921C16E7D}"/>
           </ac:picMkLst>
         </pc:picChg>
-        <pc:picChg chg="add mod">
-          <ac:chgData name="Fatima Pillosu" userId="a6295d4dc9e22643" providerId="LiveId" clId="{C1D7A64D-15B7-4FCE-91E9-6F95F059BEA6}" dt="2025-07-09T12:48:49.330" v="2098"/>
+        <pc:picChg chg="add del mod ord">
+          <ac:chgData name="Fatima Pillosu" userId="a6295d4dc9e22643" providerId="LiveId" clId="{C1D7A64D-15B7-4FCE-91E9-6F95F059BEA6}" dt="2025-07-10T13:53:12.605" v="2378" actId="1037"/>
           <ac:picMkLst>
             <pc:docMk/>
             <pc:sldMk cId="3625231182" sldId="256"/>
@@ -768,7 +832,7 @@
           </ac:picMkLst>
         </pc:picChg>
         <pc:picChg chg="add mod">
-          <ac:chgData name="Fatima Pillosu" userId="a6295d4dc9e22643" providerId="LiveId" clId="{C1D7A64D-15B7-4FCE-91E9-6F95F059BEA6}" dt="2025-07-09T12:48:49.330" v="2098"/>
+          <ac:chgData name="Fatima Pillosu" userId="a6295d4dc9e22643" providerId="LiveId" clId="{C1D7A64D-15B7-4FCE-91E9-6F95F059BEA6}" dt="2025-07-10T13:53:12.605" v="2378" actId="1037"/>
           <ac:picMkLst>
             <pc:docMk/>
             <pc:sldMk cId="3625231182" sldId="256"/>
@@ -783,8 +847,8 @@
             <ac:picMk id="13" creationId="{BD9E0C66-19FB-2C77-C5A4-61A6DCAD8A49}"/>
           </ac:picMkLst>
         </pc:picChg>
-        <pc:picChg chg="add mod">
-          <ac:chgData name="Fatima Pillosu" userId="a6295d4dc9e22643" providerId="LiveId" clId="{C1D7A64D-15B7-4FCE-91E9-6F95F059BEA6}" dt="2025-07-09T12:48:49.330" v="2098"/>
+        <pc:picChg chg="add del mod ord">
+          <ac:chgData name="Fatima Pillosu" userId="a6295d4dc9e22643" providerId="LiveId" clId="{C1D7A64D-15B7-4FCE-91E9-6F95F059BEA6}" dt="2025-07-10T13:46:59.610" v="2185" actId="478"/>
           <ac:picMkLst>
             <pc:docMk/>
             <pc:sldMk cId="3625231182" sldId="256"/>
@@ -816,11 +880,19 @@
           </ac:picMkLst>
         </pc:picChg>
         <pc:picChg chg="add mod">
-          <ac:chgData name="Fatima Pillosu" userId="a6295d4dc9e22643" providerId="LiveId" clId="{C1D7A64D-15B7-4FCE-91E9-6F95F059BEA6}" dt="2025-07-09T12:48:49.330" v="2098"/>
+          <ac:chgData name="Fatima Pillosu" userId="a6295d4dc9e22643" providerId="LiveId" clId="{C1D7A64D-15B7-4FCE-91E9-6F95F059BEA6}" dt="2025-07-10T13:53:12.605" v="2378" actId="1037"/>
           <ac:picMkLst>
             <pc:docMk/>
             <pc:sldMk cId="3625231182" sldId="256"/>
             <ac:picMk id="25" creationId="{0214E89D-0E4B-1C85-2C15-57E6763586F2}"/>
+          </ac:picMkLst>
+        </pc:picChg>
+        <pc:picChg chg="add mod ord">
+          <ac:chgData name="Fatima Pillosu" userId="a6295d4dc9e22643" providerId="LiveId" clId="{C1D7A64D-15B7-4FCE-91E9-6F95F059BEA6}" dt="2025-07-10T13:53:12.605" v="2378" actId="1037"/>
+          <ac:picMkLst>
+            <pc:docMk/>
+            <pc:sldMk cId="3625231182" sldId="256"/>
+            <ac:picMk id="31" creationId="{9D520869-5E00-1D5A-F25F-D2C3C7DFB800}"/>
           </ac:picMkLst>
         </pc:picChg>
         <pc:picChg chg="add del mod">
@@ -960,7 +1032,7 @@
           </ac:picMkLst>
         </pc:picChg>
         <pc:cxnChg chg="add mod">
-          <ac:chgData name="Fatima Pillosu" userId="a6295d4dc9e22643" providerId="LiveId" clId="{C1D7A64D-15B7-4FCE-91E9-6F95F059BEA6}" dt="2025-07-09T12:48:49.330" v="2098"/>
+          <ac:chgData name="Fatima Pillosu" userId="a6295d4dc9e22643" providerId="LiveId" clId="{C1D7A64D-15B7-4FCE-91E9-6F95F059BEA6}" dt="2025-07-10T13:53:12.605" v="2378" actId="1037"/>
           <ac:cxnSpMkLst>
             <pc:docMk/>
             <pc:sldMk cId="3625231182" sldId="256"/>
@@ -968,7 +1040,7 @@
           </ac:cxnSpMkLst>
         </pc:cxnChg>
         <pc:cxnChg chg="add mod">
-          <ac:chgData name="Fatima Pillosu" userId="a6295d4dc9e22643" providerId="LiveId" clId="{C1D7A64D-15B7-4FCE-91E9-6F95F059BEA6}" dt="2025-07-09T12:48:49.330" v="2098"/>
+          <ac:chgData name="Fatima Pillosu" userId="a6295d4dc9e22643" providerId="LiveId" clId="{C1D7A64D-15B7-4FCE-91E9-6F95F059BEA6}" dt="2025-07-10T13:53:12.605" v="2378" actId="1037"/>
           <ac:cxnSpMkLst>
             <pc:docMk/>
             <pc:sldMk cId="3625231182" sldId="256"/>
@@ -976,7 +1048,7 @@
           </ac:cxnSpMkLst>
         </pc:cxnChg>
         <pc:cxnChg chg="add mod">
-          <ac:chgData name="Fatima Pillosu" userId="a6295d4dc9e22643" providerId="LiveId" clId="{C1D7A64D-15B7-4FCE-91E9-6F95F059BEA6}" dt="2025-07-09T12:48:49.330" v="2098"/>
+          <ac:chgData name="Fatima Pillosu" userId="a6295d4dc9e22643" providerId="LiveId" clId="{C1D7A64D-15B7-4FCE-91E9-6F95F059BEA6}" dt="2025-07-10T13:53:12.605" v="2378" actId="1037"/>
           <ac:cxnSpMkLst>
             <pc:docMk/>
             <pc:sldMk cId="3625231182" sldId="256"/>
@@ -1168,7 +1240,7 @@
           <a:p>
             <a:fld id="{229EEE7B-5B8B-48DD-91DD-513D1D569173}" type="datetimeFigureOut">
               <a:rPr lang="en-GB" smtClean="0"/>
-              <a:t>09/07/2025</a:t>
+              <a:t>10/07/2025</a:t>
             </a:fld>
             <a:endParaRPr lang="en-GB"/>
           </a:p>
@@ -1338,7 +1410,7 @@
           <a:p>
             <a:fld id="{229EEE7B-5B8B-48DD-91DD-513D1D569173}" type="datetimeFigureOut">
               <a:rPr lang="en-GB" smtClean="0"/>
-              <a:t>09/07/2025</a:t>
+              <a:t>10/07/2025</a:t>
             </a:fld>
             <a:endParaRPr lang="en-GB"/>
           </a:p>
@@ -1518,7 +1590,7 @@
           <a:p>
             <a:fld id="{229EEE7B-5B8B-48DD-91DD-513D1D569173}" type="datetimeFigureOut">
               <a:rPr lang="en-GB" smtClean="0"/>
-              <a:t>09/07/2025</a:t>
+              <a:t>10/07/2025</a:t>
             </a:fld>
             <a:endParaRPr lang="en-GB"/>
           </a:p>
@@ -1688,7 +1760,7 @@
           <a:p>
             <a:fld id="{229EEE7B-5B8B-48DD-91DD-513D1D569173}" type="datetimeFigureOut">
               <a:rPr lang="en-GB" smtClean="0"/>
-              <a:t>09/07/2025</a:t>
+              <a:t>10/07/2025</a:t>
             </a:fld>
             <a:endParaRPr lang="en-GB"/>
           </a:p>
@@ -1934,7 +2006,7 @@
           <a:p>
             <a:fld id="{229EEE7B-5B8B-48DD-91DD-513D1D569173}" type="datetimeFigureOut">
               <a:rPr lang="en-GB" smtClean="0"/>
-              <a:t>09/07/2025</a:t>
+              <a:t>10/07/2025</a:t>
             </a:fld>
             <a:endParaRPr lang="en-GB"/>
           </a:p>
@@ -2166,7 +2238,7 @@
           <a:p>
             <a:fld id="{229EEE7B-5B8B-48DD-91DD-513D1D569173}" type="datetimeFigureOut">
               <a:rPr lang="en-GB" smtClean="0"/>
-              <a:t>09/07/2025</a:t>
+              <a:t>10/07/2025</a:t>
             </a:fld>
             <a:endParaRPr lang="en-GB"/>
           </a:p>
@@ -2533,7 +2605,7 @@
           <a:p>
             <a:fld id="{229EEE7B-5B8B-48DD-91DD-513D1D569173}" type="datetimeFigureOut">
               <a:rPr lang="en-GB" smtClean="0"/>
-              <a:t>09/07/2025</a:t>
+              <a:t>10/07/2025</a:t>
             </a:fld>
             <a:endParaRPr lang="en-GB"/>
           </a:p>
@@ -2651,7 +2723,7 @@
           <a:p>
             <a:fld id="{229EEE7B-5B8B-48DD-91DD-513D1D569173}" type="datetimeFigureOut">
               <a:rPr lang="en-GB" smtClean="0"/>
-              <a:t>09/07/2025</a:t>
+              <a:t>10/07/2025</a:t>
             </a:fld>
             <a:endParaRPr lang="en-GB"/>
           </a:p>
@@ -2746,7 +2818,7 @@
           <a:p>
             <a:fld id="{229EEE7B-5B8B-48DD-91DD-513D1D569173}" type="datetimeFigureOut">
               <a:rPr lang="en-GB" smtClean="0"/>
-              <a:t>09/07/2025</a:t>
+              <a:t>10/07/2025</a:t>
             </a:fld>
             <a:endParaRPr lang="en-GB"/>
           </a:p>
@@ -3023,7 +3095,7 @@
           <a:p>
             <a:fld id="{229EEE7B-5B8B-48DD-91DD-513D1D569173}" type="datetimeFigureOut">
               <a:rPr lang="en-GB" smtClean="0"/>
-              <a:t>09/07/2025</a:t>
+              <a:t>10/07/2025</a:t>
             </a:fld>
             <a:endParaRPr lang="en-GB"/>
           </a:p>
@@ -3280,7 +3352,7 @@
           <a:p>
             <a:fld id="{229EEE7B-5B8B-48DD-91DD-513D1D569173}" type="datetimeFigureOut">
               <a:rPr lang="en-GB" smtClean="0"/>
-              <a:t>09/07/2025</a:t>
+              <a:t>10/07/2025</a:t>
             </a:fld>
             <a:endParaRPr lang="en-GB"/>
           </a:p>
@@ -3493,7 +3565,7 @@
           <a:p>
             <a:fld id="{229EEE7B-5B8B-48DD-91DD-513D1D569173}" type="datetimeFigureOut">
               <a:rPr lang="en-GB" smtClean="0"/>
-              <a:t>09/07/2025</a:t>
+              <a:t>10/07/2025</a:t>
             </a:fld>
             <a:endParaRPr lang="en-GB"/>
           </a:p>
@@ -3900,6 +3972,66 @@
       </p:grpSpPr>
       <p:pic>
         <p:nvPicPr>
+          <p:cNvPr id="12" name="Picture 11">
+            <a:extLst>
+              <a:ext uri="{FF2B5EF4-FFF2-40B4-BE49-F238E27FC236}">
+                <a16:creationId xmlns:a16="http://schemas.microsoft.com/office/drawing/2014/main" id="{EB691A0B-FD3C-F64F-4893-DF1AE6C90CCA}"/>
+              </a:ext>
+            </a:extLst>
+          </p:cNvPr>
+          <p:cNvPicPr>
+            <a:picLocks noChangeAspect="1"/>
+          </p:cNvPicPr>
+          <p:nvPr/>
+        </p:nvPicPr>
+        <p:blipFill>
+          <a:blip r:embed="rId2"/>
+          <a:stretch>
+            <a:fillRect/>
+          </a:stretch>
+        </p:blipFill>
+        <p:spPr>
+          <a:xfrm>
+            <a:off x="346411" y="1232139"/>
+            <a:ext cx="585000" cy="360000"/>
+          </a:xfrm>
+          <a:prstGeom prst="rect">
+            <a:avLst/>
+          </a:prstGeom>
+        </p:spPr>
+      </p:pic>
+      <p:pic>
+        <p:nvPicPr>
+          <p:cNvPr id="31" name="Picture 30">
+            <a:extLst>
+              <a:ext uri="{FF2B5EF4-FFF2-40B4-BE49-F238E27FC236}">
+                <a16:creationId xmlns:a16="http://schemas.microsoft.com/office/drawing/2014/main" id="{9D520869-5E00-1D5A-F25F-D2C3C7DFB800}"/>
+              </a:ext>
+            </a:extLst>
+          </p:cNvPr>
+          <p:cNvPicPr>
+            <a:picLocks noChangeAspect="1"/>
+          </p:cNvPicPr>
+          <p:nvPr/>
+        </p:nvPicPr>
+        <p:blipFill>
+          <a:blip r:embed="rId3"/>
+          <a:stretch>
+            <a:fillRect/>
+          </a:stretch>
+        </p:blipFill>
+        <p:spPr>
+          <a:xfrm>
+            <a:off x="3228153" y="1232139"/>
+            <a:ext cx="585000" cy="360000"/>
+          </a:xfrm>
+          <a:prstGeom prst="rect">
+            <a:avLst/>
+          </a:prstGeom>
+        </p:spPr>
+      </p:pic>
+      <p:pic>
+        <p:nvPicPr>
           <p:cNvPr id="3" name="Picture 2">
             <a:extLst>
               <a:ext uri="{FF2B5EF4-FFF2-40B4-BE49-F238E27FC236}">
@@ -3913,7 +4045,7 @@
           <p:nvPr/>
         </p:nvPicPr>
         <p:blipFill>
-          <a:blip r:embed="rId2"/>
+          <a:blip r:embed="rId4"/>
           <a:stretch>
             <a:fillRect/>
           </a:stretch>
@@ -3943,7 +4075,7 @@
           <p:nvPr/>
         </p:nvPicPr>
         <p:blipFill>
-          <a:blip r:embed="rId3"/>
+          <a:blip r:embed="rId5"/>
           <a:stretch>
             <a:fillRect/>
           </a:stretch>
@@ -3973,7 +4105,7 @@
           <p:nvPr/>
         </p:nvPicPr>
         <p:blipFill>
-          <a:blip r:embed="rId4"/>
+          <a:blip r:embed="rId6"/>
           <a:stretch>
             <a:fillRect/>
           </a:stretch>
@@ -4003,7 +4135,7 @@
           <p:nvPr/>
         </p:nvPicPr>
         <p:blipFill>
-          <a:blip r:embed="rId5"/>
+          <a:blip r:embed="rId7"/>
           <a:stretch>
             <a:fillRect/>
           </a:stretch>
@@ -4033,14 +4165,14 @@
           <p:nvPr/>
         </p:nvPicPr>
         <p:blipFill>
-          <a:blip r:embed="rId6"/>
+          <a:blip r:embed="rId8"/>
           <a:stretch>
             <a:fillRect/>
           </a:stretch>
         </p:blipFill>
         <p:spPr>
           <a:xfrm>
-            <a:off x="3865185" y="908870"/>
+            <a:off x="34870" y="919128"/>
             <a:ext cx="232788" cy="144000"/>
           </a:xfrm>
           <a:prstGeom prst="rect">
@@ -4062,7 +4194,7 @@
         </p:nvSpPr>
         <p:spPr>
           <a:xfrm>
-            <a:off x="244700" y="890870"/>
+            <a:off x="275920" y="890870"/>
             <a:ext cx="3600000" cy="180000"/>
           </a:xfrm>
           <a:prstGeom prst="rect">
@@ -4071,10 +4203,10 @@
           <a:gradFill flip="none" rotWithShape="1">
             <a:gsLst>
               <a:gs pos="0">
-                <a:schemeClr val="bg1"/>
+                <a:srgbClr val="FF0066"/>
               </a:gs>
               <a:gs pos="100000">
-                <a:srgbClr val="FF0066"/>
+                <a:schemeClr val="bg1"/>
               </a:gs>
             </a:gsLst>
             <a:lin ang="0" scaled="1"/>
@@ -4133,7 +4265,7 @@
         </p:nvSpPr>
         <p:spPr>
           <a:xfrm>
-            <a:off x="244699" y="715585"/>
+            <a:off x="275919" y="715585"/>
             <a:ext cx="3599999" cy="215444"/>
           </a:xfrm>
           <a:prstGeom prst="rect">
@@ -4156,7 +4288,7 @@
                 <a:latin typeface="Calibri Light" panose="020F0302020204030204" pitchFamily="34" charset="0"/>
                 <a:cs typeface="Calibri Light" panose="020F0302020204030204" pitchFamily="34" charset="0"/>
               </a:rPr>
-              <a:t>% of flash flood reports used for training</a:t>
+              <a:t>Reduction (in %) of flash flood reports used during training</a:t>
             </a:r>
             <a:endParaRPr lang="en-GB" sz="800" dirty="0">
               <a:solidFill>
@@ -4182,7 +4314,7 @@
         </p:nvSpPr>
         <p:spPr>
           <a:xfrm>
-            <a:off x="75375" y="715585"/>
+            <a:off x="106595" y="715585"/>
             <a:ext cx="357117" cy="215444"/>
           </a:xfrm>
           <a:prstGeom prst="rect">
@@ -4231,7 +4363,7 @@
         </p:nvSpPr>
         <p:spPr>
           <a:xfrm>
-            <a:off x="3614020" y="715585"/>
+            <a:off x="3645240" y="715585"/>
             <a:ext cx="448659" cy="215444"/>
           </a:xfrm>
           <a:prstGeom prst="rect">
@@ -4268,70 +4400,10 @@
       </p:sp>
       <p:pic>
         <p:nvPicPr>
-          <p:cNvPr id="12" name="Picture 11">
-            <a:extLst>
-              <a:ext uri="{FF2B5EF4-FFF2-40B4-BE49-F238E27FC236}">
-                <a16:creationId xmlns:a16="http://schemas.microsoft.com/office/drawing/2014/main" id="{EB691A0B-FD3C-F64F-4893-DF1AE6C90CCA}"/>
-              </a:ext>
-            </a:extLst>
-          </p:cNvPr>
-          <p:cNvPicPr>
-            <a:picLocks noChangeAspect="1"/>
-          </p:cNvPicPr>
-          <p:nvPr/>
-        </p:nvPicPr>
-        <p:blipFill>
-          <a:blip r:embed="rId7"/>
-          <a:stretch>
-            <a:fillRect/>
-          </a:stretch>
-        </p:blipFill>
-        <p:spPr>
-          <a:xfrm>
-            <a:off x="3196933" y="1232139"/>
-            <a:ext cx="585000" cy="360000"/>
-          </a:xfrm>
-          <a:prstGeom prst="rect">
-            <a:avLst/>
-          </a:prstGeom>
-        </p:spPr>
-      </p:pic>
-      <p:pic>
-        <p:nvPicPr>
           <p:cNvPr id="13" name="Picture 12">
             <a:extLst>
               <a:ext uri="{FF2B5EF4-FFF2-40B4-BE49-F238E27FC236}">
                 <a16:creationId xmlns:a16="http://schemas.microsoft.com/office/drawing/2014/main" id="{46B84CE7-5B19-C530-DAD8-C842A0D3E521}"/>
-              </a:ext>
-            </a:extLst>
-          </p:cNvPr>
-          <p:cNvPicPr>
-            <a:picLocks noChangeAspect="1"/>
-          </p:cNvPicPr>
-          <p:nvPr/>
-        </p:nvPicPr>
-        <p:blipFill>
-          <a:blip r:embed="rId8"/>
-          <a:stretch>
-            <a:fillRect/>
-          </a:stretch>
-        </p:blipFill>
-        <p:spPr>
-          <a:xfrm>
-            <a:off x="1755716" y="1232139"/>
-            <a:ext cx="581968" cy="360000"/>
-          </a:xfrm>
-          <a:prstGeom prst="rect">
-            <a:avLst/>
-          </a:prstGeom>
-        </p:spPr>
-      </p:pic>
-      <p:pic>
-        <p:nvPicPr>
-          <p:cNvPr id="14" name="Picture 13">
-            <a:extLst>
-              <a:ext uri="{FF2B5EF4-FFF2-40B4-BE49-F238E27FC236}">
-                <a16:creationId xmlns:a16="http://schemas.microsoft.com/office/drawing/2014/main" id="{DDA6905E-87E1-D835-2A09-349AD4DCAFAF}"/>
               </a:ext>
             </a:extLst>
           </p:cNvPr>
@@ -4348,8 +4420,8 @@
         </p:blipFill>
         <p:spPr>
           <a:xfrm>
-            <a:off x="315191" y="1219685"/>
-            <a:ext cx="585000" cy="360000"/>
+            <a:off x="1786936" y="1232139"/>
+            <a:ext cx="581968" cy="360000"/>
           </a:xfrm>
           <a:prstGeom prst="rect">
             <a:avLst/>
@@ -4370,7 +4442,7 @@
         </p:nvSpPr>
         <p:spPr>
           <a:xfrm>
-            <a:off x="3290668" y="1058485"/>
+            <a:off x="3320120" y="1058485"/>
             <a:ext cx="401067" cy="215444"/>
           </a:xfrm>
           <a:prstGeom prst="rect">
@@ -4419,7 +4491,7 @@
         </p:nvSpPr>
         <p:spPr>
           <a:xfrm>
-            <a:off x="1847415" y="1058485"/>
+            <a:off x="1877387" y="1058485"/>
             <a:ext cx="401067" cy="215444"/>
           </a:xfrm>
           <a:prstGeom prst="rect">
@@ -4468,7 +4540,7 @@
         </p:nvSpPr>
         <p:spPr>
           <a:xfrm>
-            <a:off x="407415" y="1058485"/>
+            <a:off x="438378" y="1058485"/>
             <a:ext cx="401067" cy="215444"/>
           </a:xfrm>
           <a:prstGeom prst="rect">
@@ -4605,7 +4677,7 @@
                 <a:latin typeface="Calibri" panose="020F0502020204030204" pitchFamily="34" charset="0"/>
                 <a:cs typeface="Calibri" panose="020F0502020204030204" pitchFamily="34" charset="0"/>
               </a:rPr>
-              <a:t>Approach 1: reduced-density training dataset </a:t>
+              <a:t>Training Approach 1 (TA1) </a:t>
             </a:r>
             <a:r>
               <a:rPr lang="en-US" sz="800" b="1" dirty="0">
@@ -4645,7 +4717,7 @@
         <p:spPr>
           <a:xfrm>
             <a:off x="-42826" y="1709783"/>
-            <a:ext cx="2146974" cy="707886"/>
+            <a:ext cx="2146974" cy="584775"/>
           </a:xfrm>
           <a:prstGeom prst="rect">
             <a:avLst/>
@@ -4679,7 +4751,7 @@
                 <a:latin typeface="Calibri" panose="020F0502020204030204" pitchFamily="34" charset="0"/>
                 <a:cs typeface="Calibri" panose="020F0502020204030204" pitchFamily="34" charset="0"/>
               </a:rPr>
-              <a:t>Approach 2: sparsed-regional training dataset </a:t>
+              <a:t>Training Approach 2 (TA2) </a:t>
             </a:r>
             <a:r>
               <a:rPr lang="en-US" sz="800" dirty="0">
@@ -4743,7 +4815,7 @@
                 <a:latin typeface="Calibri" panose="020F0502020204030204" pitchFamily="34" charset="0"/>
                 <a:cs typeface="Calibri" panose="020F0502020204030204" pitchFamily="34" charset="0"/>
               </a:rPr>
-              <a:t>Approach 3: domain-restricted training dataset </a:t>
+              <a:t>Training Approach 3 (TA3) </a:t>
             </a:r>
             <a:r>
               <a:rPr lang="en-US" sz="800" dirty="0">
@@ -4774,7 +4846,7 @@
         </p:nvCxnSpPr>
         <p:spPr>
           <a:xfrm flipH="1">
-            <a:off x="2044700" y="890870"/>
+            <a:off x="2077920" y="890870"/>
             <a:ext cx="0" cy="180000"/>
           </a:xfrm>
           <a:prstGeom prst="line">
@@ -4820,7 +4892,7 @@
         </p:nvCxnSpPr>
         <p:spPr>
           <a:xfrm>
-            <a:off x="3484700" y="890870"/>
+            <a:off x="3520653" y="890870"/>
             <a:ext cx="1" cy="180000"/>
           </a:xfrm>
           <a:prstGeom prst="line">
@@ -4866,7 +4938,7 @@
         </p:nvCxnSpPr>
         <p:spPr>
           <a:xfrm flipH="1">
-            <a:off x="604700" y="890870"/>
+            <a:off x="638911" y="890870"/>
             <a:ext cx="0" cy="180000"/>
           </a:xfrm>
           <a:prstGeom prst="line">
@@ -4923,7 +4995,7 @@
         </p:blipFill>
         <p:spPr>
           <a:xfrm>
-            <a:off x="29307" y="908870"/>
+            <a:off x="3900097" y="903864"/>
             <a:ext cx="193802" cy="144000"/>
           </a:xfrm>
           <a:prstGeom prst="rect">
@@ -4933,10 +5005,10 @@
       </p:pic>
       <p:sp>
         <p:nvSpPr>
-          <p:cNvPr id="26" name="TextBox 25">
+          <p:cNvPr id="2" name="TextBox 1">
             <a:extLst>
               <a:ext uri="{FF2B5EF4-FFF2-40B4-BE49-F238E27FC236}">
-                <a16:creationId xmlns:a16="http://schemas.microsoft.com/office/drawing/2014/main" id="{151BDCEA-207C-CE0D-3A4F-4A049384B2D2}"/>
+                <a16:creationId xmlns:a16="http://schemas.microsoft.com/office/drawing/2014/main" id="{2E80BDC4-448A-F867-2CE0-2FF19E022ABF}"/>
               </a:ext>
             </a:extLst>
           </p:cNvPr>
@@ -4945,16 +5017,13 @@
         </p:nvSpPr>
         <p:spPr>
           <a:xfrm>
-            <a:off x="1012796" y="2739339"/>
-            <a:ext cx="518671" cy="215444"/>
+            <a:off x="385579" y="1534588"/>
+            <a:ext cx="444224" cy="215444"/>
           </a:xfrm>
           <a:prstGeom prst="rect">
             <a:avLst/>
           </a:prstGeom>
           <a:noFill/>
-          <a:ln>
-            <a:noFill/>
-          </a:ln>
         </p:spPr>
         <p:txBody>
           <a:bodyPr wrap="square" rtlCol="0">
@@ -4964,24 +5033,31 @@
           <a:p>
             <a:pPr algn="ctr"/>
             <a:r>
-              <a:rPr lang="en-US" sz="800" dirty="0">
+              <a:rPr lang="en-US" sz="800" b="1" dirty="0">
                 <a:solidFill>
                   <a:srgbClr val="222222"/>
                 </a:solidFill>
-                <a:latin typeface="Calibri Light" panose="020F0302020204030204" pitchFamily="34" charset="0"/>
-                <a:cs typeface="Calibri Light" panose="020F0302020204030204" pitchFamily="34" charset="0"/>
+                <a:latin typeface="Calibri" panose="020F0502020204030204" pitchFamily="34" charset="0"/>
+                <a:cs typeface="Calibri" panose="020F0502020204030204" pitchFamily="34" charset="0"/>
               </a:rPr>
-              <a:t>East</a:t>
-            </a:r>
-          </a:p>
-        </p:txBody>
-      </p:sp>
-      <p:sp>
-        <p:nvSpPr>
-          <p:cNvPr id="27" name="TextBox 26">
+              <a:t>TA1-1</a:t>
+            </a:r>
+            <a:endParaRPr lang="en-GB" sz="800" b="1" dirty="0">
+              <a:solidFill>
+                <a:srgbClr val="222222"/>
+              </a:solidFill>
+              <a:latin typeface="Calibri" panose="020F0502020204030204" pitchFamily="34" charset="0"/>
+              <a:cs typeface="Calibri" panose="020F0502020204030204" pitchFamily="34" charset="0"/>
+            </a:endParaRPr>
+          </a:p>
+        </p:txBody>
+      </p:sp>
+      <p:sp>
+        <p:nvSpPr>
+          <p:cNvPr id="32" name="TextBox 31">
             <a:extLst>
               <a:ext uri="{FF2B5EF4-FFF2-40B4-BE49-F238E27FC236}">
-                <a16:creationId xmlns:a16="http://schemas.microsoft.com/office/drawing/2014/main" id="{DC152927-0AC6-09A7-D861-071860AB0F82}"/>
+                <a16:creationId xmlns:a16="http://schemas.microsoft.com/office/drawing/2014/main" id="{3FD943B1-6BB5-2F8A-2C27-6CBECED16F74}"/>
               </a:ext>
             </a:extLst>
           </p:cNvPr>
@@ -4990,16 +5066,13 @@
         </p:nvSpPr>
         <p:spPr>
           <a:xfrm>
-            <a:off x="228946" y="2739339"/>
-            <a:ext cx="518671" cy="215444"/>
+            <a:off x="1824588" y="1534588"/>
+            <a:ext cx="444224" cy="215444"/>
           </a:xfrm>
           <a:prstGeom prst="rect">
             <a:avLst/>
           </a:prstGeom>
           <a:noFill/>
-          <a:ln>
-            <a:noFill/>
-          </a:ln>
         </p:spPr>
         <p:txBody>
           <a:bodyPr wrap="square" rtlCol="0">
@@ -5009,24 +5082,31 @@
           <a:p>
             <a:pPr algn="ctr"/>
             <a:r>
-              <a:rPr lang="en-US" sz="800" dirty="0">
+              <a:rPr lang="en-US" sz="800" b="1" dirty="0">
                 <a:solidFill>
                   <a:srgbClr val="222222"/>
                 </a:solidFill>
-                <a:latin typeface="Calibri Light" panose="020F0302020204030204" pitchFamily="34" charset="0"/>
-                <a:cs typeface="Calibri Light" panose="020F0302020204030204" pitchFamily="34" charset="0"/>
+                <a:latin typeface="Calibri" panose="020F0502020204030204" pitchFamily="34" charset="0"/>
+                <a:cs typeface="Calibri" panose="020F0502020204030204" pitchFamily="34" charset="0"/>
               </a:rPr>
-              <a:t>West</a:t>
-            </a:r>
-          </a:p>
-        </p:txBody>
-      </p:sp>
-      <p:sp>
-        <p:nvSpPr>
-          <p:cNvPr id="28" name="TextBox 27">
+              <a:t>TA1-2</a:t>
+            </a:r>
+            <a:endParaRPr lang="en-GB" sz="800" b="1" dirty="0">
+              <a:solidFill>
+                <a:srgbClr val="222222"/>
+              </a:solidFill>
+              <a:latin typeface="Calibri" panose="020F0502020204030204" pitchFamily="34" charset="0"/>
+              <a:cs typeface="Calibri" panose="020F0502020204030204" pitchFamily="34" charset="0"/>
+            </a:endParaRPr>
+          </a:p>
+        </p:txBody>
+      </p:sp>
+      <p:sp>
+        <p:nvSpPr>
+          <p:cNvPr id="33" name="TextBox 32">
             <a:extLst>
               <a:ext uri="{FF2B5EF4-FFF2-40B4-BE49-F238E27FC236}">
-                <a16:creationId xmlns:a16="http://schemas.microsoft.com/office/drawing/2014/main" id="{0D399520-912A-FB7B-7316-433D9E562933}"/>
+                <a16:creationId xmlns:a16="http://schemas.microsoft.com/office/drawing/2014/main" id="{87289969-BCC2-529D-8721-8D2679FD6FE0}"/>
               </a:ext>
             </a:extLst>
           </p:cNvPr>
@@ -5035,16 +5115,13 @@
         </p:nvSpPr>
         <p:spPr>
           <a:xfrm>
-            <a:off x="3145346" y="2739339"/>
-            <a:ext cx="518671" cy="215444"/>
+            <a:off x="3258401" y="1517345"/>
+            <a:ext cx="444224" cy="215444"/>
           </a:xfrm>
           <a:prstGeom prst="rect">
             <a:avLst/>
           </a:prstGeom>
           <a:noFill/>
-          <a:ln>
-            <a:noFill/>
-          </a:ln>
         </p:spPr>
         <p:txBody>
           <a:bodyPr wrap="square" rtlCol="0">
@@ -5054,24 +5131,31 @@
           <a:p>
             <a:pPr algn="ctr"/>
             <a:r>
-              <a:rPr lang="en-US" sz="800" dirty="0">
+              <a:rPr lang="en-US" sz="800" b="1" dirty="0">
                 <a:solidFill>
                   <a:srgbClr val="222222"/>
                 </a:solidFill>
-                <a:latin typeface="Calibri Light" panose="020F0302020204030204" pitchFamily="34" charset="0"/>
-                <a:cs typeface="Calibri Light" panose="020F0302020204030204" pitchFamily="34" charset="0"/>
+                <a:latin typeface="Calibri" panose="020F0502020204030204" pitchFamily="34" charset="0"/>
+                <a:cs typeface="Calibri" panose="020F0502020204030204" pitchFamily="34" charset="0"/>
               </a:rPr>
-              <a:t>East</a:t>
-            </a:r>
-          </a:p>
-        </p:txBody>
-      </p:sp>
-      <p:sp>
-        <p:nvSpPr>
-          <p:cNvPr id="29" name="TextBox 28">
+              <a:t>TA1-3</a:t>
+            </a:r>
+            <a:endParaRPr lang="en-GB" sz="800" b="1" dirty="0">
+              <a:solidFill>
+                <a:srgbClr val="222222"/>
+              </a:solidFill>
+              <a:latin typeface="Calibri" panose="020F0502020204030204" pitchFamily="34" charset="0"/>
+              <a:cs typeface="Calibri" panose="020F0502020204030204" pitchFamily="34" charset="0"/>
+            </a:endParaRPr>
+          </a:p>
+        </p:txBody>
+      </p:sp>
+      <p:sp>
+        <p:nvSpPr>
+          <p:cNvPr id="34" name="TextBox 33">
             <a:extLst>
               <a:ext uri="{FF2B5EF4-FFF2-40B4-BE49-F238E27FC236}">
-                <a16:creationId xmlns:a16="http://schemas.microsoft.com/office/drawing/2014/main" id="{33073E03-F303-77A5-81F7-498EB8604D87}"/>
+                <a16:creationId xmlns:a16="http://schemas.microsoft.com/office/drawing/2014/main" id="{39109DB5-478B-DF93-BCD9-9C00D3305A60}"/>
               </a:ext>
             </a:extLst>
           </p:cNvPr>
@@ -5080,16 +5164,13 @@
         </p:nvSpPr>
         <p:spPr>
           <a:xfrm>
-            <a:off x="2663055" y="2739339"/>
-            <a:ext cx="518671" cy="215444"/>
+            <a:off x="264835" y="2735481"/>
+            <a:ext cx="444224" cy="215444"/>
           </a:xfrm>
           <a:prstGeom prst="rect">
             <a:avLst/>
           </a:prstGeom>
           <a:noFill/>
-          <a:ln>
-            <a:noFill/>
-          </a:ln>
         </p:spPr>
         <p:txBody>
           <a:bodyPr wrap="square" rtlCol="0">
@@ -5099,15 +5180,169 @@
           <a:p>
             <a:pPr algn="ctr"/>
             <a:r>
-              <a:rPr lang="en-US" sz="800" dirty="0">
+              <a:rPr lang="en-US" sz="800" b="1" dirty="0">
                 <a:solidFill>
                   <a:srgbClr val="222222"/>
                 </a:solidFill>
-                <a:latin typeface="Calibri Light" panose="020F0302020204030204" pitchFamily="34" charset="0"/>
-                <a:cs typeface="Calibri Light" panose="020F0302020204030204" pitchFamily="34" charset="0"/>
+                <a:latin typeface="Calibri" panose="020F0502020204030204" pitchFamily="34" charset="0"/>
+                <a:cs typeface="Calibri" panose="020F0502020204030204" pitchFamily="34" charset="0"/>
               </a:rPr>
-              <a:t>West</a:t>
-            </a:r>
+              <a:t>TA2-1</a:t>
+            </a:r>
+            <a:endParaRPr lang="en-GB" sz="800" b="1" dirty="0">
+              <a:solidFill>
+                <a:srgbClr val="222222"/>
+              </a:solidFill>
+              <a:latin typeface="Calibri" panose="020F0502020204030204" pitchFamily="34" charset="0"/>
+              <a:cs typeface="Calibri" panose="020F0502020204030204" pitchFamily="34" charset="0"/>
+            </a:endParaRPr>
+          </a:p>
+        </p:txBody>
+      </p:sp>
+      <p:sp>
+        <p:nvSpPr>
+          <p:cNvPr id="35" name="TextBox 34">
+            <a:extLst>
+              <a:ext uri="{FF2B5EF4-FFF2-40B4-BE49-F238E27FC236}">
+                <a16:creationId xmlns:a16="http://schemas.microsoft.com/office/drawing/2014/main" id="{0C16509C-6817-1340-CB24-8C505B180F4D}"/>
+              </a:ext>
+            </a:extLst>
+          </p:cNvPr>
+          <p:cNvSpPr txBox="1"/>
+          <p:nvPr/>
+        </p:nvSpPr>
+        <p:spPr>
+          <a:xfrm>
+            <a:off x="1044145" y="2735481"/>
+            <a:ext cx="444224" cy="215444"/>
+          </a:xfrm>
+          <a:prstGeom prst="rect">
+            <a:avLst/>
+          </a:prstGeom>
+          <a:noFill/>
+        </p:spPr>
+        <p:txBody>
+          <a:bodyPr wrap="square" rtlCol="0">
+            <a:spAutoFit/>
+          </a:bodyPr>
+          <a:lstStyle/>
+          <a:p>
+            <a:pPr algn="ctr"/>
+            <a:r>
+              <a:rPr lang="en-US" sz="800" b="1" dirty="0">
+                <a:solidFill>
+                  <a:srgbClr val="222222"/>
+                </a:solidFill>
+                <a:latin typeface="Calibri" panose="020F0502020204030204" pitchFamily="34" charset="0"/>
+                <a:cs typeface="Calibri" panose="020F0502020204030204" pitchFamily="34" charset="0"/>
+              </a:rPr>
+              <a:t>TA2-2</a:t>
+            </a:r>
+            <a:endParaRPr lang="en-GB" sz="800" b="1" dirty="0">
+              <a:solidFill>
+                <a:srgbClr val="222222"/>
+              </a:solidFill>
+              <a:latin typeface="Calibri" panose="020F0502020204030204" pitchFamily="34" charset="0"/>
+              <a:cs typeface="Calibri" panose="020F0502020204030204" pitchFamily="34" charset="0"/>
+            </a:endParaRPr>
+          </a:p>
+        </p:txBody>
+      </p:sp>
+      <p:sp>
+        <p:nvSpPr>
+          <p:cNvPr id="36" name="TextBox 35">
+            <a:extLst>
+              <a:ext uri="{FF2B5EF4-FFF2-40B4-BE49-F238E27FC236}">
+                <a16:creationId xmlns:a16="http://schemas.microsoft.com/office/drawing/2014/main" id="{6AA39C67-285B-2705-9A9B-CE9A67567D95}"/>
+              </a:ext>
+            </a:extLst>
+          </p:cNvPr>
+          <p:cNvSpPr txBox="1"/>
+          <p:nvPr/>
+        </p:nvSpPr>
+        <p:spPr>
+          <a:xfrm>
+            <a:off x="2597157" y="2736663"/>
+            <a:ext cx="444224" cy="215444"/>
+          </a:xfrm>
+          <a:prstGeom prst="rect">
+            <a:avLst/>
+          </a:prstGeom>
+          <a:noFill/>
+        </p:spPr>
+        <p:txBody>
+          <a:bodyPr wrap="square" rtlCol="0">
+            <a:spAutoFit/>
+          </a:bodyPr>
+          <a:lstStyle/>
+          <a:p>
+            <a:pPr algn="ctr"/>
+            <a:r>
+              <a:rPr lang="en-US" sz="800" b="1" dirty="0">
+                <a:solidFill>
+                  <a:srgbClr val="222222"/>
+                </a:solidFill>
+                <a:latin typeface="Calibri" panose="020F0502020204030204" pitchFamily="34" charset="0"/>
+                <a:cs typeface="Calibri" panose="020F0502020204030204" pitchFamily="34" charset="0"/>
+              </a:rPr>
+              <a:t>TA3-1</a:t>
+            </a:r>
+            <a:endParaRPr lang="en-GB" sz="800" b="1" dirty="0">
+              <a:solidFill>
+                <a:srgbClr val="222222"/>
+              </a:solidFill>
+              <a:latin typeface="Calibri" panose="020F0502020204030204" pitchFamily="34" charset="0"/>
+              <a:cs typeface="Calibri" panose="020F0502020204030204" pitchFamily="34" charset="0"/>
+            </a:endParaRPr>
+          </a:p>
+        </p:txBody>
+      </p:sp>
+      <p:sp>
+        <p:nvSpPr>
+          <p:cNvPr id="37" name="TextBox 36">
+            <a:extLst>
+              <a:ext uri="{FF2B5EF4-FFF2-40B4-BE49-F238E27FC236}">
+                <a16:creationId xmlns:a16="http://schemas.microsoft.com/office/drawing/2014/main" id="{305BCB07-94A7-5D7E-EBA5-EE3EF87D4F29}"/>
+              </a:ext>
+            </a:extLst>
+          </p:cNvPr>
+          <p:cNvSpPr txBox="1"/>
+          <p:nvPr/>
+        </p:nvSpPr>
+        <p:spPr>
+          <a:xfrm>
+            <a:off x="3280012" y="2736663"/>
+            <a:ext cx="444224" cy="215444"/>
+          </a:xfrm>
+          <a:prstGeom prst="rect">
+            <a:avLst/>
+          </a:prstGeom>
+          <a:noFill/>
+        </p:spPr>
+        <p:txBody>
+          <a:bodyPr wrap="square" rtlCol="0">
+            <a:spAutoFit/>
+          </a:bodyPr>
+          <a:lstStyle/>
+          <a:p>
+            <a:pPr algn="ctr"/>
+            <a:r>
+              <a:rPr lang="en-US" sz="800" b="1" dirty="0">
+                <a:solidFill>
+                  <a:srgbClr val="222222"/>
+                </a:solidFill>
+                <a:latin typeface="Calibri" panose="020F0502020204030204" pitchFamily="34" charset="0"/>
+                <a:cs typeface="Calibri" panose="020F0502020204030204" pitchFamily="34" charset="0"/>
+              </a:rPr>
+              <a:t>TA3-2</a:t>
+            </a:r>
+            <a:endParaRPr lang="en-GB" sz="800" b="1" dirty="0">
+              <a:solidFill>
+                <a:srgbClr val="222222"/>
+              </a:solidFill>
+              <a:latin typeface="Calibri" panose="020F0502020204030204" pitchFamily="34" charset="0"/>
+              <a:cs typeface="Calibri" panose="020F0502020204030204" pitchFamily="34" charset="0"/>
+            </a:endParaRPr>
           </a:p>
         </p:txBody>
       </p:sp>

</xml_diff>

<commit_message>
Improved the methods figure for chapter 7
</commit_message>
<xml_diff>
--- a/chapter_07/figures/training_approaches.pptx
+++ b/chapter_07/figures/training_approaches.pptx
@@ -125,18 +125,18 @@
   <pc:docChgLst>
     <pc:chgData name="Fatima Pillosu" userId="a6295d4dc9e22643" providerId="LiveId" clId="{C1D7A64D-15B7-4FCE-91E9-6F95F059BEA6}"/>
     <pc:docChg chg="undo custSel modSld">
-      <pc:chgData name="Fatima Pillosu" userId="a6295d4dc9e22643" providerId="LiveId" clId="{C1D7A64D-15B7-4FCE-91E9-6F95F059BEA6}" dt="2025-07-10T13:53:12.605" v="2378" actId="1037"/>
+      <pc:chgData name="Fatima Pillosu" userId="a6295d4dc9e22643" providerId="LiveId" clId="{C1D7A64D-15B7-4FCE-91E9-6F95F059BEA6}" dt="2025-07-10T14:19:44.613" v="2810" actId="554"/>
       <pc:docMkLst>
         <pc:docMk/>
       </pc:docMkLst>
       <pc:sldChg chg="addSp delSp modSp mod">
-        <pc:chgData name="Fatima Pillosu" userId="a6295d4dc9e22643" providerId="LiveId" clId="{C1D7A64D-15B7-4FCE-91E9-6F95F059BEA6}" dt="2025-07-10T13:53:12.605" v="2378" actId="1037"/>
+        <pc:chgData name="Fatima Pillosu" userId="a6295d4dc9e22643" providerId="LiveId" clId="{C1D7A64D-15B7-4FCE-91E9-6F95F059BEA6}" dt="2025-07-10T14:19:44.613" v="2810" actId="554"/>
         <pc:sldMkLst>
           <pc:docMk/>
           <pc:sldMk cId="3625231182" sldId="256"/>
         </pc:sldMkLst>
         <pc:spChg chg="add mod">
-          <ac:chgData name="Fatima Pillosu" userId="a6295d4dc9e22643" providerId="LiveId" clId="{C1D7A64D-15B7-4FCE-91E9-6F95F059BEA6}" dt="2025-07-10T13:48:42.132" v="2208" actId="12788"/>
+          <ac:chgData name="Fatima Pillosu" userId="a6295d4dc9e22643" providerId="LiveId" clId="{C1D7A64D-15B7-4FCE-91E9-6F95F059BEA6}" dt="2025-07-10T14:19:37.802" v="2809" actId="1036"/>
           <ac:spMkLst>
             <pc:docMk/>
             <pc:sldMk cId="3625231182" sldId="256"/>
@@ -256,7 +256,7 @@
           </ac:spMkLst>
         </pc:spChg>
         <pc:spChg chg="add mod">
-          <ac:chgData name="Fatima Pillosu" userId="a6295d4dc9e22643" providerId="LiveId" clId="{C1D7A64D-15B7-4FCE-91E9-6F95F059BEA6}" dt="2025-07-09T12:48:49.330" v="2098"/>
+          <ac:chgData name="Fatima Pillosu" userId="a6295d4dc9e22643" providerId="LiveId" clId="{C1D7A64D-15B7-4FCE-91E9-6F95F059BEA6}" dt="2025-07-10T14:14:06.287" v="2672" actId="20577"/>
           <ac:spMkLst>
             <pc:docMk/>
             <pc:sldMk cId="3625231182" sldId="256"/>
@@ -264,7 +264,7 @@
           </ac:spMkLst>
         </pc:spChg>
         <pc:spChg chg="add mod">
-          <ac:chgData name="Fatima Pillosu" userId="a6295d4dc9e22643" providerId="LiveId" clId="{C1D7A64D-15B7-4FCE-91E9-6F95F059BEA6}" dt="2025-07-10T13:49:29.655" v="2236" actId="20577"/>
+          <ac:chgData name="Fatima Pillosu" userId="a6295d4dc9e22643" providerId="LiveId" clId="{C1D7A64D-15B7-4FCE-91E9-6F95F059BEA6}" dt="2025-07-10T14:17:39.704" v="2803" actId="14100"/>
           <ac:spMkLst>
             <pc:docMk/>
             <pc:sldMk cId="3625231182" sldId="256"/>
@@ -272,7 +272,7 @@
           </ac:spMkLst>
         </pc:spChg>
         <pc:spChg chg="add mod">
-          <ac:chgData name="Fatima Pillosu" userId="a6295d4dc9e22643" providerId="LiveId" clId="{C1D7A64D-15B7-4FCE-91E9-6F95F059BEA6}" dt="2025-07-10T13:49:36.385" v="2240" actId="20577"/>
+          <ac:chgData name="Fatima Pillosu" userId="a6295d4dc9e22643" providerId="LiveId" clId="{C1D7A64D-15B7-4FCE-91E9-6F95F059BEA6}" dt="2025-07-10T14:16:59.302" v="2802" actId="1036"/>
           <ac:spMkLst>
             <pc:docMk/>
             <pc:sldMk cId="3625231182" sldId="256"/>
@@ -280,7 +280,7 @@
           </ac:spMkLst>
         </pc:spChg>
         <pc:spChg chg="add mod">
-          <ac:chgData name="Fatima Pillosu" userId="a6295d4dc9e22643" providerId="LiveId" clId="{C1D7A64D-15B7-4FCE-91E9-6F95F059BEA6}" dt="2025-07-10T13:50:21.399" v="2269" actId="20577"/>
+          <ac:chgData name="Fatima Pillosu" userId="a6295d4dc9e22643" providerId="LiveId" clId="{C1D7A64D-15B7-4FCE-91E9-6F95F059BEA6}" dt="2025-07-10T14:16:59.302" v="2802" actId="1036"/>
           <ac:spMkLst>
             <pc:docMk/>
             <pc:sldMk cId="3625231182" sldId="256"/>
@@ -408,7 +408,7 @@
           </ac:spMkLst>
         </pc:spChg>
         <pc:spChg chg="add mod">
-          <ac:chgData name="Fatima Pillosu" userId="a6295d4dc9e22643" providerId="LiveId" clId="{C1D7A64D-15B7-4FCE-91E9-6F95F059BEA6}" dt="2025-07-10T13:48:49.351" v="2210" actId="20577"/>
+          <ac:chgData name="Fatima Pillosu" userId="a6295d4dc9e22643" providerId="LiveId" clId="{C1D7A64D-15B7-4FCE-91E9-6F95F059BEA6}" dt="2025-07-10T14:19:37.802" v="2809" actId="1036"/>
           <ac:spMkLst>
             <pc:docMk/>
             <pc:sldMk cId="3625231182" sldId="256"/>
@@ -432,7 +432,7 @@
           </ac:spMkLst>
         </pc:spChg>
         <pc:spChg chg="add mod">
-          <ac:chgData name="Fatima Pillosu" userId="a6295d4dc9e22643" providerId="LiveId" clId="{C1D7A64D-15B7-4FCE-91E9-6F95F059BEA6}" dt="2025-07-10T13:53:12.605" v="2378" actId="1037"/>
+          <ac:chgData name="Fatima Pillosu" userId="a6295d4dc9e22643" providerId="LiveId" clId="{C1D7A64D-15B7-4FCE-91E9-6F95F059BEA6}" dt="2025-07-10T14:19:37.802" v="2809" actId="1036"/>
           <ac:spMkLst>
             <pc:docMk/>
             <pc:sldMk cId="3625231182" sldId="256"/>
@@ -448,7 +448,7 @@
           </ac:spMkLst>
         </pc:spChg>
         <pc:spChg chg="add mod">
-          <ac:chgData name="Fatima Pillosu" userId="a6295d4dc9e22643" providerId="LiveId" clId="{C1D7A64D-15B7-4FCE-91E9-6F95F059BEA6}" dt="2025-07-10T13:49:59.551" v="2255" actId="20577"/>
+          <ac:chgData name="Fatima Pillosu" userId="a6295d4dc9e22643" providerId="LiveId" clId="{C1D7A64D-15B7-4FCE-91E9-6F95F059BEA6}" dt="2025-07-10T14:16:35.579" v="2789" actId="555"/>
           <ac:spMkLst>
             <pc:docMk/>
             <pc:sldMk cId="3625231182" sldId="256"/>
@@ -456,7 +456,7 @@
           </ac:spMkLst>
         </pc:spChg>
         <pc:spChg chg="add mod">
-          <ac:chgData name="Fatima Pillosu" userId="a6295d4dc9e22643" providerId="LiveId" clId="{C1D7A64D-15B7-4FCE-91E9-6F95F059BEA6}" dt="2025-07-10T13:50:08.986" v="2264" actId="20577"/>
+          <ac:chgData name="Fatima Pillosu" userId="a6295d4dc9e22643" providerId="LiveId" clId="{C1D7A64D-15B7-4FCE-91E9-6F95F059BEA6}" dt="2025-07-10T14:16:35.579" v="2789" actId="555"/>
           <ac:spMkLst>
             <pc:docMk/>
             <pc:sldMk cId="3625231182" sldId="256"/>
@@ -472,7 +472,7 @@
           </ac:spMkLst>
         </pc:spChg>
         <pc:spChg chg="add mod">
-          <ac:chgData name="Fatima Pillosu" userId="a6295d4dc9e22643" providerId="LiveId" clId="{C1D7A64D-15B7-4FCE-91E9-6F95F059BEA6}" dt="2025-07-10T13:51:03.891" v="2365" actId="20577"/>
+          <ac:chgData name="Fatima Pillosu" userId="a6295d4dc9e22643" providerId="LiveId" clId="{C1D7A64D-15B7-4FCE-91E9-6F95F059BEA6}" dt="2025-07-10T14:16:35.579" v="2789" actId="555"/>
           <ac:spMkLst>
             <pc:docMk/>
             <pc:sldMk cId="3625231182" sldId="256"/>
@@ -480,7 +480,7 @@
           </ac:spMkLst>
         </pc:spChg>
         <pc:spChg chg="add mod">
-          <ac:chgData name="Fatima Pillosu" userId="a6295d4dc9e22643" providerId="LiveId" clId="{C1D7A64D-15B7-4FCE-91E9-6F95F059BEA6}" dt="2025-07-10T13:51:07.113" v="2367" actId="20577"/>
+          <ac:chgData name="Fatima Pillosu" userId="a6295d4dc9e22643" providerId="LiveId" clId="{C1D7A64D-15B7-4FCE-91E9-6F95F059BEA6}" dt="2025-07-10T14:16:35.579" v="2789" actId="555"/>
           <ac:spMkLst>
             <pc:docMk/>
             <pc:sldMk cId="3625231182" sldId="256"/>
@@ -720,7 +720,7 @@
           </ac:spMkLst>
         </pc:spChg>
         <pc:picChg chg="add mod">
-          <ac:chgData name="Fatima Pillosu" userId="a6295d4dc9e22643" providerId="LiveId" clId="{C1D7A64D-15B7-4FCE-91E9-6F95F059BEA6}" dt="2025-07-09T12:48:49.330" v="2098"/>
+          <ac:chgData name="Fatima Pillosu" userId="a6295d4dc9e22643" providerId="LiveId" clId="{C1D7A64D-15B7-4FCE-91E9-6F95F059BEA6}" dt="2025-07-10T14:16:48.575" v="2792" actId="1035"/>
           <ac:picMkLst>
             <pc:docMk/>
             <pc:sldMk cId="3625231182" sldId="256"/>
@@ -728,7 +728,7 @@
           </ac:picMkLst>
         </pc:picChg>
         <pc:picChg chg="add mod">
-          <ac:chgData name="Fatima Pillosu" userId="a6295d4dc9e22643" providerId="LiveId" clId="{C1D7A64D-15B7-4FCE-91E9-6F95F059BEA6}" dt="2025-07-09T12:48:49.330" v="2098"/>
+          <ac:chgData name="Fatima Pillosu" userId="a6295d4dc9e22643" providerId="LiveId" clId="{C1D7A64D-15B7-4FCE-91E9-6F95F059BEA6}" dt="2025-07-10T14:16:48.575" v="2792" actId="1035"/>
           <ac:picMkLst>
             <pc:docMk/>
             <pc:sldMk cId="3625231182" sldId="256"/>
@@ -736,7 +736,7 @@
           </ac:picMkLst>
         </pc:picChg>
         <pc:picChg chg="add mod">
-          <ac:chgData name="Fatima Pillosu" userId="a6295d4dc9e22643" providerId="LiveId" clId="{C1D7A64D-15B7-4FCE-91E9-6F95F059BEA6}" dt="2025-07-09T12:48:49.330" v="2098"/>
+          <ac:chgData name="Fatima Pillosu" userId="a6295d4dc9e22643" providerId="LiveId" clId="{C1D7A64D-15B7-4FCE-91E9-6F95F059BEA6}" dt="2025-07-10T14:16:48.575" v="2792" actId="1035"/>
           <ac:picMkLst>
             <pc:docMk/>
             <pc:sldMk cId="3625231182" sldId="256"/>
@@ -752,7 +752,7 @@
           </ac:picMkLst>
         </pc:picChg>
         <pc:picChg chg="add mod">
-          <ac:chgData name="Fatima Pillosu" userId="a6295d4dc9e22643" providerId="LiveId" clId="{C1D7A64D-15B7-4FCE-91E9-6F95F059BEA6}" dt="2025-07-09T12:48:49.330" v="2098"/>
+          <ac:chgData name="Fatima Pillosu" userId="a6295d4dc9e22643" providerId="LiveId" clId="{C1D7A64D-15B7-4FCE-91E9-6F95F059BEA6}" dt="2025-07-10T14:16:48.575" v="2792" actId="1035"/>
           <ac:picMkLst>
             <pc:docMk/>
             <pc:sldMk cId="3625231182" sldId="256"/>
@@ -824,7 +824,7 @@
           </ac:picMkLst>
         </pc:picChg>
         <pc:picChg chg="add del mod ord">
-          <ac:chgData name="Fatima Pillosu" userId="a6295d4dc9e22643" providerId="LiveId" clId="{C1D7A64D-15B7-4FCE-91E9-6F95F059BEA6}" dt="2025-07-10T13:53:12.605" v="2378" actId="1037"/>
+          <ac:chgData name="Fatima Pillosu" userId="a6295d4dc9e22643" providerId="LiveId" clId="{C1D7A64D-15B7-4FCE-91E9-6F95F059BEA6}" dt="2025-07-10T14:19:44.613" v="2810" actId="554"/>
           <ac:picMkLst>
             <pc:docMk/>
             <pc:sldMk cId="3625231182" sldId="256"/>
@@ -832,7 +832,7 @@
           </ac:picMkLst>
         </pc:picChg>
         <pc:picChg chg="add mod">
-          <ac:chgData name="Fatima Pillosu" userId="a6295d4dc9e22643" providerId="LiveId" clId="{C1D7A64D-15B7-4FCE-91E9-6F95F059BEA6}" dt="2025-07-10T13:53:12.605" v="2378" actId="1037"/>
+          <ac:chgData name="Fatima Pillosu" userId="a6295d4dc9e22643" providerId="LiveId" clId="{C1D7A64D-15B7-4FCE-91E9-6F95F059BEA6}" dt="2025-07-10T14:19:44.613" v="2810" actId="554"/>
           <ac:picMkLst>
             <pc:docMk/>
             <pc:sldMk cId="3625231182" sldId="256"/>
@@ -888,7 +888,7 @@
           </ac:picMkLst>
         </pc:picChg>
         <pc:picChg chg="add mod ord">
-          <ac:chgData name="Fatima Pillosu" userId="a6295d4dc9e22643" providerId="LiveId" clId="{C1D7A64D-15B7-4FCE-91E9-6F95F059BEA6}" dt="2025-07-10T13:53:12.605" v="2378" actId="1037"/>
+          <ac:chgData name="Fatima Pillosu" userId="a6295d4dc9e22643" providerId="LiveId" clId="{C1D7A64D-15B7-4FCE-91E9-6F95F059BEA6}" dt="2025-07-10T14:19:44.613" v="2810" actId="554"/>
           <ac:picMkLst>
             <pc:docMk/>
             <pc:sldMk cId="3625231182" sldId="256"/>
@@ -4052,7 +4052,7 @@
         </p:blipFill>
         <p:spPr>
           <a:xfrm>
-            <a:off x="1013745" y="2423755"/>
+            <a:off x="1140300" y="2403798"/>
             <a:ext cx="585000" cy="360000"/>
           </a:xfrm>
           <a:prstGeom prst="rect">
@@ -4082,7 +4082,7 @@
         </p:blipFill>
         <p:spPr>
           <a:xfrm>
-            <a:off x="232175" y="2423755"/>
+            <a:off x="358730" y="2403798"/>
             <a:ext cx="581970" cy="360000"/>
           </a:xfrm>
           <a:prstGeom prst="rect">
@@ -4112,7 +4112,7 @@
         </p:blipFill>
         <p:spPr>
           <a:xfrm>
-            <a:off x="2682412" y="2426718"/>
+            <a:off x="2579828" y="2403798"/>
             <a:ext cx="581970" cy="360000"/>
           </a:xfrm>
           <a:prstGeom prst="rect">
@@ -4142,7 +4142,7 @@
         </p:blipFill>
         <p:spPr>
           <a:xfrm>
-            <a:off x="3099481" y="2417669"/>
+            <a:off x="2996897" y="2403798"/>
             <a:ext cx="585003" cy="360000"/>
           </a:xfrm>
           <a:prstGeom prst="rect">
@@ -4623,7 +4623,7 @@
                 <a:latin typeface="Calibri" panose="020F0502020204030204" pitchFamily="34" charset="0"/>
                 <a:cs typeface="Calibri" panose="020F0502020204030204" pitchFamily="34" charset="0"/>
               </a:rPr>
-              <a:t>Training approaches</a:t>
+              <a:t>Training Approaches (TA)</a:t>
             </a:r>
           </a:p>
         </p:txBody>
@@ -4643,7 +4643,7 @@
         <p:spPr>
           <a:xfrm>
             <a:off x="-76874" y="378825"/>
-            <a:ext cx="4217074" cy="338554"/>
+            <a:ext cx="4287574" cy="338554"/>
           </a:xfrm>
           <a:prstGeom prst="rect">
             <a:avLst/>
@@ -4677,7 +4677,7 @@
                 <a:latin typeface="Calibri" panose="020F0502020204030204" pitchFamily="34" charset="0"/>
                 <a:cs typeface="Calibri" panose="020F0502020204030204" pitchFamily="34" charset="0"/>
               </a:rPr>
-              <a:t>Training Approach 1 (TA1) </a:t>
+              <a:t>TA1 </a:t>
             </a:r>
             <a:r>
               <a:rPr lang="en-US" sz="800" b="1" dirty="0">
@@ -4697,7 +4697,7 @@
                 <a:latin typeface="Calibri Light" panose="020F0302020204030204" pitchFamily="34" charset="0"/>
                 <a:cs typeface="Calibri Light" panose="020F0302020204030204" pitchFamily="34" charset="0"/>
               </a:rPr>
-              <a:t>Training carried out over the full domain with randomly reduced number (lower density) of flash flood reports over the full domain</a:t>
+              <a:t>Flash flood reports are randomly reduced uniformly over the whole domain. During training, the model sees the full domain.</a:t>
             </a:r>
           </a:p>
         </p:txBody>
@@ -4716,8 +4716,8 @@
         </p:nvSpPr>
         <p:spPr>
           <a:xfrm>
-            <a:off x="-42826" y="1709783"/>
-            <a:ext cx="2146974" cy="584775"/>
+            <a:off x="247098" y="1810722"/>
+            <a:ext cx="1795798" cy="584775"/>
           </a:xfrm>
           <a:prstGeom prst="rect">
             <a:avLst/>
@@ -4751,7 +4751,7 @@
                 <a:latin typeface="Calibri" panose="020F0502020204030204" pitchFamily="34" charset="0"/>
                 <a:cs typeface="Calibri" panose="020F0502020204030204" pitchFamily="34" charset="0"/>
               </a:rPr>
-              <a:t>Training Approach 2 (TA2) </a:t>
+              <a:t>TA2 </a:t>
             </a:r>
             <a:r>
               <a:rPr lang="en-US" sz="800" dirty="0">
@@ -4761,7 +4761,7 @@
                 <a:latin typeface="Calibri Light" panose="020F0302020204030204" pitchFamily="34" charset="0"/>
                 <a:cs typeface="Calibri Light" panose="020F0302020204030204" pitchFamily="34" charset="0"/>
               </a:rPr>
-              <a:t>– Training carried out over the full domain with flash flood reports only over a part of the domain (i.e., during the training, the model still sees the full domain)</a:t>
+              <a:t>– Flash flood reports are present only over one part of the domain. During training, the model sees the full domain.</a:t>
             </a:r>
           </a:p>
         </p:txBody>
@@ -4780,8 +4780,8 @@
         </p:nvSpPr>
         <p:spPr>
           <a:xfrm>
-            <a:off x="2180890" y="1709783"/>
-            <a:ext cx="2095500" cy="707886"/>
+            <a:off x="2180403" y="1810722"/>
+            <a:ext cx="1795798" cy="584775"/>
           </a:xfrm>
           <a:prstGeom prst="rect">
             <a:avLst/>
@@ -4815,7 +4815,7 @@
                 <a:latin typeface="Calibri" panose="020F0502020204030204" pitchFamily="34" charset="0"/>
                 <a:cs typeface="Calibri" panose="020F0502020204030204" pitchFamily="34" charset="0"/>
               </a:rPr>
-              <a:t>Training Approach 3 (TA3) </a:t>
+              <a:t>TA3 </a:t>
             </a:r>
             <a:r>
               <a:rPr lang="en-US" sz="800" dirty="0">
@@ -4825,7 +4825,7 @@
                 <a:latin typeface="Calibri Light" panose="020F0302020204030204" pitchFamily="34" charset="0"/>
                 <a:cs typeface="Calibri Light" panose="020F0302020204030204" pitchFamily="34" charset="0"/>
               </a:rPr>
-              <a:t>– Training carried out only over the part of the domain with flash flood reports (i.e., during the training, the model does not see the part of the domain with no reports)</a:t>
+              <a:t>– Flash flood reports are present only over one part of the domain. During training, the model sees only the part of domain with reports.</a:t>
             </a:r>
           </a:p>
         </p:txBody>
@@ -5017,7 +5017,7 @@
         </p:nvSpPr>
         <p:spPr>
           <a:xfrm>
-            <a:off x="385579" y="1534588"/>
+            <a:off x="385579" y="1561349"/>
             <a:ext cx="444224" cy="215444"/>
           </a:xfrm>
           <a:prstGeom prst="rect">
@@ -5066,7 +5066,7 @@
         </p:nvSpPr>
         <p:spPr>
           <a:xfrm>
-            <a:off x="1824588" y="1534588"/>
+            <a:off x="1824588" y="1561349"/>
             <a:ext cx="444224" cy="215444"/>
           </a:xfrm>
           <a:prstGeom prst="rect">
@@ -5115,7 +5115,7 @@
         </p:nvSpPr>
         <p:spPr>
           <a:xfrm>
-            <a:off x="3258401" y="1517345"/>
+            <a:off x="3258401" y="1561349"/>
             <a:ext cx="444224" cy="215444"/>
           </a:xfrm>
           <a:prstGeom prst="rect">
@@ -5164,7 +5164,7 @@
         </p:nvSpPr>
         <p:spPr>
           <a:xfrm>
-            <a:off x="264835" y="2735481"/>
+            <a:off x="391390" y="2736663"/>
             <a:ext cx="444224" cy="215444"/>
           </a:xfrm>
           <a:prstGeom prst="rect">
@@ -5213,7 +5213,7 @@
         </p:nvSpPr>
         <p:spPr>
           <a:xfrm>
-            <a:off x="1044145" y="2735481"/>
+            <a:off x="1170700" y="2736663"/>
             <a:ext cx="444224" cy="215444"/>
           </a:xfrm>
           <a:prstGeom prst="rect">
@@ -5262,7 +5262,7 @@
         </p:nvSpPr>
         <p:spPr>
           <a:xfrm>
-            <a:off x="2597157" y="2736663"/>
+            <a:off x="2494573" y="2736663"/>
             <a:ext cx="444224" cy="215444"/>
           </a:xfrm>
           <a:prstGeom prst="rect">
@@ -5311,7 +5311,7 @@
         </p:nvSpPr>
         <p:spPr>
           <a:xfrm>
-            <a:off x="3280012" y="2736663"/>
+            <a:off x="3177428" y="2736663"/>
             <a:ext cx="444224" cy="215444"/>
           </a:xfrm>
           <a:prstGeom prst="rect">

</xml_diff>